<commit_message>
end time for editing
</commit_message>
<xml_diff>
--- a/Week6_CuttingEdge_Proposal/BachmeierNTIM7020-6.pptx
+++ b/Week6_CuttingEdge_Proposal/BachmeierNTIM7020-6.pptx
@@ -5,7 +5,7 @@
     <p:sldMasterId id="2147483648" r:id="rId1"/>
   </p:sldMasterIdLst>
   <p:notesMasterIdLst>
-    <p:notesMasterId r:id="rId21"/>
+    <p:notesMasterId r:id="rId16"/>
   </p:notesMasterIdLst>
   <p:sldIdLst>
     <p:sldId id="256" r:id="rId2"/>
@@ -20,13 +20,8 @@
     <p:sldId id="265" r:id="rId11"/>
     <p:sldId id="264" r:id="rId12"/>
     <p:sldId id="266" r:id="rId13"/>
-    <p:sldId id="267" r:id="rId14"/>
-    <p:sldId id="268" r:id="rId15"/>
-    <p:sldId id="269" r:id="rId16"/>
-    <p:sldId id="270" r:id="rId17"/>
-    <p:sldId id="271" r:id="rId18"/>
-    <p:sldId id="272" r:id="rId19"/>
-    <p:sldId id="273" r:id="rId20"/>
+    <p:sldId id="269" r:id="rId14"/>
+    <p:sldId id="270" r:id="rId15"/>
   </p:sldIdLst>
   <p:sldSz cx="12192000" cy="6858000"/>
   <p:notesSz cx="6858000" cy="9144000"/>
@@ -2420,6 +2415,663 @@
     <p:extLst>
       <p:ext uri="{BB962C8B-B14F-4D97-AF65-F5344CB8AC3E}">
         <p14:creationId xmlns:p14="http://schemas.microsoft.com/office/powerpoint/2010/main" val="1433963811"/>
+      </p:ext>
+    </p:extLst>
+  </p:cSld>
+  <p:clrMapOvr>
+    <a:masterClrMapping/>
+  </p:clrMapOvr>
+</p:notes>
+</file>
+
+<file path=ppt/notesSlides/notesSlide7.xml><?xml version="1.0" encoding="utf-8"?>
+<p:notes xmlns:a="http://schemas.openxmlformats.org/drawingml/2006/main" xmlns:r="http://schemas.openxmlformats.org/officeDocument/2006/relationships" xmlns:p="http://schemas.openxmlformats.org/presentationml/2006/main">
+  <p:cSld>
+    <p:spTree>
+      <p:nvGrpSpPr>
+        <p:cNvPr id="1" name=""/>
+        <p:cNvGrpSpPr/>
+        <p:nvPr/>
+      </p:nvGrpSpPr>
+      <p:grpSpPr>
+        <a:xfrm>
+          <a:off x="0" y="0"/>
+          <a:ext cx="0" cy="0"/>
+          <a:chOff x="0" y="0"/>
+          <a:chExt cx="0" cy="0"/>
+        </a:xfrm>
+      </p:grpSpPr>
+      <p:sp>
+        <p:nvSpPr>
+          <p:cNvPr id="2" name="Slide Image Placeholder 1"/>
+          <p:cNvSpPr>
+            <a:spLocks noGrp="1" noRot="1" noChangeAspect="1"/>
+          </p:cNvSpPr>
+          <p:nvPr>
+            <p:ph type="sldImg"/>
+          </p:nvPr>
+        </p:nvSpPr>
+        <p:spPr/>
+      </p:sp>
+      <p:sp>
+        <p:nvSpPr>
+          <p:cNvPr id="3" name="Notes Placeholder 2"/>
+          <p:cNvSpPr>
+            <a:spLocks noGrp="1"/>
+          </p:cNvSpPr>
+          <p:nvPr>
+            <p:ph type="body" idx="1"/>
+          </p:nvPr>
+        </p:nvSpPr>
+        <p:spPr/>
+        <p:txBody>
+          <a:bodyPr/>
+          <a:lstStyle/>
+          <a:p>
+            <a:endParaRPr lang="en-US" dirty="0"/>
+          </a:p>
+        </p:txBody>
+      </p:sp>
+      <p:sp>
+        <p:nvSpPr>
+          <p:cNvPr id="4" name="Slide Number Placeholder 3"/>
+          <p:cNvSpPr>
+            <a:spLocks noGrp="1"/>
+          </p:cNvSpPr>
+          <p:nvPr>
+            <p:ph type="sldNum" sz="quarter" idx="5"/>
+          </p:nvPr>
+        </p:nvSpPr>
+        <p:spPr/>
+        <p:txBody>
+          <a:bodyPr/>
+          <a:lstStyle/>
+          <a:p>
+            <a:fld id="{2DCD5F9C-CA6B-43CA-B349-A07E0469D42C}" type="slidenum">
+              <a:rPr lang="en-US" smtClean="0"/>
+              <a:t>11</a:t>
+            </a:fld>
+            <a:endParaRPr lang="en-US"/>
+          </a:p>
+        </p:txBody>
+      </p:sp>
+    </p:spTree>
+    <p:extLst>
+      <p:ext uri="{BB962C8B-B14F-4D97-AF65-F5344CB8AC3E}">
+        <p14:creationId xmlns:p14="http://schemas.microsoft.com/office/powerpoint/2010/main" val="3723417242"/>
+      </p:ext>
+    </p:extLst>
+  </p:cSld>
+  <p:clrMapOvr>
+    <a:masterClrMapping/>
+  </p:clrMapOvr>
+</p:notes>
+</file>
+
+<file path=ppt/notesSlides/notesSlide8.xml><?xml version="1.0" encoding="utf-8"?>
+<p:notes xmlns:a="http://schemas.openxmlformats.org/drawingml/2006/main" xmlns:r="http://schemas.openxmlformats.org/officeDocument/2006/relationships" xmlns:p="http://schemas.openxmlformats.org/presentationml/2006/main">
+  <p:cSld>
+    <p:spTree>
+      <p:nvGrpSpPr>
+        <p:cNvPr id="1" name=""/>
+        <p:cNvGrpSpPr/>
+        <p:nvPr/>
+      </p:nvGrpSpPr>
+      <p:grpSpPr>
+        <a:xfrm>
+          <a:off x="0" y="0"/>
+          <a:ext cx="0" cy="0"/>
+          <a:chOff x="0" y="0"/>
+          <a:chExt cx="0" cy="0"/>
+        </a:xfrm>
+      </p:grpSpPr>
+      <p:sp>
+        <p:nvSpPr>
+          <p:cNvPr id="2" name="Slide Image Placeholder 1"/>
+          <p:cNvSpPr>
+            <a:spLocks noGrp="1" noRot="1" noChangeAspect="1"/>
+          </p:cNvSpPr>
+          <p:nvPr>
+            <p:ph type="sldImg"/>
+          </p:nvPr>
+        </p:nvSpPr>
+        <p:spPr/>
+      </p:sp>
+      <p:sp>
+        <p:nvSpPr>
+          <p:cNvPr id="3" name="Notes Placeholder 2"/>
+          <p:cNvSpPr>
+            <a:spLocks noGrp="1"/>
+          </p:cNvSpPr>
+          <p:nvPr>
+            <p:ph type="body" idx="1"/>
+          </p:nvPr>
+        </p:nvSpPr>
+        <p:spPr/>
+        <p:txBody>
+          <a:bodyPr/>
+          <a:lstStyle/>
+          <a:p>
+            <a:r>
+              <a:rPr lang="en-US" sz="1200" b="1" kern="1200" dirty="0">
+                <a:solidFill>
+                  <a:schemeClr val="tx1"/>
+                </a:solidFill>
+                <a:effectLst/>
+                <a:latin typeface="+mn-lt"/>
+                <a:ea typeface="+mn-ea"/>
+                <a:cs typeface="+mn-cs"/>
+              </a:rPr>
+              <a:t>Evolving into the cloud</a:t>
+            </a:r>
+          </a:p>
+          <a:p>
+            <a:r>
+              <a:rPr lang="en-US" sz="1200" kern="1200" dirty="0">
+                <a:solidFill>
+                  <a:schemeClr val="tx1"/>
+                </a:solidFill>
+                <a:effectLst/>
+                <a:latin typeface="+mn-lt"/>
+                <a:ea typeface="+mn-ea"/>
+                <a:cs typeface="+mn-cs"/>
+              </a:rPr>
+              <a:t>Before many organizations can consider their quantum-accelerated implementation, they first need to migrate from traditional relational stores, such as SQL Server and Postgres, toward more cloud-native solutions.  Network administrators have some freedom to the degree of their cloud adoption investment size.  For instance, SQL Azure and Amazon Aurora present a </a:t>
+            </a:r>
+            <a:r>
+              <a:rPr lang="en-US" sz="1200" kern="1200" dirty="0" err="1">
+                <a:solidFill>
+                  <a:schemeClr val="tx1"/>
+                </a:solidFill>
+                <a:effectLst/>
+                <a:latin typeface="+mn-lt"/>
+                <a:ea typeface="+mn-ea"/>
+                <a:cs typeface="+mn-cs"/>
+              </a:rPr>
+              <a:t>NewSql</a:t>
+            </a:r>
+            <a:r>
+              <a:rPr lang="en-US" sz="1200" kern="1200" dirty="0">
+                <a:solidFill>
+                  <a:schemeClr val="tx1"/>
+                </a:solidFill>
+                <a:effectLst/>
+                <a:latin typeface="+mn-lt"/>
+                <a:ea typeface="+mn-ea"/>
+                <a:cs typeface="+mn-cs"/>
+              </a:rPr>
+              <a:t> interface that is familiar to engineering teams and offers capabilities such as automated fail-over and increased availability.  Other organizations might choose to make a larger investment and select a NoSQL technology, such as Apache Casandra, Azure </a:t>
+            </a:r>
+            <a:r>
+              <a:rPr lang="en-US" sz="1200" kern="1200" dirty="0" err="1">
+                <a:solidFill>
+                  <a:schemeClr val="tx1"/>
+                </a:solidFill>
+                <a:effectLst/>
+                <a:latin typeface="+mn-lt"/>
+                <a:ea typeface="+mn-ea"/>
+                <a:cs typeface="+mn-cs"/>
+              </a:rPr>
+              <a:t>CosmosDb</a:t>
+            </a:r>
+            <a:r>
+              <a:rPr lang="en-US" sz="1200" kern="1200" dirty="0">
+                <a:solidFill>
+                  <a:schemeClr val="tx1"/>
+                </a:solidFill>
+                <a:effectLst/>
+                <a:latin typeface="+mn-lt"/>
+                <a:ea typeface="+mn-ea"/>
+                <a:cs typeface="+mn-cs"/>
+              </a:rPr>
+              <a:t>, or Amazon DynamoDB.  These technologies make specific trade-offs in terms of throughput over functionality, like natural joins and built-in aggregations.  </a:t>
+            </a:r>
+          </a:p>
+          <a:p>
+            <a:endParaRPr lang="en-US" sz="1200" kern="1200" dirty="0">
+              <a:solidFill>
+                <a:schemeClr val="tx1"/>
+              </a:solidFill>
+              <a:effectLst/>
+              <a:latin typeface="+mn-lt"/>
+              <a:ea typeface="+mn-ea"/>
+              <a:cs typeface="+mn-cs"/>
+            </a:endParaRPr>
+          </a:p>
+          <a:p>
+            <a:r>
+              <a:rPr lang="en-US" sz="1200" b="1" kern="1200" dirty="0">
+                <a:solidFill>
+                  <a:schemeClr val="tx1"/>
+                </a:solidFill>
+                <a:effectLst/>
+                <a:latin typeface="+mn-lt"/>
+                <a:ea typeface="+mn-ea"/>
+                <a:cs typeface="+mn-cs"/>
+              </a:rPr>
+              <a:t>Evolving into Purpose Built </a:t>
+            </a:r>
+            <a:r>
+              <a:rPr lang="en-US" sz="1200" b="1" kern="1200" dirty="0" err="1">
+                <a:solidFill>
+                  <a:schemeClr val="tx1"/>
+                </a:solidFill>
+                <a:effectLst/>
+                <a:latin typeface="+mn-lt"/>
+                <a:ea typeface="+mn-ea"/>
+                <a:cs typeface="+mn-cs"/>
+              </a:rPr>
+              <a:t>NoSql</a:t>
+            </a:r>
+            <a:endParaRPr lang="en-US" sz="1200" b="1" kern="1200" dirty="0">
+              <a:solidFill>
+                <a:schemeClr val="tx1"/>
+              </a:solidFill>
+              <a:effectLst/>
+              <a:latin typeface="+mn-lt"/>
+              <a:ea typeface="+mn-ea"/>
+              <a:cs typeface="+mn-cs"/>
+            </a:endParaRPr>
+          </a:p>
+          <a:p>
+            <a:r>
+              <a:rPr lang="en-US" sz="1200" kern="1200" dirty="0">
+                <a:solidFill>
+                  <a:schemeClr val="tx1"/>
+                </a:solidFill>
+                <a:effectLst/>
+                <a:latin typeface="+mn-lt"/>
+                <a:ea typeface="+mn-ea"/>
+                <a:cs typeface="+mn-cs"/>
+              </a:rPr>
+              <a:t>As the organization’s data management strategy matures, it will discover that different workloads require different technologies to gain specific optimizations.  For example, the business uses a graph database, like Apache </a:t>
+            </a:r>
+            <a:r>
+              <a:rPr lang="en-US" sz="1200" kern="1200" dirty="0" err="1">
+                <a:solidFill>
+                  <a:schemeClr val="tx1"/>
+                </a:solidFill>
+                <a:effectLst/>
+                <a:latin typeface="+mn-lt"/>
+                <a:ea typeface="+mn-ea"/>
+                <a:cs typeface="+mn-cs"/>
+              </a:rPr>
+              <a:t>Tinkerpop</a:t>
+            </a:r>
+            <a:r>
+              <a:rPr lang="en-US" sz="1200" kern="1200" dirty="0">
+                <a:solidFill>
+                  <a:schemeClr val="tx1"/>
+                </a:solidFill>
+                <a:effectLst/>
+                <a:latin typeface="+mn-lt"/>
+                <a:ea typeface="+mn-ea"/>
+                <a:cs typeface="+mn-cs"/>
+              </a:rPr>
+              <a:t>, to store and query relationship information from a known point.  However, the data structures would not be efficient for holding time-series information about those entities and would need a separate time-series store like Influx or </a:t>
+            </a:r>
+            <a:r>
+              <a:rPr lang="en-US" sz="1200" kern="1200" dirty="0" err="1">
+                <a:solidFill>
+                  <a:schemeClr val="tx1"/>
+                </a:solidFill>
+                <a:effectLst/>
+                <a:latin typeface="+mn-lt"/>
+                <a:ea typeface="+mn-ea"/>
+                <a:cs typeface="+mn-cs"/>
+              </a:rPr>
+              <a:t>OpenTSDB</a:t>
+            </a:r>
+            <a:r>
+              <a:rPr lang="en-US" sz="1200" kern="1200" dirty="0">
+                <a:solidFill>
+                  <a:schemeClr val="tx1"/>
+                </a:solidFill>
+                <a:effectLst/>
+                <a:latin typeface="+mn-lt"/>
+                <a:ea typeface="+mn-ea"/>
+                <a:cs typeface="+mn-cs"/>
+              </a:rPr>
+              <a:t>.  Since the graph queries start from a known </a:t>
+            </a:r>
+            <a:r>
+              <a:rPr lang="en-US" sz="1200" kern="1200" dirty="0" err="1">
+                <a:solidFill>
+                  <a:schemeClr val="tx1"/>
+                </a:solidFill>
+                <a:effectLst/>
+                <a:latin typeface="+mn-lt"/>
+                <a:ea typeface="+mn-ea"/>
+                <a:cs typeface="+mn-cs"/>
+              </a:rPr>
+              <a:t>vertice</a:t>
+            </a:r>
+            <a:r>
+              <a:rPr lang="en-US" sz="1200" kern="1200" dirty="0">
+                <a:solidFill>
+                  <a:schemeClr val="tx1"/>
+                </a:solidFill>
+                <a:effectLst/>
+                <a:latin typeface="+mn-lt"/>
+                <a:ea typeface="+mn-ea"/>
+                <a:cs typeface="+mn-cs"/>
+              </a:rPr>
+              <a:t>, a term store like Apache </a:t>
+            </a:r>
+            <a:r>
+              <a:rPr lang="en-US" sz="1200" kern="1200" dirty="0" err="1">
+                <a:solidFill>
+                  <a:schemeClr val="tx1"/>
+                </a:solidFill>
+                <a:effectLst/>
+                <a:latin typeface="+mn-lt"/>
+                <a:ea typeface="+mn-ea"/>
+                <a:cs typeface="+mn-cs"/>
+              </a:rPr>
+              <a:t>Solr</a:t>
+            </a:r>
+            <a:r>
+              <a:rPr lang="en-US" sz="1200" kern="1200" dirty="0">
+                <a:solidFill>
+                  <a:schemeClr val="tx1"/>
+                </a:solidFill>
+                <a:effectLst/>
+                <a:latin typeface="+mn-lt"/>
+                <a:ea typeface="+mn-ea"/>
+                <a:cs typeface="+mn-cs"/>
+              </a:rPr>
+              <a:t> or Elastic Search can hold metadata about the graph entities.  Answer extraction to common business questions into OLAP stores provides a consistent interface for visualization tooling.  Though many OLAP technologies, such as Amazon Redshift, batch retrieval, so the Redis cache clusters need to hold temporal data, such as results for the website’s homepage for additional performance.  </a:t>
+            </a:r>
+          </a:p>
+          <a:p>
+            <a:endParaRPr lang="en-US" sz="1200" kern="1200" dirty="0">
+              <a:solidFill>
+                <a:schemeClr val="tx1"/>
+              </a:solidFill>
+              <a:effectLst/>
+              <a:latin typeface="+mn-lt"/>
+              <a:ea typeface="+mn-ea"/>
+              <a:cs typeface="+mn-cs"/>
+            </a:endParaRPr>
+          </a:p>
+          <a:p>
+            <a:r>
+              <a:rPr lang="en-US" sz="1200" b="1" kern="1200" dirty="0">
+                <a:solidFill>
+                  <a:schemeClr val="tx1"/>
+                </a:solidFill>
+                <a:effectLst/>
+                <a:latin typeface="+mn-lt"/>
+                <a:ea typeface="+mn-ea"/>
+                <a:cs typeface="+mn-cs"/>
+              </a:rPr>
+              <a:t>Finally throwing most of it away with Quantum</a:t>
+            </a:r>
+          </a:p>
+          <a:p>
+            <a:r>
+              <a:rPr lang="en-US" sz="1200" kern="1200" dirty="0">
+                <a:solidFill>
+                  <a:schemeClr val="tx1"/>
+                </a:solidFill>
+                <a:effectLst/>
+                <a:latin typeface="+mn-lt"/>
+                <a:ea typeface="+mn-ea"/>
+                <a:cs typeface="+mn-cs"/>
+              </a:rPr>
+              <a:t>At this point, the organization takes a step back at the vast collection of built-for-purpose tooling they need to support and asks, what’s one more?  Now they are ready for quantum.  Joking aside-- the vision of quantum is that it reduces the need for these decoupled tooling.    For instance, Grover searches remove the need to maintain separate term stores.  The benefits of segmenting ACID-compliant </a:t>
+            </a:r>
+            <a:r>
+              <a:rPr lang="en-US" sz="1200" kern="1200" dirty="0" err="1">
+                <a:solidFill>
+                  <a:schemeClr val="tx1"/>
+                </a:solidFill>
+                <a:effectLst/>
+                <a:latin typeface="+mn-lt"/>
+                <a:ea typeface="+mn-ea"/>
+                <a:cs typeface="+mn-cs"/>
+              </a:rPr>
+              <a:t>NewSql</a:t>
+            </a:r>
+            <a:r>
+              <a:rPr lang="en-US" sz="1200" kern="1200" dirty="0">
+                <a:solidFill>
+                  <a:schemeClr val="tx1"/>
+                </a:solidFill>
+                <a:effectLst/>
+                <a:latin typeface="+mn-lt"/>
+                <a:ea typeface="+mn-ea"/>
+                <a:cs typeface="+mn-cs"/>
+              </a:rPr>
+              <a:t> from BASE-optimized </a:t>
+            </a:r>
+            <a:r>
+              <a:rPr lang="en-US" sz="1200" kern="1200" dirty="0" err="1">
+                <a:solidFill>
+                  <a:schemeClr val="tx1"/>
+                </a:solidFill>
+                <a:effectLst/>
+                <a:latin typeface="+mn-lt"/>
+                <a:ea typeface="+mn-ea"/>
+                <a:cs typeface="+mn-cs"/>
+              </a:rPr>
+              <a:t>NoSql</a:t>
+            </a:r>
+            <a:r>
+              <a:rPr lang="en-US" sz="1200" kern="1200" dirty="0">
+                <a:solidFill>
+                  <a:schemeClr val="tx1"/>
+                </a:solidFill>
+                <a:effectLst/>
+                <a:latin typeface="+mn-lt"/>
+                <a:ea typeface="+mn-ea"/>
+                <a:cs typeface="+mn-cs"/>
+              </a:rPr>
+              <a:t> are limited to ‘schema-on-read’ versus ‘schema-on-write.’  As the number of distinct technologies decreases, the operational and capital costs (OPX/CAPX) improve, allowing the organization to become more agile.</a:t>
+            </a:r>
+          </a:p>
+          <a:p>
+            <a:endParaRPr lang="en-US" dirty="0"/>
+          </a:p>
+        </p:txBody>
+      </p:sp>
+      <p:sp>
+        <p:nvSpPr>
+          <p:cNvPr id="4" name="Slide Number Placeholder 3"/>
+          <p:cNvSpPr>
+            <a:spLocks noGrp="1"/>
+          </p:cNvSpPr>
+          <p:nvPr>
+            <p:ph type="sldNum" sz="quarter" idx="5"/>
+          </p:nvPr>
+        </p:nvSpPr>
+        <p:spPr/>
+        <p:txBody>
+          <a:bodyPr/>
+          <a:lstStyle/>
+          <a:p>
+            <a:fld id="{2DCD5F9C-CA6B-43CA-B349-A07E0469D42C}" type="slidenum">
+              <a:rPr lang="en-US" smtClean="0"/>
+              <a:t>12</a:t>
+            </a:fld>
+            <a:endParaRPr lang="en-US"/>
+          </a:p>
+        </p:txBody>
+      </p:sp>
+    </p:spTree>
+    <p:extLst>
+      <p:ext uri="{BB962C8B-B14F-4D97-AF65-F5344CB8AC3E}">
+        <p14:creationId xmlns:p14="http://schemas.microsoft.com/office/powerpoint/2010/main" val="2897154834"/>
+      </p:ext>
+    </p:extLst>
+  </p:cSld>
+  <p:clrMapOvr>
+    <a:masterClrMapping/>
+  </p:clrMapOvr>
+</p:notes>
+</file>
+
+<file path=ppt/notesSlides/notesSlide9.xml><?xml version="1.0" encoding="utf-8"?>
+<p:notes xmlns:a="http://schemas.openxmlformats.org/drawingml/2006/main" xmlns:r="http://schemas.openxmlformats.org/officeDocument/2006/relationships" xmlns:p="http://schemas.openxmlformats.org/presentationml/2006/main">
+  <p:cSld>
+    <p:spTree>
+      <p:nvGrpSpPr>
+        <p:cNvPr id="1" name=""/>
+        <p:cNvGrpSpPr/>
+        <p:nvPr/>
+      </p:nvGrpSpPr>
+      <p:grpSpPr>
+        <a:xfrm>
+          <a:off x="0" y="0"/>
+          <a:ext cx="0" cy="0"/>
+          <a:chOff x="0" y="0"/>
+          <a:chExt cx="0" cy="0"/>
+        </a:xfrm>
+      </p:grpSpPr>
+      <p:sp>
+        <p:nvSpPr>
+          <p:cNvPr id="2" name="Slide Image Placeholder 1"/>
+          <p:cNvSpPr>
+            <a:spLocks noGrp="1" noRot="1" noChangeAspect="1"/>
+          </p:cNvSpPr>
+          <p:nvPr>
+            <p:ph type="sldImg"/>
+          </p:nvPr>
+        </p:nvSpPr>
+        <p:spPr/>
+      </p:sp>
+      <p:sp>
+        <p:nvSpPr>
+          <p:cNvPr id="3" name="Notes Placeholder 2"/>
+          <p:cNvSpPr>
+            <a:spLocks noGrp="1"/>
+          </p:cNvSpPr>
+          <p:nvPr>
+            <p:ph type="body" idx="1"/>
+          </p:nvPr>
+        </p:nvSpPr>
+        <p:spPr/>
+        <p:txBody>
+          <a:bodyPr/>
+          <a:lstStyle/>
+          <a:p>
+            <a:pPr marL="0" marR="0" lvl="0" indent="0" algn="l" defTabSz="914400" rtl="0" eaLnBrk="1" fontAlgn="auto" latinLnBrk="0" hangingPunct="1">
+              <a:lnSpc>
+                <a:spcPct val="100000"/>
+              </a:lnSpc>
+              <a:spcBef>
+                <a:spcPts val="0"/>
+              </a:spcBef>
+              <a:spcAft>
+                <a:spcPts val="0"/>
+              </a:spcAft>
+              <a:buClrTx/>
+              <a:buSzTx/>
+              <a:buFontTx/>
+              <a:buNone/>
+              <a:tabLst/>
+              <a:defRPr/>
+            </a:pPr>
+            <a:r>
+              <a:rPr lang="en-US" sz="1200" b="1" kern="1200" dirty="0">
+                <a:solidFill>
+                  <a:schemeClr val="tx1"/>
+                </a:solidFill>
+                <a:effectLst/>
+                <a:latin typeface="+mn-lt"/>
+                <a:ea typeface="+mn-ea"/>
+                <a:cs typeface="+mn-cs"/>
+              </a:rPr>
+              <a:t>What does Quantum Databases Solve for Business</a:t>
+            </a:r>
+          </a:p>
+          <a:p>
+            <a:pPr marL="0" marR="0" lvl="0" indent="0" algn="l" defTabSz="914400" rtl="0" eaLnBrk="1" fontAlgn="auto" latinLnBrk="0" hangingPunct="1">
+              <a:lnSpc>
+                <a:spcPct val="100000"/>
+              </a:lnSpc>
+              <a:spcBef>
+                <a:spcPts val="0"/>
+              </a:spcBef>
+              <a:spcAft>
+                <a:spcPts val="0"/>
+              </a:spcAft>
+              <a:buClrTx/>
+              <a:buSzTx/>
+              <a:buFontTx/>
+              <a:buNone/>
+              <a:tabLst/>
+              <a:defRPr/>
+            </a:pPr>
+            <a:r>
+              <a:rPr lang="en-US" sz="1200" kern="1200" dirty="0">
+                <a:solidFill>
+                  <a:schemeClr val="tx1"/>
+                </a:solidFill>
+                <a:effectLst/>
+                <a:latin typeface="+mn-lt"/>
+                <a:ea typeface="+mn-ea"/>
+                <a:cs typeface="+mn-cs"/>
+              </a:rPr>
+              <a:t>When academia first proposed neural networks, the business community did not understand the practical application of these systems.  Since then, neural networks have touched every aspect of our online lives.  Quantum databases will have a similar impact on society as they address optimization problems, machine learning, fuzzy logic, and become a standard server acceleration card.  As quantum technologies mature, they will grow as cloud-native extensions of the enterprise environment and unlock new insights through massively parallel processing that powers rich business intelligence platforms.  For instance, </a:t>
+            </a:r>
+            <a:r>
+              <a:rPr lang="en-US" sz="1200" kern="1200" dirty="0" err="1">
+                <a:solidFill>
+                  <a:schemeClr val="tx1"/>
+                </a:solidFill>
+                <a:effectLst/>
+                <a:latin typeface="+mn-lt"/>
+                <a:ea typeface="+mn-ea"/>
+                <a:cs typeface="+mn-cs"/>
+              </a:rPr>
+              <a:t>Brandano</a:t>
+            </a:r>
+            <a:r>
+              <a:rPr lang="en-US" sz="1200" kern="1200" dirty="0">
+                <a:solidFill>
+                  <a:schemeClr val="tx1"/>
+                </a:solidFill>
+                <a:effectLst/>
+                <a:latin typeface="+mn-lt"/>
+                <a:ea typeface="+mn-ea"/>
+                <a:cs typeface="+mn-cs"/>
+              </a:rPr>
+              <a:t> (2019) describes the challenges with modeling nitrogen processes as they contain over seventy states that High-Performance Computing (HPC) clusters can only approximate.  As that estimations improve those manufacturing processes, gain huge efficiencies reducing global energy waste.</a:t>
+            </a:r>
+          </a:p>
+          <a:p>
+            <a:endParaRPr lang="en-US" dirty="0"/>
+          </a:p>
+        </p:txBody>
+      </p:sp>
+      <p:sp>
+        <p:nvSpPr>
+          <p:cNvPr id="4" name="Slide Number Placeholder 3"/>
+          <p:cNvSpPr>
+            <a:spLocks noGrp="1"/>
+          </p:cNvSpPr>
+          <p:nvPr>
+            <p:ph type="sldNum" sz="quarter" idx="5"/>
+          </p:nvPr>
+        </p:nvSpPr>
+        <p:spPr/>
+        <p:txBody>
+          <a:bodyPr/>
+          <a:lstStyle/>
+          <a:p>
+            <a:fld id="{2DCD5F9C-CA6B-43CA-B349-A07E0469D42C}" type="slidenum">
+              <a:rPr lang="en-US" smtClean="0"/>
+              <a:t>14</a:t>
+            </a:fld>
+            <a:endParaRPr lang="en-US"/>
+          </a:p>
+        </p:txBody>
+      </p:sp>
+    </p:spTree>
+    <p:extLst>
+      <p:ext uri="{BB962C8B-B14F-4D97-AF65-F5344CB8AC3E}">
+        <p14:creationId xmlns:p14="http://schemas.microsoft.com/office/powerpoint/2010/main" val="441507853"/>
       </p:ext>
     </p:extLst>
   </p:cSld>
@@ -10250,69 +10902,39 @@
             </a:br>
             <a:r>
               <a:rPr lang="en-US" dirty="0"/>
-              <a:t>Evolution from </a:t>
-            </a:r>
-            <a:br>
-              <a:rPr lang="en-US" dirty="0"/>
-            </a:br>
-            <a:r>
-              <a:rPr lang="en-US" dirty="0"/>
-              <a:t>NoSQL</a:t>
-            </a:r>
-            <a:br>
-              <a:rPr lang="en-US" dirty="0"/>
-            </a:br>
-            <a:endParaRPr lang="en-US" dirty="0"/>
+              <a:t>Evolution the technology</a:t>
+            </a:r>
           </a:p>
         </p:txBody>
       </p:sp>
       <p:pic>
         <p:nvPicPr>
-          <p:cNvPr id="1026" name="Picture 2">
+          <p:cNvPr id="4" name="Picture 3">
             <a:extLst>
               <a:ext uri="{FF2B5EF4-FFF2-40B4-BE49-F238E27FC236}">
-                <a16:creationId xmlns:a16="http://schemas.microsoft.com/office/drawing/2014/main" id="{3CF802AC-6A6C-4112-BD89-FB21F85FDA78}"/>
+                <a16:creationId xmlns:a16="http://schemas.microsoft.com/office/drawing/2014/main" id="{CAEBA810-11E5-432B-B23F-C95D87A68973}"/>
               </a:ext>
             </a:extLst>
           </p:cNvPr>
           <p:cNvPicPr>
-            <a:picLocks noGrp="1" noChangeAspect="1" noChangeArrowheads="1"/>
+            <a:picLocks noChangeAspect="1"/>
           </p:cNvPicPr>
-          <p:nvPr>
-            <p:ph idx="1"/>
-          </p:nvPr>
+          <p:nvPr/>
         </p:nvPicPr>
         <p:blipFill>
-          <a:blip r:embed="rId2">
-            <a:extLst>
-              <a:ext uri="{28A0092B-C50C-407E-A947-70E740481C1C}">
-                <a14:useLocalDpi xmlns:a14="http://schemas.microsoft.com/office/drawing/2010/main" val="0"/>
-              </a:ext>
-            </a:extLst>
-          </a:blip>
-          <a:srcRect/>
+          <a:blip r:embed="rId3"/>
           <a:stretch>
             <a:fillRect/>
           </a:stretch>
         </p:blipFill>
-        <p:spPr bwMode="auto">
+        <p:spPr>
           <a:xfrm>
-            <a:off x="5280025" y="1741812"/>
-            <a:ext cx="6224588" cy="3488676"/>
+            <a:off x="4515361" y="1523999"/>
+            <a:ext cx="6461071" cy="3666000"/>
           </a:xfrm>
           <a:prstGeom prst="rect">
             <a:avLst/>
           </a:prstGeom>
-          <a:noFill/>
-          <a:extLst>
-            <a:ext uri="{909E8E84-426E-40DD-AFC4-6F175D3DCCD1}">
-              <a14:hiddenFill xmlns:a14="http://schemas.microsoft.com/office/drawing/2010/main">
-                <a:solidFill>
-                  <a:srgbClr val="FFFFFF"/>
-                </a:solidFill>
-              </a14:hiddenFill>
-            </a:ext>
-          </a:extLst>
         </p:spPr>
       </p:pic>
     </p:spTree>
@@ -10368,7 +10990,7 @@
           <a:p>
             <a:r>
               <a:rPr lang="en-US" dirty="0"/>
-              <a:t>Evolution from Relational to NoSQL</a:t>
+              <a:t>Evolution from Relational to Quantum</a:t>
             </a:r>
           </a:p>
         </p:txBody>
@@ -10391,44 +11013,85 @@
         </p:nvSpPr>
         <p:spPr/>
         <p:txBody>
-          <a:bodyPr/>
+          <a:bodyPr>
+            <a:normAutofit fontScale="92500" lnSpcReduction="10000"/>
+          </a:bodyPr>
           <a:lstStyle/>
           <a:p>
             <a:r>
               <a:rPr lang="en-US" dirty="0"/>
-              <a:t>Relational Stores</a:t>
+              <a:t>Evolving into the cloud</a:t>
             </a:r>
           </a:p>
           <a:p>
             <a:pPr lvl="1"/>
             <a:r>
               <a:rPr lang="en-US" dirty="0"/>
-              <a:t>Challenges…</a:t>
+              <a:t>Reducing operational overhead</a:t>
             </a:r>
           </a:p>
           <a:p>
             <a:pPr lvl="1"/>
             <a:r>
               <a:rPr lang="en-US" dirty="0"/>
-              <a:t>Strengths…</a:t>
-            </a:r>
-            <a:br>
-              <a:rPr lang="en-US" dirty="0"/>
-            </a:br>
+              <a:t>Improving agility</a:t>
+            </a:r>
+          </a:p>
+          <a:p>
+            <a:r>
+              <a:rPr lang="en-US" dirty="0"/>
+              <a:t>Evolving from SQL to NoSQL</a:t>
+            </a:r>
+          </a:p>
+          <a:p>
+            <a:pPr lvl="1"/>
+            <a:r>
+              <a:rPr lang="en-US" dirty="0"/>
+              <a:t>Reaching “Internet Scale” and increased availability</a:t>
+            </a:r>
+          </a:p>
+          <a:p>
+            <a:pPr lvl="1"/>
+            <a:r>
+              <a:rPr lang="en-US" dirty="0"/>
+              <a:t>Reducing failure time</a:t>
+            </a:r>
+          </a:p>
+          <a:p>
+            <a:r>
+              <a:rPr lang="en-US" dirty="0"/>
+              <a:t>Evolving from Generic NoSQL to Purpose Built Systems</a:t>
+            </a:r>
+          </a:p>
+          <a:p>
+            <a:pPr lvl="1"/>
+            <a:r>
+              <a:rPr lang="en-US" dirty="0"/>
+              <a:t>Control over optimization point (e.g., latency over costs)</a:t>
+            </a:r>
+          </a:p>
+          <a:p>
+            <a:pPr lvl="1"/>
+            <a:r>
+              <a:rPr lang="en-US" dirty="0"/>
+              <a:t>Heterogeneous technologies with complex replication</a:t>
+            </a:r>
+          </a:p>
+          <a:p>
+            <a:r>
+              <a:rPr lang="en-US" dirty="0"/>
+              <a:t>Evolving to Quantum</a:t>
+            </a:r>
+          </a:p>
+          <a:p>
+            <a:pPr lvl="1"/>
+            <a:r>
+              <a:rPr lang="en-US" dirty="0"/>
+              <a:t>Removing the multi-store strategies, focus on single store supporting multiple use-cases</a:t>
+            </a:r>
+          </a:p>
+          <a:p>
             <a:endParaRPr lang="en-US" dirty="0"/>
-          </a:p>
-          <a:p>
-            <a:r>
-              <a:rPr lang="en-US" dirty="0"/>
-              <a:t>NoSQL Stores</a:t>
-            </a:r>
-          </a:p>
-          <a:p>
-            <a:pPr lvl="1"/>
-            <a:r>
-              <a:rPr lang="en-US" dirty="0"/>
-              <a:t>Challenges…</a:t>
-            </a:r>
           </a:p>
         </p:txBody>
       </p:sp>
@@ -10467,7 +11130,7 @@
           <p:cNvPr id="2" name="Title 1">
             <a:extLst>
               <a:ext uri="{FF2B5EF4-FFF2-40B4-BE49-F238E27FC236}">
-                <a16:creationId xmlns:a16="http://schemas.microsoft.com/office/drawing/2014/main" id="{2EFF97EE-A651-4B30-9EC1-3B08B21F91DF}"/>
+                <a16:creationId xmlns:a16="http://schemas.microsoft.com/office/drawing/2014/main" id="{B17D88FF-418A-41DC-8289-59E34BDD7E96}"/>
               </a:ext>
             </a:extLst>
           </p:cNvPr>
@@ -10478,47 +11141,76 @@
             <p:ph type="title"/>
           </p:nvPr>
         </p:nvSpPr>
-        <p:spPr/>
-        <p:txBody>
-          <a:bodyPr/>
+        <p:spPr>
+          <a:xfrm>
+            <a:off x="1433889" y="1059872"/>
+            <a:ext cx="3012216" cy="4851349"/>
+          </a:xfrm>
+        </p:spPr>
+        <p:txBody>
+          <a:bodyPr>
+            <a:normAutofit/>
+          </a:bodyPr>
           <a:lstStyle/>
           <a:p>
             <a:r>
               <a:rPr lang="en-US" dirty="0"/>
-              <a:t>Evolution from Generic NoSQL to Purpose Built</a:t>
-            </a:r>
-          </a:p>
-        </p:txBody>
-      </p:sp>
-      <p:sp>
-        <p:nvSpPr>
-          <p:cNvPr id="3" name="Content Placeholder 2">
+              <a:t>Section 4</a:t>
+            </a:r>
+            <a:br>
+              <a:rPr lang="en-US" dirty="0"/>
+            </a:br>
+            <a:br>
+              <a:rPr lang="en-US" dirty="0"/>
+            </a:br>
+            <a:r>
+              <a:rPr lang="en-US" dirty="0"/>
+              <a:t>Evaluate for Business</a:t>
+            </a:r>
+            <a:br>
+              <a:rPr lang="en-US" dirty="0"/>
+            </a:br>
+            <a:r>
+              <a:rPr lang="en-US" dirty="0"/>
+              <a:t>Adoption</a:t>
+            </a:r>
+          </a:p>
+        </p:txBody>
+      </p:sp>
+      <p:pic>
+        <p:nvPicPr>
+          <p:cNvPr id="4" name="Picture 3">
             <a:extLst>
               <a:ext uri="{FF2B5EF4-FFF2-40B4-BE49-F238E27FC236}">
-                <a16:creationId xmlns:a16="http://schemas.microsoft.com/office/drawing/2014/main" id="{1ECF7EC7-BF02-4A8B-9D6C-8FA808649256}"/>
+                <a16:creationId xmlns:a16="http://schemas.microsoft.com/office/drawing/2014/main" id="{8A964103-5DFB-4634-B69A-6C5B31448074}"/>
               </a:ext>
             </a:extLst>
           </p:cNvPr>
-          <p:cNvSpPr>
-            <a:spLocks noGrp="1"/>
-          </p:cNvSpPr>
-          <p:nvPr>
-            <p:ph idx="1"/>
-          </p:nvPr>
-        </p:nvSpPr>
-        <p:spPr/>
-        <p:txBody>
-          <a:bodyPr/>
-          <a:lstStyle/>
-          <a:p>
-            <a:endParaRPr lang="en-US"/>
-          </a:p>
-        </p:txBody>
-      </p:sp>
+          <p:cNvPicPr>
+            <a:picLocks noChangeAspect="1"/>
+          </p:cNvPicPr>
+          <p:nvPr/>
+        </p:nvPicPr>
+        <p:blipFill>
+          <a:blip r:embed="rId2"/>
+          <a:stretch>
+            <a:fillRect/>
+          </a:stretch>
+        </p:blipFill>
+        <p:spPr>
+          <a:xfrm>
+            <a:off x="4446105" y="2343149"/>
+            <a:ext cx="6997948" cy="2714625"/>
+          </a:xfrm>
+          <a:prstGeom prst="rect">
+            <a:avLst/>
+          </a:prstGeom>
+        </p:spPr>
+      </p:pic>
     </p:spTree>
     <p:extLst>
       <p:ext uri="{BB962C8B-B14F-4D97-AF65-F5344CB8AC3E}">
-        <p14:creationId xmlns:p14="http://schemas.microsoft.com/office/powerpoint/2010/main" val="3496090430"/>
+        <p14:creationId xmlns:p14="http://schemas.microsoft.com/office/powerpoint/2010/main" val="372760760"/>
       </p:ext>
     </p:extLst>
   </p:cSld>
@@ -10550,220 +11242,6 @@
           <p:cNvPr id="2" name="Title 1">
             <a:extLst>
               <a:ext uri="{FF2B5EF4-FFF2-40B4-BE49-F238E27FC236}">
-                <a16:creationId xmlns:a16="http://schemas.microsoft.com/office/drawing/2014/main" id="{A7F88339-FA1A-4A3A-9DC0-C1CD50E8B044}"/>
-              </a:ext>
-            </a:extLst>
-          </p:cNvPr>
-          <p:cNvSpPr>
-            <a:spLocks noGrp="1"/>
-          </p:cNvSpPr>
-          <p:nvPr>
-            <p:ph type="title"/>
-          </p:nvPr>
-        </p:nvSpPr>
-        <p:spPr/>
-        <p:txBody>
-          <a:bodyPr/>
-          <a:lstStyle/>
-          <a:p>
-            <a:r>
-              <a:rPr lang="en-US" dirty="0"/>
-              <a:t>Evolution to Cloud Native</a:t>
-            </a:r>
-          </a:p>
-        </p:txBody>
-      </p:sp>
-      <p:sp>
-        <p:nvSpPr>
-          <p:cNvPr id="3" name="Content Placeholder 2">
-            <a:extLst>
-              <a:ext uri="{FF2B5EF4-FFF2-40B4-BE49-F238E27FC236}">
-                <a16:creationId xmlns:a16="http://schemas.microsoft.com/office/drawing/2014/main" id="{40812D88-ADFA-4FB6-895E-A9EDA5CA9912}"/>
-              </a:ext>
-            </a:extLst>
-          </p:cNvPr>
-          <p:cNvSpPr>
-            <a:spLocks noGrp="1"/>
-          </p:cNvSpPr>
-          <p:nvPr>
-            <p:ph idx="1"/>
-          </p:nvPr>
-        </p:nvSpPr>
-        <p:spPr/>
-        <p:txBody>
-          <a:bodyPr/>
-          <a:lstStyle/>
-          <a:p>
-            <a:endParaRPr lang="en-US"/>
-          </a:p>
-        </p:txBody>
-      </p:sp>
-    </p:spTree>
-    <p:extLst>
-      <p:ext uri="{BB962C8B-B14F-4D97-AF65-F5344CB8AC3E}">
-        <p14:creationId xmlns:p14="http://schemas.microsoft.com/office/powerpoint/2010/main" val="491319933"/>
-      </p:ext>
-    </p:extLst>
-  </p:cSld>
-  <p:clrMapOvr>
-    <a:masterClrMapping/>
-  </p:clrMapOvr>
-</p:sld>
-</file>
-
-<file path=ppt/slides/slide15.xml><?xml version="1.0" encoding="utf-8"?>
-<p:sld xmlns:a="http://schemas.openxmlformats.org/drawingml/2006/main" xmlns:r="http://schemas.openxmlformats.org/officeDocument/2006/relationships" xmlns:p="http://schemas.openxmlformats.org/presentationml/2006/main">
-  <p:cSld>
-    <p:spTree>
-      <p:nvGrpSpPr>
-        <p:cNvPr id="1" name=""/>
-        <p:cNvGrpSpPr/>
-        <p:nvPr/>
-      </p:nvGrpSpPr>
-      <p:grpSpPr>
-        <a:xfrm>
-          <a:off x="0" y="0"/>
-          <a:ext cx="0" cy="0"/>
-          <a:chOff x="0" y="0"/>
-          <a:chExt cx="0" cy="0"/>
-        </a:xfrm>
-      </p:grpSpPr>
-      <p:sp>
-        <p:nvSpPr>
-          <p:cNvPr id="2" name="Title 1">
-            <a:extLst>
-              <a:ext uri="{FF2B5EF4-FFF2-40B4-BE49-F238E27FC236}">
-                <a16:creationId xmlns:a16="http://schemas.microsoft.com/office/drawing/2014/main" id="{B17D88FF-418A-41DC-8289-59E34BDD7E96}"/>
-              </a:ext>
-            </a:extLst>
-          </p:cNvPr>
-          <p:cNvSpPr>
-            <a:spLocks noGrp="1"/>
-          </p:cNvSpPr>
-          <p:nvPr>
-            <p:ph type="title"/>
-          </p:nvPr>
-        </p:nvSpPr>
-        <p:spPr>
-          <a:xfrm>
-            <a:off x="1433889" y="1059872"/>
-            <a:ext cx="3012216" cy="4851349"/>
-          </a:xfrm>
-        </p:spPr>
-        <p:txBody>
-          <a:bodyPr>
-            <a:normAutofit/>
-          </a:bodyPr>
-          <a:lstStyle/>
-          <a:p>
-            <a:r>
-              <a:rPr lang="en-US" dirty="0"/>
-              <a:t>Section 4</a:t>
-            </a:r>
-            <a:br>
-              <a:rPr lang="en-US" dirty="0"/>
-            </a:br>
-            <a:br>
-              <a:rPr lang="en-US" dirty="0"/>
-            </a:br>
-            <a:r>
-              <a:rPr lang="en-US" dirty="0"/>
-              <a:t>Evaluate for Business</a:t>
-            </a:r>
-            <a:br>
-              <a:rPr lang="en-US" dirty="0"/>
-            </a:br>
-            <a:r>
-              <a:rPr lang="en-US" dirty="0"/>
-              <a:t>Adoption</a:t>
-            </a:r>
-          </a:p>
-        </p:txBody>
-      </p:sp>
-      <p:pic>
-        <p:nvPicPr>
-          <p:cNvPr id="1026" name="Picture 2">
-            <a:extLst>
-              <a:ext uri="{FF2B5EF4-FFF2-40B4-BE49-F238E27FC236}">
-                <a16:creationId xmlns:a16="http://schemas.microsoft.com/office/drawing/2014/main" id="{3CF802AC-6A6C-4112-BD89-FB21F85FDA78}"/>
-              </a:ext>
-            </a:extLst>
-          </p:cNvPr>
-          <p:cNvPicPr>
-            <a:picLocks noGrp="1" noChangeAspect="1" noChangeArrowheads="1"/>
-          </p:cNvPicPr>
-          <p:nvPr>
-            <p:ph idx="1"/>
-          </p:nvPr>
-        </p:nvPicPr>
-        <p:blipFill>
-          <a:blip r:embed="rId2">
-            <a:extLst>
-              <a:ext uri="{28A0092B-C50C-407E-A947-70E740481C1C}">
-                <a14:useLocalDpi xmlns:a14="http://schemas.microsoft.com/office/drawing/2010/main" val="0"/>
-              </a:ext>
-            </a:extLst>
-          </a:blip>
-          <a:srcRect/>
-          <a:stretch>
-            <a:fillRect/>
-          </a:stretch>
-        </p:blipFill>
-        <p:spPr bwMode="auto">
-          <a:xfrm>
-            <a:off x="5280025" y="1741812"/>
-            <a:ext cx="6224588" cy="3488676"/>
-          </a:xfrm>
-          <a:prstGeom prst="rect">
-            <a:avLst/>
-          </a:prstGeom>
-          <a:noFill/>
-          <a:extLst>
-            <a:ext uri="{909E8E84-426E-40DD-AFC4-6F175D3DCCD1}">
-              <a14:hiddenFill xmlns:a14="http://schemas.microsoft.com/office/drawing/2010/main">
-                <a:solidFill>
-                  <a:srgbClr val="FFFFFF"/>
-                </a:solidFill>
-              </a14:hiddenFill>
-            </a:ext>
-          </a:extLst>
-        </p:spPr>
-      </p:pic>
-    </p:spTree>
-    <p:extLst>
-      <p:ext uri="{BB962C8B-B14F-4D97-AF65-F5344CB8AC3E}">
-        <p14:creationId xmlns:p14="http://schemas.microsoft.com/office/powerpoint/2010/main" val="372760760"/>
-      </p:ext>
-    </p:extLst>
-  </p:cSld>
-  <p:clrMapOvr>
-    <a:masterClrMapping/>
-  </p:clrMapOvr>
-</p:sld>
-</file>
-
-<file path=ppt/slides/slide16.xml><?xml version="1.0" encoding="utf-8"?>
-<p:sld xmlns:a="http://schemas.openxmlformats.org/drawingml/2006/main" xmlns:r="http://schemas.openxmlformats.org/officeDocument/2006/relationships" xmlns:p="http://schemas.openxmlformats.org/presentationml/2006/main">
-  <p:cSld>
-    <p:spTree>
-      <p:nvGrpSpPr>
-        <p:cNvPr id="1" name=""/>
-        <p:cNvGrpSpPr/>
-        <p:nvPr/>
-      </p:nvGrpSpPr>
-      <p:grpSpPr>
-        <a:xfrm>
-          <a:off x="0" y="0"/>
-          <a:ext cx="0" cy="0"/>
-          <a:chOff x="0" y="0"/>
-          <a:chExt cx="0" cy="0"/>
-        </a:xfrm>
-      </p:grpSpPr>
-      <p:sp>
-        <p:nvSpPr>
-          <p:cNvPr id="2" name="Title 1">
-            <a:extLst>
-              <a:ext uri="{FF2B5EF4-FFF2-40B4-BE49-F238E27FC236}">
                 <a16:creationId xmlns:a16="http://schemas.microsoft.com/office/drawing/2014/main" id="{FFB8ACCD-C5C1-4F5A-A96B-9D21C952FEC6}"/>
               </a:ext>
             </a:extLst>
@@ -10849,255 +11327,6 @@
     <p:extLst>
       <p:ext uri="{BB962C8B-B14F-4D97-AF65-F5344CB8AC3E}">
         <p14:creationId xmlns:p14="http://schemas.microsoft.com/office/powerpoint/2010/main" val="1213490250"/>
-      </p:ext>
-    </p:extLst>
-  </p:cSld>
-  <p:clrMapOvr>
-    <a:masterClrMapping/>
-  </p:clrMapOvr>
-</p:sld>
-</file>
-
-<file path=ppt/slides/slide17.xml><?xml version="1.0" encoding="utf-8"?>
-<p:sld xmlns:a="http://schemas.openxmlformats.org/drawingml/2006/main" xmlns:r="http://schemas.openxmlformats.org/officeDocument/2006/relationships" xmlns:p="http://schemas.openxmlformats.org/presentationml/2006/main">
-  <p:cSld>
-    <p:spTree>
-      <p:nvGrpSpPr>
-        <p:cNvPr id="1" name=""/>
-        <p:cNvGrpSpPr/>
-        <p:nvPr/>
-      </p:nvGrpSpPr>
-      <p:grpSpPr>
-        <a:xfrm>
-          <a:off x="0" y="0"/>
-          <a:ext cx="0" cy="0"/>
-          <a:chOff x="0" y="0"/>
-          <a:chExt cx="0" cy="0"/>
-        </a:xfrm>
-      </p:grpSpPr>
-      <p:sp>
-        <p:nvSpPr>
-          <p:cNvPr id="2" name="Title 1">
-            <a:extLst>
-              <a:ext uri="{FF2B5EF4-FFF2-40B4-BE49-F238E27FC236}">
-                <a16:creationId xmlns:a16="http://schemas.microsoft.com/office/drawing/2014/main" id="{A3E08952-633A-460F-B1A4-65A0D5F37DE3}"/>
-              </a:ext>
-            </a:extLst>
-          </p:cNvPr>
-          <p:cNvSpPr>
-            <a:spLocks noGrp="1"/>
-          </p:cNvSpPr>
-          <p:nvPr>
-            <p:ph type="title"/>
-          </p:nvPr>
-        </p:nvSpPr>
-        <p:spPr/>
-        <p:txBody>
-          <a:bodyPr/>
-          <a:lstStyle/>
-          <a:p>
-            <a:r>
-              <a:rPr lang="en-US" dirty="0"/>
-              <a:t>What should we use in the meantime</a:t>
-            </a:r>
-          </a:p>
-        </p:txBody>
-      </p:sp>
-      <p:sp>
-        <p:nvSpPr>
-          <p:cNvPr id="3" name="Content Placeholder 2">
-            <a:extLst>
-              <a:ext uri="{FF2B5EF4-FFF2-40B4-BE49-F238E27FC236}">
-                <a16:creationId xmlns:a16="http://schemas.microsoft.com/office/drawing/2014/main" id="{2FE1BCE0-F771-4C4E-91FF-739251ACC6C7}"/>
-              </a:ext>
-            </a:extLst>
-          </p:cNvPr>
-          <p:cNvSpPr>
-            <a:spLocks noGrp="1"/>
-          </p:cNvSpPr>
-          <p:nvPr>
-            <p:ph idx="1"/>
-          </p:nvPr>
-        </p:nvSpPr>
-        <p:spPr/>
-        <p:txBody>
-          <a:bodyPr/>
-          <a:lstStyle/>
-          <a:p>
-            <a:endParaRPr lang="en-US"/>
-          </a:p>
-        </p:txBody>
-      </p:sp>
-    </p:spTree>
-    <p:extLst>
-      <p:ext uri="{BB962C8B-B14F-4D97-AF65-F5344CB8AC3E}">
-        <p14:creationId xmlns:p14="http://schemas.microsoft.com/office/powerpoint/2010/main" val="1994256169"/>
-      </p:ext>
-    </p:extLst>
-  </p:cSld>
-  <p:clrMapOvr>
-    <a:masterClrMapping/>
-  </p:clrMapOvr>
-</p:sld>
-</file>
-
-<file path=ppt/slides/slide18.xml><?xml version="1.0" encoding="utf-8"?>
-<p:sld xmlns:a="http://schemas.openxmlformats.org/drawingml/2006/main" xmlns:r="http://schemas.openxmlformats.org/officeDocument/2006/relationships" xmlns:p="http://schemas.openxmlformats.org/presentationml/2006/main">
-  <p:cSld>
-    <p:spTree>
-      <p:nvGrpSpPr>
-        <p:cNvPr id="1" name=""/>
-        <p:cNvGrpSpPr/>
-        <p:nvPr/>
-      </p:nvGrpSpPr>
-      <p:grpSpPr>
-        <a:xfrm>
-          <a:off x="0" y="0"/>
-          <a:ext cx="0" cy="0"/>
-          <a:chOff x="0" y="0"/>
-          <a:chExt cx="0" cy="0"/>
-        </a:xfrm>
-      </p:grpSpPr>
-      <p:sp>
-        <p:nvSpPr>
-          <p:cNvPr id="2" name="Title 1">
-            <a:extLst>
-              <a:ext uri="{FF2B5EF4-FFF2-40B4-BE49-F238E27FC236}">
-                <a16:creationId xmlns:a16="http://schemas.microsoft.com/office/drawing/2014/main" id="{85C5ADE8-32C1-4782-81B7-93286D3BC14A}"/>
-              </a:ext>
-            </a:extLst>
-          </p:cNvPr>
-          <p:cNvSpPr>
-            <a:spLocks noGrp="1"/>
-          </p:cNvSpPr>
-          <p:nvPr>
-            <p:ph type="title"/>
-          </p:nvPr>
-        </p:nvSpPr>
-        <p:spPr/>
-        <p:txBody>
-          <a:bodyPr/>
-          <a:lstStyle/>
-          <a:p>
-            <a:r>
-              <a:rPr lang="en-US" dirty="0"/>
-              <a:t>What challenges are solvable today</a:t>
-            </a:r>
-          </a:p>
-        </p:txBody>
-      </p:sp>
-      <p:sp>
-        <p:nvSpPr>
-          <p:cNvPr id="3" name="Content Placeholder 2">
-            <a:extLst>
-              <a:ext uri="{FF2B5EF4-FFF2-40B4-BE49-F238E27FC236}">
-                <a16:creationId xmlns:a16="http://schemas.microsoft.com/office/drawing/2014/main" id="{B9DFDE2B-A5E4-4495-ADA1-B1E9AA43B275}"/>
-              </a:ext>
-            </a:extLst>
-          </p:cNvPr>
-          <p:cNvSpPr>
-            <a:spLocks noGrp="1"/>
-          </p:cNvSpPr>
-          <p:nvPr>
-            <p:ph idx="1"/>
-          </p:nvPr>
-        </p:nvSpPr>
-        <p:spPr/>
-        <p:txBody>
-          <a:bodyPr/>
-          <a:lstStyle/>
-          <a:p>
-            <a:endParaRPr lang="en-US"/>
-          </a:p>
-        </p:txBody>
-      </p:sp>
-    </p:spTree>
-    <p:extLst>
-      <p:ext uri="{BB962C8B-B14F-4D97-AF65-F5344CB8AC3E}">
-        <p14:creationId xmlns:p14="http://schemas.microsoft.com/office/powerpoint/2010/main" val="993575718"/>
-      </p:ext>
-    </p:extLst>
-  </p:cSld>
-  <p:clrMapOvr>
-    <a:masterClrMapping/>
-  </p:clrMapOvr>
-</p:sld>
-</file>
-
-<file path=ppt/slides/slide19.xml><?xml version="1.0" encoding="utf-8"?>
-<p:sld xmlns:a="http://schemas.openxmlformats.org/drawingml/2006/main" xmlns:r="http://schemas.openxmlformats.org/officeDocument/2006/relationships" xmlns:p="http://schemas.openxmlformats.org/presentationml/2006/main">
-  <p:cSld>
-    <p:spTree>
-      <p:nvGrpSpPr>
-        <p:cNvPr id="1" name=""/>
-        <p:cNvGrpSpPr/>
-        <p:nvPr/>
-      </p:nvGrpSpPr>
-      <p:grpSpPr>
-        <a:xfrm>
-          <a:off x="0" y="0"/>
-          <a:ext cx="0" cy="0"/>
-          <a:chOff x="0" y="0"/>
-          <a:chExt cx="0" cy="0"/>
-        </a:xfrm>
-      </p:grpSpPr>
-      <p:sp>
-        <p:nvSpPr>
-          <p:cNvPr id="2" name="Title 1">
-            <a:extLst>
-              <a:ext uri="{FF2B5EF4-FFF2-40B4-BE49-F238E27FC236}">
-                <a16:creationId xmlns:a16="http://schemas.microsoft.com/office/drawing/2014/main" id="{0B51CA48-56D2-47A1-A873-E67AB71F389F}"/>
-              </a:ext>
-            </a:extLst>
-          </p:cNvPr>
-          <p:cNvSpPr>
-            <a:spLocks noGrp="1"/>
-          </p:cNvSpPr>
-          <p:nvPr>
-            <p:ph type="title"/>
-          </p:nvPr>
-        </p:nvSpPr>
-        <p:spPr/>
-        <p:txBody>
-          <a:bodyPr/>
-          <a:lstStyle/>
-          <a:p>
-            <a:r>
-              <a:rPr lang="en-US" dirty="0"/>
-              <a:t>How do those solutions integrate into modern environments</a:t>
-            </a:r>
-          </a:p>
-        </p:txBody>
-      </p:sp>
-      <p:sp>
-        <p:nvSpPr>
-          <p:cNvPr id="3" name="Content Placeholder 2">
-            <a:extLst>
-              <a:ext uri="{FF2B5EF4-FFF2-40B4-BE49-F238E27FC236}">
-                <a16:creationId xmlns:a16="http://schemas.microsoft.com/office/drawing/2014/main" id="{F160C181-7F8F-40D2-B39C-59EA01BFA3E2}"/>
-              </a:ext>
-            </a:extLst>
-          </p:cNvPr>
-          <p:cNvSpPr>
-            <a:spLocks noGrp="1"/>
-          </p:cNvSpPr>
-          <p:nvPr>
-            <p:ph idx="1"/>
-          </p:nvPr>
-        </p:nvSpPr>
-        <p:spPr/>
-        <p:txBody>
-          <a:bodyPr/>
-          <a:lstStyle/>
-          <a:p>
-            <a:endParaRPr lang="en-US"/>
-          </a:p>
-        </p:txBody>
-      </p:sp>
-    </p:spTree>
-    <p:extLst>
-      <p:ext uri="{BB962C8B-B14F-4D97-AF65-F5344CB8AC3E}">
-        <p14:creationId xmlns:p14="http://schemas.microsoft.com/office/powerpoint/2010/main" val="251376630"/>
       </p:ext>
     </p:extLst>
   </p:cSld>

</xml_diff>

<commit_message>
update pptx with revised text
</commit_message>
<xml_diff>
--- a/Week6_CuttingEdge_Proposal/BachmeierNTIM7020-6.pptx
+++ b/Week6_CuttingEdge_Proposal/BachmeierNTIM7020-6.pptx
@@ -5,7 +5,7 @@
     <p:sldMasterId id="2147483648" r:id="rId1"/>
   </p:sldMasterIdLst>
   <p:notesMasterIdLst>
-    <p:notesMasterId r:id="rId16"/>
+    <p:notesMasterId r:id="rId17"/>
   </p:notesMasterIdLst>
   <p:sldIdLst>
     <p:sldId id="256" r:id="rId2"/>
@@ -22,6 +22,7 @@
     <p:sldId id="266" r:id="rId13"/>
     <p:sldId id="269" r:id="rId14"/>
     <p:sldId id="270" r:id="rId15"/>
+    <p:sldId id="275" r:id="rId16"/>
   </p:sldIdLst>
   <p:sldSz cx="12192000" cy="6858000"/>
   <p:notesSz cx="6858000" cy="9144000"/>
@@ -521,23 +522,6 @@
           <a:bodyPr/>
           <a:lstStyle/>
           <a:p>
-            <a:pPr marL="0" marR="0" lvl="0" indent="0" algn="l" defTabSz="914400" rtl="0" eaLnBrk="1" fontAlgn="auto" latinLnBrk="0" hangingPunct="1">
-              <a:lnSpc>
-                <a:spcPct val="100000"/>
-              </a:lnSpc>
-              <a:spcBef>
-                <a:spcPts val="0"/>
-              </a:spcBef>
-              <a:spcAft>
-                <a:spcPts val="0"/>
-              </a:spcAft>
-              <a:buClrTx/>
-              <a:buSzTx/>
-              <a:buFontTx/>
-              <a:buNone/>
-              <a:tabLst/>
-              <a:defRPr/>
-            </a:pPr>
             <a:r>
               <a:rPr lang="en-US" sz="1200" b="1" kern="1200" dirty="0">
                 <a:solidFill>
@@ -552,23 +536,6 @@
             </a:r>
           </a:p>
           <a:p>
-            <a:pPr marL="0" marR="0" lvl="0" indent="0" algn="l" defTabSz="914400" rtl="0" eaLnBrk="1" fontAlgn="auto" latinLnBrk="0" hangingPunct="1">
-              <a:lnSpc>
-                <a:spcPct val="100000"/>
-              </a:lnSpc>
-              <a:spcBef>
-                <a:spcPts val="0"/>
-              </a:spcBef>
-              <a:spcAft>
-                <a:spcPts val="0"/>
-              </a:spcAft>
-              <a:buClrTx/>
-              <a:buSzTx/>
-              <a:buFontTx/>
-              <a:buNone/>
-              <a:tabLst/>
-              <a:defRPr/>
-            </a:pPr>
             <a:r>
               <a:rPr lang="en-US" sz="1200" kern="1200" dirty="0">
                 <a:solidFill>
@@ -583,23 +550,6 @@
             </a:r>
           </a:p>
           <a:p>
-            <a:pPr marL="0" marR="0" lvl="0" indent="0" algn="l" defTabSz="914400" rtl="0" eaLnBrk="1" fontAlgn="auto" latinLnBrk="0" hangingPunct="1">
-              <a:lnSpc>
-                <a:spcPct val="100000"/>
-              </a:lnSpc>
-              <a:spcBef>
-                <a:spcPts val="0"/>
-              </a:spcBef>
-              <a:spcAft>
-                <a:spcPts val="0"/>
-              </a:spcAft>
-              <a:buClrTx/>
-              <a:buSzTx/>
-              <a:buFontTx/>
-              <a:buNone/>
-              <a:tabLst/>
-              <a:defRPr/>
-            </a:pPr>
             <a:endParaRPr lang="en-US" sz="1200" kern="1200" dirty="0">
               <a:solidFill>
                 <a:schemeClr val="tx1"/>
@@ -611,23 +561,6 @@
             </a:endParaRPr>
           </a:p>
           <a:p>
-            <a:pPr marL="0" marR="0" lvl="0" indent="0" algn="l" defTabSz="914400" rtl="0" eaLnBrk="1" fontAlgn="auto" latinLnBrk="0" hangingPunct="1">
-              <a:lnSpc>
-                <a:spcPct val="100000"/>
-              </a:lnSpc>
-              <a:spcBef>
-                <a:spcPts val="0"/>
-              </a:spcBef>
-              <a:spcAft>
-                <a:spcPts val="0"/>
-              </a:spcAft>
-              <a:buClrTx/>
-              <a:buSzTx/>
-              <a:buFontTx/>
-              <a:buNone/>
-              <a:tabLst/>
-              <a:defRPr/>
-            </a:pPr>
             <a:r>
               <a:rPr lang="en-US" sz="1200" b="1" kern="1200" dirty="0">
                 <a:solidFill>
@@ -642,23 +575,6 @@
             </a:r>
           </a:p>
           <a:p>
-            <a:pPr marL="0" marR="0" lvl="0" indent="0" algn="l" defTabSz="914400" rtl="0" eaLnBrk="1" fontAlgn="auto" latinLnBrk="0" hangingPunct="1">
-              <a:lnSpc>
-                <a:spcPct val="100000"/>
-              </a:lnSpc>
-              <a:spcBef>
-                <a:spcPts val="0"/>
-              </a:spcBef>
-              <a:spcAft>
-                <a:spcPts val="0"/>
-              </a:spcAft>
-              <a:buClrTx/>
-              <a:buSzTx/>
-              <a:buFontTx/>
-              <a:buNone/>
-              <a:tabLst/>
-              <a:defRPr/>
-            </a:pPr>
             <a:r>
               <a:rPr lang="en-US" sz="1200" kern="1200" dirty="0">
                 <a:solidFill>
@@ -669,58 +585,10 @@
                 <a:ea typeface="+mn-ea"/>
                 <a:cs typeface="+mn-cs"/>
               </a:rPr>
-              <a:t>When we asked the question a decade later, their answer would have changed include NoSQL technologies, like Mongo, as the emergence of ICBM (IoT, Cloud, Big Data, and Mobile) introduced specific challenges.  </a:t>
-            </a:r>
-          </a:p>
-          <a:p>
-            <a:pPr marL="0" marR="0" lvl="0" indent="0" algn="l" defTabSz="914400" rtl="0" eaLnBrk="1" fontAlgn="auto" latinLnBrk="0" hangingPunct="1">
-              <a:lnSpc>
-                <a:spcPct val="100000"/>
-              </a:lnSpc>
-              <a:spcBef>
-                <a:spcPts val="0"/>
-              </a:spcBef>
-              <a:spcAft>
-                <a:spcPts val="0"/>
-              </a:spcAft>
-              <a:buClrTx/>
-              <a:buSzTx/>
-              <a:buFontTx/>
-              <a:buNone/>
-              <a:tabLst/>
-              <a:defRPr/>
-            </a:pPr>
-            <a:r>
-              <a:rPr lang="en-US" sz="1200" kern="1200" dirty="0">
-                <a:solidFill>
-                  <a:schemeClr val="tx1"/>
-                </a:solidFill>
-                <a:effectLst/>
-                <a:latin typeface="+mn-lt"/>
-                <a:ea typeface="+mn-ea"/>
-                <a:cs typeface="+mn-cs"/>
-              </a:rPr>
-              <a:t>However, for many practitioners in 2010, these issues occurred in specific scenarios and were impractical to consider for daily workloads.  </a:t>
-            </a:r>
-          </a:p>
-          <a:p>
-            <a:pPr marL="0" marR="0" lvl="0" indent="0" algn="l" defTabSz="914400" rtl="0" eaLnBrk="1" fontAlgn="auto" latinLnBrk="0" hangingPunct="1">
-              <a:lnSpc>
-                <a:spcPct val="100000"/>
-              </a:lnSpc>
-              <a:spcBef>
-                <a:spcPts val="0"/>
-              </a:spcBef>
-              <a:spcAft>
-                <a:spcPts val="0"/>
-              </a:spcAft>
-              <a:buClrTx/>
-              <a:buSzTx/>
-              <a:buFontTx/>
-              <a:buNone/>
-              <a:tabLst/>
-              <a:defRPr/>
-            </a:pPr>
+              <a:t>When we re-ask the question a decade later, their answer would have changed to include NoSQL technologies, like Mongo, as the emergence of ICBM (IoT, Cloud, Big Data, and Mobile) introduced specific challenges.  However, for many practitioners in 2010, these issues occurred in specific scenarios and irrelevant to many daily workloads.  </a:t>
+            </a:r>
+          </a:p>
+          <a:p>
             <a:endParaRPr lang="en-US" sz="1200" kern="1200" dirty="0">
               <a:solidFill>
                 <a:schemeClr val="tx1"/>
@@ -732,23 +600,6 @@
             </a:endParaRPr>
           </a:p>
           <a:p>
-            <a:pPr marL="0" marR="0" lvl="0" indent="0" algn="l" defTabSz="914400" rtl="0" eaLnBrk="1" fontAlgn="auto" latinLnBrk="0" hangingPunct="1">
-              <a:lnSpc>
-                <a:spcPct val="100000"/>
-              </a:lnSpc>
-              <a:spcBef>
-                <a:spcPts val="0"/>
-              </a:spcBef>
-              <a:spcAft>
-                <a:spcPts val="0"/>
-              </a:spcAft>
-              <a:buClrTx/>
-              <a:buSzTx/>
-              <a:buFontTx/>
-              <a:buNone/>
-              <a:tabLst/>
-              <a:defRPr/>
-            </a:pPr>
             <a:r>
               <a:rPr lang="en-US" sz="1200" b="1" kern="1200" dirty="0">
                 <a:solidFill>
@@ -759,10 +610,12 @@
                 <a:ea typeface="+mn-ea"/>
                 <a:cs typeface="+mn-cs"/>
               </a:rPr>
-              <a:t>2020s</a:t>
-            </a:r>
-            <a:r>
-              <a:rPr lang="en-US" sz="1200" b="0" kern="1200" dirty="0">
+              <a:t>2020s…</a:t>
+            </a:r>
+          </a:p>
+          <a:p>
+            <a:r>
+              <a:rPr lang="en-US" sz="1200" kern="1200" dirty="0">
                 <a:solidFill>
                   <a:schemeClr val="tx1"/>
                 </a:solidFill>
@@ -771,38 +624,10 @@
                 <a:ea typeface="+mn-ea"/>
                 <a:cs typeface="+mn-cs"/>
               </a:rPr>
-              <a:t>…</a:t>
-            </a:r>
-            <a:endParaRPr lang="en-US" sz="1200" b="1" kern="1200" dirty="0">
-              <a:solidFill>
-                <a:schemeClr val="tx1"/>
-              </a:solidFill>
-              <a:effectLst/>
-              <a:latin typeface="+mn-lt"/>
-              <a:ea typeface="+mn-ea"/>
-              <a:cs typeface="+mn-cs"/>
-            </a:endParaRPr>
-          </a:p>
-          <a:p>
-            <a:pPr marL="0" marR="0" lvl="0" indent="0" algn="l" defTabSz="914400" rtl="0" eaLnBrk="1" fontAlgn="auto" latinLnBrk="0" hangingPunct="1">
-              <a:lnSpc>
-                <a:spcPct val="100000"/>
-              </a:lnSpc>
-              <a:spcBef>
-                <a:spcPts val="0"/>
-              </a:spcBef>
-              <a:spcAft>
-                <a:spcPts val="0"/>
-              </a:spcAft>
-              <a:buClrTx/>
-              <a:buSzTx/>
-              <a:buFontTx/>
-              <a:buNone/>
-              <a:tabLst/>
-              <a:defRPr/>
-            </a:pPr>
-            <a:r>
-              <a:rPr lang="en-US" sz="1200" kern="1200" dirty="0">
+              <a:t>Today, those same experts would agree that modern data architectures require combinations of technology that rely on various design trade-offs.  For instance, in-memory NoSQL stores, such as </a:t>
+            </a:r>
+            <a:r>
+              <a:rPr lang="en-US" sz="1200" kern="1200" dirty="0" err="1">
                 <a:solidFill>
                   <a:schemeClr val="tx1"/>
                 </a:solidFill>
@@ -811,10 +636,10 @@
                 <a:ea typeface="+mn-ea"/>
                 <a:cs typeface="+mn-cs"/>
               </a:rPr>
-              <a:t>Today, those same experts would agree that modern data architectures require combinations of technology that rely on various design trade-offs.  For instance, in-memory NoSQL stores, such as </a:t>
-            </a:r>
-            <a:r>
-              <a:rPr lang="en-US" sz="1200" kern="1200" dirty="0" err="1">
+              <a:t>ElasticSearch</a:t>
+            </a:r>
+            <a:r>
+              <a:rPr lang="en-US" sz="1200" kern="1200" dirty="0">
                 <a:solidFill>
                   <a:schemeClr val="tx1"/>
                 </a:solidFill>
@@ -823,39 +648,10 @@
                 <a:ea typeface="+mn-ea"/>
                 <a:cs typeface="+mn-cs"/>
               </a:rPr>
-              <a:t>ElasticSearch</a:t>
-            </a:r>
-            <a:r>
-              <a:rPr lang="en-US" sz="1200" kern="1200" dirty="0">
-                <a:solidFill>
-                  <a:schemeClr val="tx1"/>
-                </a:solidFill>
-                <a:effectLst/>
-                <a:latin typeface="+mn-lt"/>
-                <a:ea typeface="+mn-ea"/>
-                <a:cs typeface="+mn-cs"/>
-              </a:rPr>
-              <a:t>, allow for real-time data exploration versus Big Data platforms, such as Apache Hive, focus on longitudinal reporting through batch processing.  A critical advantage of these NoSQL stores comes with their ability to horizontally scale-out capacity.  </a:t>
-            </a:r>
-          </a:p>
-          <a:p>
-            <a:pPr marL="0" marR="0" lvl="0" indent="0" algn="l" defTabSz="914400" rtl="0" eaLnBrk="1" fontAlgn="auto" latinLnBrk="0" hangingPunct="1">
-              <a:lnSpc>
-                <a:spcPct val="100000"/>
-              </a:lnSpc>
-              <a:spcBef>
-                <a:spcPts val="0"/>
-              </a:spcBef>
-              <a:spcAft>
-                <a:spcPts val="0"/>
-              </a:spcAft>
-              <a:buClrTx/>
-              <a:buSzTx/>
-              <a:buFontTx/>
-              <a:buNone/>
-              <a:tabLst/>
-              <a:defRPr/>
-            </a:pPr>
+              <a:t>, allow for real-time data exploration versus Big Data platforms, such as Apache Hive, focus on longitudinal reporting through batch processing.  </a:t>
+            </a:r>
+          </a:p>
+          <a:p>
             <a:endParaRPr lang="en-US" sz="1200" kern="1200" dirty="0">
               <a:solidFill>
                 <a:schemeClr val="tx1"/>
@@ -867,23 +663,6 @@
             </a:endParaRPr>
           </a:p>
           <a:p>
-            <a:pPr marL="0" marR="0" lvl="0" indent="0" algn="l" defTabSz="914400" rtl="0" eaLnBrk="1" fontAlgn="auto" latinLnBrk="0" hangingPunct="1">
-              <a:lnSpc>
-                <a:spcPct val="100000"/>
-              </a:lnSpc>
-              <a:spcBef>
-                <a:spcPts val="0"/>
-              </a:spcBef>
-              <a:spcAft>
-                <a:spcPts val="0"/>
-              </a:spcAft>
-              <a:buClrTx/>
-              <a:buSzTx/>
-              <a:buFontTx/>
-              <a:buNone/>
-              <a:tabLst/>
-              <a:defRPr/>
-            </a:pPr>
             <a:r>
               <a:rPr lang="en-US" sz="1200" b="1" kern="1200" dirty="0">
                 <a:solidFill>
@@ -898,23 +677,6 @@
             </a:r>
           </a:p>
           <a:p>
-            <a:pPr marL="0" marR="0" lvl="0" indent="0" algn="l" defTabSz="914400" rtl="0" eaLnBrk="1" fontAlgn="auto" latinLnBrk="0" hangingPunct="1">
-              <a:lnSpc>
-                <a:spcPct val="100000"/>
-              </a:lnSpc>
-              <a:spcBef>
-                <a:spcPts val="0"/>
-              </a:spcBef>
-              <a:spcAft>
-                <a:spcPts val="0"/>
-              </a:spcAft>
-              <a:buClrTx/>
-              <a:buSzTx/>
-              <a:buFontTx/>
-              <a:buNone/>
-              <a:tabLst/>
-              <a:defRPr/>
-            </a:pPr>
             <a:r>
               <a:rPr lang="en-US" sz="1200" kern="1200" dirty="0">
                 <a:solidFill>
@@ -925,7 +687,7 @@
                 <a:ea typeface="+mn-ea"/>
                 <a:cs typeface="+mn-cs"/>
               </a:rPr>
-              <a:t>However, several studies show that the volume of ICBM data is doubling every year (Mansouri, </a:t>
+              <a:t>A critical advantage of these NoSQL stores comes with their ability to horizontally scale-out capacity.  However, several studies show that the volume of ICBM data is doubling every year (Mansouri, </a:t>
             </a:r>
             <a:r>
               <a:rPr lang="en-US" sz="1200" kern="1200" dirty="0" err="1">
@@ -973,7 +735,7 @@
                 <a:ea typeface="+mn-ea"/>
                 <a:cs typeface="+mn-cs"/>
               </a:rPr>
-              <a:t>, 2017), which means that a linear solution is attempting to solve an exponential problem.  Instead, a “fundamental paradigm shift ‘from 10x to 10</a:t>
+              <a:t>, 2017), so this linear solution will eventually fail to keep pace with the exponential data growth.  Instead, a “fundamental paradigm shift ‘from 10x to 10</a:t>
             </a:r>
             <a:r>
               <a:rPr lang="en-US" sz="1200" kern="1200" baseline="30000" dirty="0">
@@ -1023,106 +785,6 @@
               </a:rPr>
               <a:t> &amp; Kessler, 2019), like the one expected from quantum computing.”</a:t>
             </a:r>
-          </a:p>
-          <a:p>
-            <a:pPr marL="0" marR="0" lvl="0" indent="0" algn="l" defTabSz="914400" rtl="0" eaLnBrk="1" fontAlgn="auto" latinLnBrk="0" hangingPunct="1">
-              <a:lnSpc>
-                <a:spcPct val="100000"/>
-              </a:lnSpc>
-              <a:spcBef>
-                <a:spcPts val="0"/>
-              </a:spcBef>
-              <a:spcAft>
-                <a:spcPts val="0"/>
-              </a:spcAft>
-              <a:buClrTx/>
-              <a:buSzTx/>
-              <a:buFontTx/>
-              <a:buNone/>
-              <a:tabLst/>
-              <a:defRPr/>
-            </a:pPr>
-            <a:endParaRPr lang="en-US" sz="1200" kern="1200" dirty="0">
-              <a:solidFill>
-                <a:schemeClr val="tx1"/>
-              </a:solidFill>
-              <a:effectLst/>
-              <a:latin typeface="+mn-lt"/>
-              <a:ea typeface="+mn-ea"/>
-              <a:cs typeface="+mn-cs"/>
-            </a:endParaRPr>
-          </a:p>
-          <a:p>
-            <a:pPr marL="0" marR="0" lvl="0" indent="0" algn="l" defTabSz="914400" rtl="0" eaLnBrk="1" fontAlgn="auto" latinLnBrk="0" hangingPunct="1">
-              <a:lnSpc>
-                <a:spcPct val="100000"/>
-              </a:lnSpc>
-              <a:spcBef>
-                <a:spcPts val="0"/>
-              </a:spcBef>
-              <a:spcAft>
-                <a:spcPts val="0"/>
-              </a:spcAft>
-              <a:buClrTx/>
-              <a:buSzTx/>
-              <a:buFontTx/>
-              <a:buNone/>
-              <a:tabLst/>
-              <a:defRPr/>
-            </a:pPr>
-            <a:endParaRPr lang="en-US" sz="1200" b="1" kern="1200" dirty="0">
-              <a:solidFill>
-                <a:schemeClr val="tx1"/>
-              </a:solidFill>
-              <a:effectLst/>
-              <a:latin typeface="+mn-lt"/>
-              <a:ea typeface="+mn-ea"/>
-              <a:cs typeface="+mn-cs"/>
-            </a:endParaRPr>
-          </a:p>
-          <a:p>
-            <a:pPr marL="0" marR="0" lvl="0" indent="0" algn="l" defTabSz="914400" rtl="0" eaLnBrk="1" fontAlgn="auto" latinLnBrk="0" hangingPunct="1">
-              <a:lnSpc>
-                <a:spcPct val="100000"/>
-              </a:lnSpc>
-              <a:spcBef>
-                <a:spcPts val="0"/>
-              </a:spcBef>
-              <a:spcAft>
-                <a:spcPts val="0"/>
-              </a:spcAft>
-              <a:buClrTx/>
-              <a:buSzTx/>
-              <a:buFontTx/>
-              <a:buNone/>
-              <a:tabLst/>
-              <a:defRPr/>
-            </a:pPr>
-            <a:r>
-              <a:rPr lang="en-US" sz="1200" b="1" kern="1200" dirty="0">
-                <a:solidFill>
-                  <a:schemeClr val="tx1"/>
-                </a:solidFill>
-                <a:effectLst/>
-                <a:latin typeface="+mn-lt"/>
-                <a:ea typeface="+mn-ea"/>
-                <a:cs typeface="+mn-cs"/>
-              </a:rPr>
-              <a:t>Note</a:t>
-            </a:r>
-            <a:r>
-              <a:rPr lang="en-US" sz="1200" kern="1200" dirty="0">
-                <a:solidFill>
-                  <a:schemeClr val="tx1"/>
-                </a:solidFill>
-                <a:effectLst/>
-                <a:latin typeface="+mn-lt"/>
-                <a:ea typeface="+mn-ea"/>
-                <a:cs typeface="+mn-cs"/>
-              </a:rPr>
-              <a:t>: The qualitative measurements are for illustrative purposes of the evolution and not intended represent literal values.</a:t>
-            </a:r>
-            <a:endParaRPr lang="en-US" dirty="0"/>
           </a:p>
         </p:txBody>
       </p:sp>
@@ -1216,7 +878,7 @@
                 <a:ea typeface="+mn-ea"/>
                 <a:cs typeface="+mn-cs"/>
               </a:rPr>
-              <a:t>What is Supremacy</a:t>
+              <a:t>What is quantum supremacy</a:t>
             </a:r>
           </a:p>
           <a:p>
@@ -1254,7 +916,7 @@
                 <a:ea typeface="+mn-ea"/>
                 <a:cs typeface="+mn-cs"/>
               </a:rPr>
-              <a:t> and Kessler (2019), the task does not need to be interesting or useful, and any proof of concept is enough.  An extension of this idea resides in quantum database supremacy, which occurs when a quantum database can exceed the capabilities of classical databases.  </a:t>
+              <a:t> and Kessler (2019), the task does not need to be interesting or useful, and any proof of concept is sufficient.  An extension of this idea resides in quantum database supremacy, which occurs when a quantum database can exceed the capabilities of a classical database.  </a:t>
             </a:r>
           </a:p>
           <a:p>
@@ -1279,7 +941,7 @@
                 <a:ea typeface="+mn-ea"/>
                 <a:cs typeface="+mn-cs"/>
               </a:rPr>
-              <a:t>Where is this likely to happen first</a:t>
+              <a:t>What aspects will this influence first</a:t>
             </a:r>
           </a:p>
           <a:p>
@@ -1317,7 +979,7 @@
                 <a:ea typeface="+mn-ea"/>
                 <a:cs typeface="+mn-cs"/>
               </a:rPr>
-              <a:t> &amp; Kessler, 2019), optimization problems (Harrison, 2020), and unsorted datasets (Grover, 1996).  There are other areas, such as fetching an indexed row,  that will be difficult to exceed classically designed systems because the algorithms are already extremely efficient and can rely on known insights into the data structure.  </a:t>
+              <a:t> &amp; Kessler, 2019), optimization problems (Harrison, 2020), and unsorted datasets (Grover, 1996).  There are other areas, such as fetching an indexed row,  that will be difficult to exceed classically designed systems because the algorithms are already extremely efficient and due to known insights about the data’s structure.  </a:t>
             </a:r>
           </a:p>
           <a:p>
@@ -1342,7 +1004,7 @@
                 <a:ea typeface="+mn-ea"/>
                 <a:cs typeface="+mn-cs"/>
               </a:rPr>
-              <a:t>How could a hybrid strategy upfold</a:t>
+              <a:t>How these technical constraints impact design</a:t>
             </a:r>
           </a:p>
           <a:p>
@@ -1381,7 +1043,7 @@
                 <a:ea typeface="+mn-ea"/>
                 <a:cs typeface="+mn-cs"/>
               </a:rPr>
-              <a:t>What about GPU</a:t>
+              <a:t>What overlap exists with existing hardware acceleration solutions</a:t>
             </a:r>
           </a:p>
           <a:p>
@@ -1395,7 +1057,7 @@
                 <a:ea typeface="+mn-ea"/>
                 <a:cs typeface="+mn-cs"/>
               </a:rPr>
-              <a:t>Some scientific enterprises are already adopting Graph Processing Units (GPU) to accelerate their databases (</a:t>
+              <a:t>Some scientific enterprises are already adopting General Purpose Graph Processing Units (GPGPU) to accelerate their databases (</a:t>
             </a:r>
             <a:r>
               <a:rPr lang="en-US" sz="1200" kern="1200" dirty="0" err="1">
@@ -1467,7 +1129,7 @@
                 <a:ea typeface="+mn-ea"/>
                 <a:cs typeface="+mn-cs"/>
               </a:rPr>
-              <a:t>, 2017), which introduces another dimension to the complexity of the procurement process.  Both QPU and GPU technologies specialize in transforming matrices though they will have different performance and cost characteristics.</a:t>
+              <a:t>, 2017) and will need to consider the trade-off of GPGPU/QPU technologies as there will be overlap across the problem space.  For instance, both accelerators can perform complex matrix arithmetic.  While GPGPU has a lower price point and well-entrenched frameworks, e.g., OpenCL,  QPU allows for wildcards semantics through massively parallel entanglement processing.  These differences might lead the organization to use a heterogeneous solution, such as GPGPU cards on general processing nodes, and reserve QPU circuits for expert systems.</a:t>
             </a:r>
           </a:p>
         </p:txBody>
@@ -1562,7 +1224,7 @@
                 <a:ea typeface="+mn-ea"/>
                 <a:cs typeface="+mn-cs"/>
               </a:rPr>
-              <a:t>What is a Qubit</a:t>
+              <a:t>What is a Qubit and Entanglement</a:t>
             </a:r>
           </a:p>
           <a:p>
@@ -1576,7 +1238,7 @@
                 <a:ea typeface="+mn-ea"/>
                 <a:cs typeface="+mn-cs"/>
               </a:rPr>
-              <a:t>A traditional computer operates on bits, which can hold a discrete value of either on or off.  In contrast, a quantum bit or Qubit can hold a superposition that expresses two distinct probabilities of being on and off simultaneously.  These probabilities can become </a:t>
+              <a:t>A traditional computer operates on bits that hold a discrete value of either on or off.  In contrast, a quantum bit or Qubit holds a superposition that expresses two distinct probabilities of being on and off simultaneously.  These probabilities can become </a:t>
             </a:r>
             <a:r>
               <a:rPr lang="en-US" sz="1200" i="1" kern="1200" dirty="0">
@@ -1600,7 +1262,7 @@
                 <a:ea typeface="+mn-ea"/>
                 <a:cs typeface="+mn-cs"/>
               </a:rPr>
-              <a:t> with other qubits where the resolved state of (A) cascades into (B) and (C).  </a:t>
+              <a:t> with other qubits such that the resolved state of (A) cascades into (B) and (C).  Until that resolution occurs, these entangled values can act as wildcards that pipeline many potential futures calculations in a deferred execution state.  </a:t>
             </a:r>
           </a:p>
           <a:p>
@@ -1625,7 +1287,7 @@
                 <a:ea typeface="+mn-ea"/>
                 <a:cs typeface="+mn-cs"/>
               </a:rPr>
-              <a:t>How does entanglement work</a:t>
+              <a:t>What is an analogy to this construct</a:t>
             </a:r>
           </a:p>
           <a:p>
@@ -1639,7 +1301,7 @@
                 <a:ea typeface="+mn-ea"/>
                 <a:cs typeface="+mn-cs"/>
               </a:rPr>
-              <a:t>Until that resolution occurs, these entangled values can act as wildcards that connect many potential futures.  Consider the analogy that Alice has a 90% chance (amplitude) of paying Bill, and Bill might go to a movie will Charlie if Alice pays him—thus whether Charlie sees the movie with Bill is dependent (entangled) with Alice.  This quantum circuit can be modeled with Hadamard Gates, which are analogous to logic gates on traditional hardware (</a:t>
+              <a:t>Consider the analogy that Alice has a 90% chance (amplitude) of paying Bill, and Bill might go to a movie with Charlie; provided Alice pays him—thus whether Charlie sees the movie with Bill is dependent (entangled) with Alice.  Quantum circuits can use a series of Hadamard Gates to model this relationship in a pattern analogous to logic gates on traditional silicon (</a:t>
             </a:r>
             <a:r>
               <a:rPr lang="en-US" sz="1200" kern="1200" dirty="0" err="1">
@@ -1711,7 +1373,7 @@
                 <a:ea typeface="+mn-ea"/>
                 <a:cs typeface="+mn-cs"/>
               </a:rPr>
-              <a:t>, 2010).</a:t>
+              <a:t>, 2010).  There are multiple possible outcomes, though once Charlie calls Bill to confirm is going, the circuit executes exactly-once, and that becomes the reality of their movie night.</a:t>
             </a:r>
           </a:p>
           <a:p>
@@ -1736,7 +1398,7 @@
                 <a:ea typeface="+mn-ea"/>
                 <a:cs typeface="+mn-cs"/>
               </a:rPr>
-              <a:t>Bringing it back to data management</a:t>
+              <a:t>What is an example where this applies to data management</a:t>
             </a:r>
           </a:p>
           <a:p>
@@ -1750,7 +1412,7 @@
                 <a:ea typeface="+mn-ea"/>
                 <a:cs typeface="+mn-cs"/>
               </a:rPr>
-              <a:t>Similar problems occur in various data management scenarios, such as transactions, where the committed result becomes entangled with processing results.  That is fundamentally different than traditional systems that rely on more acts such as locking and stacked storage constructs (Mansouri, </a:t>
+              <a:t>Transaction management on traditional database systems uses locking or stacked storage constructs (Mansouri, </a:t>
             </a:r>
             <a:r>
               <a:rPr lang="en-US" sz="1200" kern="1200" dirty="0" err="1">
@@ -1798,7 +1460,7 @@
                 <a:ea typeface="+mn-ea"/>
                 <a:cs typeface="+mn-cs"/>
               </a:rPr>
-              <a:t>, 2017).  Through the elimination of blocking and I/O intensive actions, the database could potentially scale to higher numbers of transactions. Mansouri et al. highlight that a key driver of workloads into eventual consistency solutions is to lessen the influence of transaction locking.  However, fundamentally reducing this characteristic could push adoption back into strongly consistent technologies.</a:t>
+              <a:t>, 2017).  These approaches introduce blocking and excessive I/O operations, as the layers are merged during the commit phase.  However, quantum databases could handle this scenario fundamentally different by directly entangling the state of the transaction with the existing data.  When the transaction completes, the entangled values are associated with the commit state, like Charlie calling Bill.</a:t>
             </a:r>
           </a:p>
           <a:p>
@@ -1813,7 +1475,32 @@
             </a:endParaRPr>
           </a:p>
           <a:p>
-            <a:endParaRPr lang="en-US" dirty="0"/>
+            <a:r>
+              <a:rPr lang="en-US" sz="1200" b="1" kern="1200" dirty="0">
+                <a:solidFill>
+                  <a:schemeClr val="tx1"/>
+                </a:solidFill>
+                <a:effectLst/>
+                <a:latin typeface="+mn-lt"/>
+                <a:ea typeface="+mn-ea"/>
+                <a:cs typeface="+mn-cs"/>
+              </a:rPr>
+              <a:t>How does would that improve data management scalability</a:t>
+            </a:r>
+          </a:p>
+          <a:p>
+            <a:r>
+              <a:rPr lang="en-US" sz="1200" kern="1200" dirty="0">
+                <a:solidFill>
+                  <a:schemeClr val="tx1"/>
+                </a:solidFill>
+                <a:effectLst/>
+                <a:latin typeface="+mn-lt"/>
+                <a:ea typeface="+mn-ea"/>
+                <a:cs typeface="+mn-cs"/>
+              </a:rPr>
+              <a:t>Using strategies along these lines could eliminate specific blocking and rollback challenges, enabling more concurrent transactions over fewer resources.  As strongly consistent transactional stores become more competitive with the performance characteristics of eventual consistent stores, it could slow down the migration away from these legacy systems.  Some argue that systems that can maintain strong consistency guarantees are more reliable and encounter lower maintenance costs (Liu, Arden, George, &amp; Myers, 2017). </a:t>
+            </a:r>
           </a:p>
         </p:txBody>
       </p:sp>
@@ -1921,31 +1608,7 @@
                 <a:ea typeface="+mn-ea"/>
                 <a:cs typeface="+mn-cs"/>
               </a:rPr>
-              <a:t>Quantum database theory often builds on Grover’s </a:t>
-            </a:r>
-            <a:r>
-              <a:rPr lang="en-US" sz="1200" i="1" kern="1200" dirty="0">
-                <a:solidFill>
-                  <a:schemeClr val="tx1"/>
-                </a:solidFill>
-                <a:effectLst/>
-                <a:latin typeface="+mn-lt"/>
-                <a:ea typeface="+mn-ea"/>
-                <a:cs typeface="+mn-cs"/>
-              </a:rPr>
-              <a:t>fast quantum mechanical algorithm for database search </a:t>
-            </a:r>
-            <a:r>
-              <a:rPr lang="en-US" sz="1200" kern="1200" dirty="0">
-                <a:solidFill>
-                  <a:schemeClr val="tx1"/>
-                </a:solidFill>
-                <a:effectLst/>
-                <a:latin typeface="+mn-lt"/>
-                <a:ea typeface="+mn-ea"/>
-                <a:cs typeface="+mn-cs"/>
-              </a:rPr>
-              <a:t>(1996).   His algorithm can find a specific value from an unordered set in exactly sqrt(N) steps.  Consider the scenario where a million IoT sensors emit thousands of data points every few seconds continuously, resulting in 100 trillion records in the data lake.  If the analysis needs to filter on an unindexed attribute, then the query could take a very long time to complete.  However, the application of a Grover search would reduce the search space to only ten million steps, a large but manageable feat.</a:t>
+              <a:t>Quantum database theories often build on Grover’s fast quantum mechanical algorithm for database search, a generic solution that finds a specific value in an unordered set in exactly sqrt(N) steps.  Consider the scenario where a million IoT sensors emit thousands of data points every few seconds continuously, resulting in 100 trillion records in the data lake.  If the analysis needs to filter on an unindexed attribute, then the query would take an average time of 50 trillion (N/2) steps to complete.  However, the application of a Grover search reduces the search space to only ten million steps, a large but manageable feat.</a:t>
             </a:r>
           </a:p>
           <a:p>
@@ -1970,7 +1633,7 @@
                 <a:ea typeface="+mn-ea"/>
                 <a:cs typeface="+mn-cs"/>
               </a:rPr>
-              <a:t>What is an analogy for Grover</a:t>
+              <a:t>What is an analogy to understand Grover’s search</a:t>
             </a:r>
           </a:p>
           <a:p>
@@ -1984,7 +1647,7 @@
                 <a:ea typeface="+mn-ea"/>
                 <a:cs typeface="+mn-cs"/>
               </a:rPr>
-              <a:t>To understand Grover’s search, imagine trying to find a ball contained within one of ten identical boxes. Initially, there’s a ten percent chance of randomly selecting the correct choice.  Then each box is shaken horizontally, causing boxes 3, 6, and 9 to rattle, so the amplitude (probability) increases for these boxes.  Next, the boxes are shaken vertically and at various angles.  As each iteration completes, more evidence accumulates that the probability that, e.g., box 7, is the correct instance.</a:t>
+              <a:t>To understand Grover’s search, imagine trying to find a ball contained within one of ten identical boxes. Initially, there’s a ten percent chance of randomly selecting the correct choice.  First, each box passes through an oracle (e.g., shaken horizontally), causing boxes (3, 6, and 9) to rattle, so the amplitude (probability) increases for these boxes.  Next, the boxes iterate through the oracle (e.g., shaken at various angles) two more times.  As each iteration completes, more evidence accumulates in the form of increased probability toward one of the boxes, allowing it to be selected correctly.  De la Guardia(2016) lectures more concretely on the mechanics of this transform and visually explains the geometry involved.</a:t>
             </a:r>
           </a:p>
           <a:p>
@@ -2023,7 +1686,7 @@
                 <a:ea typeface="+mn-ea"/>
                 <a:cs typeface="+mn-cs"/>
               </a:rPr>
-              <a:t>Similar problems exist in distributed storage scenarios, where user records reside on arbitrary nodes.  Today, retrieving those values requires a distributed hash algorithm or a secondary index (Mansouri, </a:t>
+              <a:t>Similar problems exist in distributed storage scenarios, where user records are load-balanced across various cluster nodes.  Efficiently retrieving those records requires a distributed hash algorithm or a secondary index (Mansouri, </a:t>
             </a:r>
             <a:r>
               <a:rPr lang="en-US" sz="1200" kern="1200" dirty="0" err="1">
@@ -2071,11 +1734,8 @@
                 <a:ea typeface="+mn-ea"/>
                 <a:cs typeface="+mn-cs"/>
               </a:rPr>
-              <a:t>, 2017).  However, it can be economically prohibitive to index every value, which further leads to the need for discovery after creation.  Specific technologies, like Apache Lucene, expose term indexing to improve the costs and performance of these scenarios today, though the deployment relies on an entirely separate second data store.  In a quantum-accelerated system, a redundant copy and the synchronization overhead does not need to exist.</a:t>
-            </a:r>
-          </a:p>
-          <a:p>
-            <a:endParaRPr lang="en-US" dirty="0"/>
+              <a:t>, 2017).  However, it can be economically prohibitive to index every value, which leads to the need for discovery protocols in certain scenarios.  Using a quantum-accelerated system could provide that ad-hoc discovery in a reasonable length of time.  Alternative classical data management technologies, like Apache Lucene, construct reverse term indexes to address these challenges, but its deployment relies on an entirely separate cluster.  </a:t>
+            </a:r>
           </a:p>
         </p:txBody>
       </p:sp>
@@ -2183,9 +1843,86 @@
                 <a:ea typeface="+mn-ea"/>
                 <a:cs typeface="+mn-cs"/>
               </a:rPr>
-              <a:t>The primary strength of quantum databases comes in their ability to encode sequences of potential future values.  Consider an aggregation pipeline that sequences a series of qubits such that various permutations are solvable in parallel.  This optimization reduces the I/O requirements on the query engine and provides a richer experience for the customer.  Another scenario might involve fuzzy matching and approximation, like neural networks today, to make recommendations or propose classifications.  In contrast, typical data machine learning workflows are complex due to the decoupling of storage and machine learning platform.  This separation creates the need for extract-transform-load systems that can become unwieldy (Harrison, 2020).  Another benefit comes from the performance improvements through Grover searches, which could allow natural joins could become part of the NoSQL toolset, further reducing the learning curve for traditional SQL users.</a:t>
-            </a:r>
-            <a:endParaRPr lang="en-US" dirty="0"/>
+              <a:t>The primary strength of quantum databases comes from its ability to encode sequences of parallel potential future values.  Consider an aggregation pipeline that contains a series of qubits such that multiple permutations are solvable in parallel.  This optimization reduces the I/O requirements on the query engine and provides a more responsive experience to the customer.  </a:t>
+            </a:r>
+          </a:p>
+          <a:p>
+            <a:endParaRPr lang="en-US" sz="1200" kern="1200" dirty="0">
+              <a:solidFill>
+                <a:schemeClr val="tx1"/>
+              </a:solidFill>
+              <a:effectLst/>
+              <a:latin typeface="+mn-lt"/>
+              <a:ea typeface="+mn-ea"/>
+              <a:cs typeface="+mn-cs"/>
+            </a:endParaRPr>
+          </a:p>
+          <a:p>
+            <a:r>
+              <a:rPr lang="en-US" sz="1200" b="1" kern="1200" dirty="0">
+                <a:solidFill>
+                  <a:schemeClr val="tx1"/>
+                </a:solidFill>
+                <a:effectLst/>
+                <a:latin typeface="+mn-lt"/>
+                <a:ea typeface="+mn-ea"/>
+                <a:cs typeface="+mn-cs"/>
+              </a:rPr>
+              <a:t>How else could it improve maintainability of the business intelligence systems</a:t>
+            </a:r>
+          </a:p>
+          <a:p>
+            <a:r>
+              <a:rPr lang="en-US" sz="1200" kern="1200" dirty="0">
+                <a:solidFill>
+                  <a:schemeClr val="tx1"/>
+                </a:solidFill>
+                <a:effectLst/>
+                <a:latin typeface="+mn-lt"/>
+                <a:ea typeface="+mn-ea"/>
+                <a:cs typeface="+mn-cs"/>
+              </a:rPr>
+              <a:t>Another scenario might involve fuzzy matching and approximation, like neural networks, for making recommendations and proposing classifications.  Because these operations are native to the quantum database, there certain extract-transform-load operations that are no longer needed.  Traditional systems decouple the storage and machine learning platform, forcing engineers to manage analytic pipelines that become unwieldy in practice (Harrison, 2020). </a:t>
+            </a:r>
+          </a:p>
+          <a:p>
+            <a:endParaRPr lang="en-US" sz="1200" kern="1200" dirty="0">
+              <a:solidFill>
+                <a:schemeClr val="tx1"/>
+              </a:solidFill>
+              <a:effectLst/>
+              <a:latin typeface="+mn-lt"/>
+              <a:ea typeface="+mn-ea"/>
+              <a:cs typeface="+mn-cs"/>
+            </a:endParaRPr>
+          </a:p>
+          <a:p>
+            <a:r>
+              <a:rPr lang="en-US" sz="1200" b="1" kern="1200" dirty="0">
+                <a:solidFill>
+                  <a:schemeClr val="tx1"/>
+                </a:solidFill>
+                <a:effectLst/>
+                <a:latin typeface="+mn-lt"/>
+                <a:ea typeface="+mn-ea"/>
+                <a:cs typeface="+mn-cs"/>
+              </a:rPr>
+              <a:t>Are there additional benefits to this approach</a:t>
+            </a:r>
+          </a:p>
+          <a:p>
+            <a:r>
+              <a:rPr lang="en-US" sz="1200" kern="1200" dirty="0">
+                <a:solidFill>
+                  <a:schemeClr val="tx1"/>
+                </a:solidFill>
+                <a:effectLst/>
+                <a:latin typeface="+mn-lt"/>
+                <a:ea typeface="+mn-ea"/>
+                <a:cs typeface="+mn-cs"/>
+              </a:rPr>
+              <a:t>Another benefit comes from the performance improvements through Grover searches, bringing natural joins back into the NoSQL toolset, further reducing the learning curve for traditional SQL users.</a:t>
+            </a:r>
           </a:p>
         </p:txBody>
       </p:sp>
@@ -2279,7 +2016,7 @@
                 <a:ea typeface="+mn-ea"/>
                 <a:cs typeface="+mn-cs"/>
               </a:rPr>
-              <a:t>Limitation: It’s mostly theoretical</a:t>
+              <a:t>Limitation: This is all theoretical</a:t>
             </a:r>
           </a:p>
           <a:p>
@@ -2293,7 +2030,7 @@
                 <a:ea typeface="+mn-ea"/>
                 <a:cs typeface="+mn-cs"/>
               </a:rPr>
-              <a:t>A critical hindrance to quantum databases is they only exist in mathematical proofs, and it will be several years before these concepts become mainstream, despite Quantum as a Service (</a:t>
+              <a:t>A critical hindrance to quantum databases is they only exist in mathematical proofs, and despite Quantum as a Service (</a:t>
             </a:r>
             <a:r>
               <a:rPr lang="en-US" sz="1200" kern="1200" dirty="0" err="1">
@@ -2317,7 +2054,7 @@
                 <a:ea typeface="+mn-ea"/>
                 <a:cs typeface="+mn-cs"/>
               </a:rPr>
-              <a:t>) solutions like Azure Quantum and Amazon Bracket.  According to </a:t>
+              <a:t>) solutions like Azure Quantum and Amazon Bracket, it will be several years before these concepts become mainstream.  According to </a:t>
             </a:r>
             <a:r>
               <a:rPr lang="en-US" sz="1200" kern="1200" dirty="0" err="1">
@@ -2341,7 +2078,7 @@
                 <a:ea typeface="+mn-ea"/>
                 <a:cs typeface="+mn-cs"/>
               </a:rPr>
-              <a:t> (2019), many non-trivial algorithms need between 100 to 500 qubits, assuming error-free storage and mitigate random bit flipping similar to traditional random-access memory (RAM).  Redundant encoding schemes, such as using three bits and a majority-wins voting protocol, cause the algorithms to need 0.5 to 1.0 million qubits.  There are also limitations in simulation, as the entanglement of long qubit strings requires enormous amounts of storage, e.g., 50 qubits equals 16 petabytes.</a:t>
+              <a:t> (2019), many non-trivial algorithms need between 100 to 500 qubits, assuming error-free storage and external mitigation against random bit flipping, like traditional random-access memory (RAM).  Redundant encoding schemes, such as using three bits and a majority-wins voting protocol, are currently the de facto solution and cause the algorithms to need 0.5 to 1.0 million qubits.  There are also limitations in simulation, as the entanglement of long qubit strings requires enormous amounts of storage, e.g., 50 qubits requires up to 16 petabytes.</a:t>
             </a:r>
           </a:p>
           <a:p>
@@ -2366,7 +2103,7 @@
                 <a:ea typeface="+mn-ea"/>
                 <a:cs typeface="+mn-cs"/>
               </a:rPr>
-              <a:t>Limitation: Existing technologies are better understood</a:t>
+              <a:t>Limitation: Process</a:t>
             </a:r>
           </a:p>
           <a:p>
@@ -2380,11 +2117,110 @@
                 <a:ea typeface="+mn-ea"/>
                 <a:cs typeface="+mn-cs"/>
               </a:rPr>
-              <a:t>Aside from the technical challenges of building a reliable QPU, there is also the need for this technology to reach supremacy.  Data scientists can perform approximations and machine learning offline at relatively low costs, and GPU acceleration cards are readily available today.  Public cloud providers, such as Amazon Web Services (AWS), support a notion of Elastic Interference Interfaces (EII) that can dynamically add and remove GPUs to hosted databases to meet demand fluctuations.  Engineering teams also lack the training to take advantage of complex physics algorithms and providing that education would remove focus from the organization’s core competencies.  Database administrators are also squeezing comparable performance from their system by optimizing indexes and data partitions around business questions.  For instance, analyzing a trillion sensor data points is less of an issue if the storage grouped those values into time-ordered blocks—allowing for exclusion of entire ranges during the pre-query phase.</a:t>
-            </a:r>
-          </a:p>
-          <a:p>
-            <a:endParaRPr lang="en-US" dirty="0"/>
+              <a:t>Aside from the technical challenges of building reliable QPU circuits, the technology also needs to reach a state of supremacy.  </a:t>
+            </a:r>
+          </a:p>
+          <a:p>
+            <a:endParaRPr lang="en-US" sz="1200" kern="1200" dirty="0">
+              <a:solidFill>
+                <a:schemeClr val="tx1"/>
+              </a:solidFill>
+              <a:effectLst/>
+              <a:latin typeface="+mn-lt"/>
+              <a:ea typeface="+mn-ea"/>
+              <a:cs typeface="+mn-cs"/>
+            </a:endParaRPr>
+          </a:p>
+          <a:p>
+            <a:pPr marL="228600" indent="-228600">
+              <a:buAutoNum type="arabicPeriod"/>
+            </a:pPr>
+            <a:r>
+              <a:rPr lang="en-US" sz="1200" kern="1200" dirty="0">
+                <a:solidFill>
+                  <a:schemeClr val="tx1"/>
+                </a:solidFill>
+                <a:effectLst/>
+                <a:latin typeface="+mn-lt"/>
+                <a:ea typeface="+mn-ea"/>
+                <a:cs typeface="+mn-cs"/>
+              </a:rPr>
+              <a:t>Data scientists can perform approximations and machine learning offline at relatively low costs, and GPGPU acceleration cards are readily available for other matrix computations.  Public cloud providers, such as Amazon Web Services (AWS), support a notion of Elastic Interference Interfaces (EII) that can dynamically add and remove GPGPUs to hosted databases as customer demands fluctuation.</a:t>
+            </a:r>
+            <a:br>
+              <a:rPr lang="en-US" sz="1200" kern="1200" dirty="0">
+                <a:solidFill>
+                  <a:schemeClr val="tx1"/>
+                </a:solidFill>
+                <a:effectLst/>
+                <a:latin typeface="+mn-lt"/>
+                <a:ea typeface="+mn-ea"/>
+                <a:cs typeface="+mn-cs"/>
+              </a:rPr>
+            </a:br>
+            <a:endParaRPr lang="en-US" sz="1200" kern="1200" dirty="0">
+              <a:solidFill>
+                <a:schemeClr val="tx1"/>
+              </a:solidFill>
+              <a:effectLst/>
+              <a:latin typeface="+mn-lt"/>
+              <a:ea typeface="+mn-ea"/>
+              <a:cs typeface="+mn-cs"/>
+            </a:endParaRPr>
+          </a:p>
+          <a:p>
+            <a:pPr marL="228600" indent="-228600">
+              <a:buAutoNum type="arabicPeriod"/>
+            </a:pPr>
+            <a:r>
+              <a:rPr lang="en-US" sz="1200" kern="1200" dirty="0">
+                <a:solidFill>
+                  <a:schemeClr val="tx1"/>
+                </a:solidFill>
+                <a:effectLst/>
+                <a:latin typeface="+mn-lt"/>
+                <a:ea typeface="+mn-ea"/>
+                <a:cs typeface="+mn-cs"/>
+              </a:rPr>
+              <a:t>Engineering teams also lack the training to take advantage of complex physics algorithms and providing that education would detract focus from the organization’s core competencies.  </a:t>
+            </a:r>
+            <a:br>
+              <a:rPr lang="en-US" sz="1200" kern="1200" dirty="0">
+                <a:solidFill>
+                  <a:schemeClr val="tx1"/>
+                </a:solidFill>
+                <a:effectLst/>
+                <a:latin typeface="+mn-lt"/>
+                <a:ea typeface="+mn-ea"/>
+                <a:cs typeface="+mn-cs"/>
+              </a:rPr>
+            </a:br>
+            <a:endParaRPr lang="en-US" sz="1200" kern="1200" dirty="0">
+              <a:solidFill>
+                <a:schemeClr val="tx1"/>
+              </a:solidFill>
+              <a:effectLst/>
+              <a:latin typeface="+mn-lt"/>
+              <a:ea typeface="+mn-ea"/>
+              <a:cs typeface="+mn-cs"/>
+            </a:endParaRPr>
+          </a:p>
+          <a:p>
+            <a:pPr marL="228600" indent="-228600">
+              <a:buAutoNum type="arabicPeriod"/>
+            </a:pPr>
+            <a:r>
+              <a:rPr lang="en-US" sz="1200" kern="1200" dirty="0">
+                <a:solidFill>
+                  <a:schemeClr val="tx1"/>
+                </a:solidFill>
+                <a:effectLst/>
+                <a:latin typeface="+mn-lt"/>
+                <a:ea typeface="+mn-ea"/>
+                <a:cs typeface="+mn-cs"/>
+              </a:rPr>
+              <a:t>Database administrators are already squeezing comparable performance from their system by optimizing indexes and data partitions around known business questions.  For instance, analyzing a trillion sensor data points is less of an issue if the storage layer partitioned those records into time-ordered blocks—allowing for exclusion of entire ranges during the pre-query phase.</a:t>
+            </a:r>
           </a:p>
         </p:txBody>
       </p:sp>
@@ -2600,31 +2436,7 @@
                 <a:ea typeface="+mn-ea"/>
                 <a:cs typeface="+mn-cs"/>
               </a:rPr>
-              <a:t> interface that is familiar to engineering teams and offers capabilities such as automated fail-over and increased availability.  Other organizations might choose to make a larger investment and select a NoSQL technology, such as Apache Casandra, Azure </a:t>
-            </a:r>
-            <a:r>
-              <a:rPr lang="en-US" sz="1200" kern="1200" dirty="0" err="1">
-                <a:solidFill>
-                  <a:schemeClr val="tx1"/>
-                </a:solidFill>
-                <a:effectLst/>
-                <a:latin typeface="+mn-lt"/>
-                <a:ea typeface="+mn-ea"/>
-                <a:cs typeface="+mn-cs"/>
-              </a:rPr>
-              <a:t>CosmosDb</a:t>
-            </a:r>
-            <a:r>
-              <a:rPr lang="en-US" sz="1200" kern="1200" dirty="0">
-                <a:solidFill>
-                  <a:schemeClr val="tx1"/>
-                </a:solidFill>
-                <a:effectLst/>
-                <a:latin typeface="+mn-lt"/>
-                <a:ea typeface="+mn-ea"/>
-                <a:cs typeface="+mn-cs"/>
-              </a:rPr>
-              <a:t>, or Amazon DynamoDB.  These technologies make specific trade-offs in terms of throughput over functionality, like natural joins and built-in aggregations.  </a:t>
+              <a:t> interface that is familiar to engineering teams and offers capabilities such as automated fail-over and increased availability.</a:t>
             </a:r>
           </a:p>
           <a:p>
@@ -2649,10 +2461,12 @@
                 <a:ea typeface="+mn-ea"/>
                 <a:cs typeface="+mn-cs"/>
               </a:rPr>
-              <a:t>Evolving into Purpose Built </a:t>
-            </a:r>
-            <a:r>
-              <a:rPr lang="en-US" sz="1200" b="1" kern="1200" dirty="0" err="1">
+              <a:t>Evolving into NoSQL storage</a:t>
+            </a:r>
+          </a:p>
+          <a:p>
+            <a:r>
+              <a:rPr lang="en-US" sz="1200" kern="1200" dirty="0">
                 <a:solidFill>
                   <a:schemeClr val="tx1"/>
                 </a:solidFill>
@@ -2661,21 +2475,10 @@
                 <a:ea typeface="+mn-ea"/>
                 <a:cs typeface="+mn-cs"/>
               </a:rPr>
-              <a:t>NoSql</a:t>
-            </a:r>
-            <a:endParaRPr lang="en-US" sz="1200" b="1" kern="1200" dirty="0">
-              <a:solidFill>
-                <a:schemeClr val="tx1"/>
-              </a:solidFill>
-              <a:effectLst/>
-              <a:latin typeface="+mn-lt"/>
-              <a:ea typeface="+mn-ea"/>
-              <a:cs typeface="+mn-cs"/>
-            </a:endParaRPr>
-          </a:p>
-          <a:p>
-            <a:r>
-              <a:rPr lang="en-US" sz="1200" kern="1200" dirty="0">
+              <a:t>Other organizations might choose to make a larger investment and select a NoSQL technology, such as Apache Casandra, Azure </a:t>
+            </a:r>
+            <a:r>
+              <a:rPr lang="en-US" sz="1200" kern="1200" dirty="0" err="1">
                 <a:solidFill>
                   <a:schemeClr val="tx1"/>
                 </a:solidFill>
@@ -2684,10 +2487,10 @@
                 <a:ea typeface="+mn-ea"/>
                 <a:cs typeface="+mn-cs"/>
               </a:rPr>
-              <a:t>As the organization’s data management strategy matures, it will discover that different workloads require different technologies to gain specific optimizations.  For example, the business uses a graph database, like Apache </a:t>
-            </a:r>
-            <a:r>
-              <a:rPr lang="en-US" sz="1200" kern="1200" dirty="0" err="1">
+              <a:t>CosmosDb</a:t>
+            </a:r>
+            <a:r>
+              <a:rPr lang="en-US" sz="1200" kern="1200" dirty="0">
                 <a:solidFill>
                   <a:schemeClr val="tx1"/>
                 </a:solidFill>
@@ -2696,91 +2499,7 @@
                 <a:ea typeface="+mn-ea"/>
                 <a:cs typeface="+mn-cs"/>
               </a:rPr>
-              <a:t>Tinkerpop</a:t>
-            </a:r>
-            <a:r>
-              <a:rPr lang="en-US" sz="1200" kern="1200" dirty="0">
-                <a:solidFill>
-                  <a:schemeClr val="tx1"/>
-                </a:solidFill>
-                <a:effectLst/>
-                <a:latin typeface="+mn-lt"/>
-                <a:ea typeface="+mn-ea"/>
-                <a:cs typeface="+mn-cs"/>
-              </a:rPr>
-              <a:t>, to store and query relationship information from a known point.  However, the data structures would not be efficient for holding time-series information about those entities and would need a separate time-series store like Influx or </a:t>
-            </a:r>
-            <a:r>
-              <a:rPr lang="en-US" sz="1200" kern="1200" dirty="0" err="1">
-                <a:solidFill>
-                  <a:schemeClr val="tx1"/>
-                </a:solidFill>
-                <a:effectLst/>
-                <a:latin typeface="+mn-lt"/>
-                <a:ea typeface="+mn-ea"/>
-                <a:cs typeface="+mn-cs"/>
-              </a:rPr>
-              <a:t>OpenTSDB</a:t>
-            </a:r>
-            <a:r>
-              <a:rPr lang="en-US" sz="1200" kern="1200" dirty="0">
-                <a:solidFill>
-                  <a:schemeClr val="tx1"/>
-                </a:solidFill>
-                <a:effectLst/>
-                <a:latin typeface="+mn-lt"/>
-                <a:ea typeface="+mn-ea"/>
-                <a:cs typeface="+mn-cs"/>
-              </a:rPr>
-              <a:t>.  Since the graph queries start from a known </a:t>
-            </a:r>
-            <a:r>
-              <a:rPr lang="en-US" sz="1200" kern="1200" dirty="0" err="1">
-                <a:solidFill>
-                  <a:schemeClr val="tx1"/>
-                </a:solidFill>
-                <a:effectLst/>
-                <a:latin typeface="+mn-lt"/>
-                <a:ea typeface="+mn-ea"/>
-                <a:cs typeface="+mn-cs"/>
-              </a:rPr>
-              <a:t>vertice</a:t>
-            </a:r>
-            <a:r>
-              <a:rPr lang="en-US" sz="1200" kern="1200" dirty="0">
-                <a:solidFill>
-                  <a:schemeClr val="tx1"/>
-                </a:solidFill>
-                <a:effectLst/>
-                <a:latin typeface="+mn-lt"/>
-                <a:ea typeface="+mn-ea"/>
-                <a:cs typeface="+mn-cs"/>
-              </a:rPr>
-              <a:t>, a term store like Apache </a:t>
-            </a:r>
-            <a:r>
-              <a:rPr lang="en-US" sz="1200" kern="1200" dirty="0" err="1">
-                <a:solidFill>
-                  <a:schemeClr val="tx1"/>
-                </a:solidFill>
-                <a:effectLst/>
-                <a:latin typeface="+mn-lt"/>
-                <a:ea typeface="+mn-ea"/>
-                <a:cs typeface="+mn-cs"/>
-              </a:rPr>
-              <a:t>Solr</a:t>
-            </a:r>
-            <a:r>
-              <a:rPr lang="en-US" sz="1200" kern="1200" dirty="0">
-                <a:solidFill>
-                  <a:schemeClr val="tx1"/>
-                </a:solidFill>
-                <a:effectLst/>
-                <a:latin typeface="+mn-lt"/>
-                <a:ea typeface="+mn-ea"/>
-                <a:cs typeface="+mn-cs"/>
-              </a:rPr>
-              <a:t> or Elastic Search can hold metadata about the graph entities.  Answer extraction to common business questions into OLAP stores provides a consistent interface for visualization tooling.  Though many OLAP technologies, such as Amazon Redshift, batch retrieval, so the Redis cache clusters need to hold temporal data, such as results for the website’s homepage for additional performance.  </a:t>
+              <a:t>, or Amazon DynamoDB.  These technologies make specific trade-offs in terms of throughput over functionality, like natural joins and built-in aggregations.</a:t>
             </a:r>
           </a:p>
           <a:p>
@@ -2805,7 +2524,7 @@
                 <a:ea typeface="+mn-ea"/>
                 <a:cs typeface="+mn-cs"/>
               </a:rPr>
-              <a:t>Finally throwing most of it away with Quantum</a:t>
+              <a:t>Evolving into Purpose Built Systems</a:t>
             </a:r>
           </a:p>
           <a:p>
@@ -2819,7 +2538,7 @@
                 <a:ea typeface="+mn-ea"/>
                 <a:cs typeface="+mn-cs"/>
               </a:rPr>
-              <a:t>At this point, the organization takes a step back at the vast collection of built-for-purpose tooling they need to support and asks, what’s one more?  Now they are ready for quantum.  Joking aside-- the vision of quantum is that it reduces the need for these decoupled tooling.    For instance, Grover searches remove the need to maintain separate term stores.  The benefits of segmenting ACID-compliant </a:t>
+              <a:t>As the organization’s data management strategy matures, it discovers that different workloads require different technologies to gain specific optimizations.  For example, the business uses a graph database, like Apache </a:t>
             </a:r>
             <a:r>
               <a:rPr lang="en-US" sz="1200" kern="1200" dirty="0" err="1">
@@ -2831,7 +2550,7 @@
                 <a:ea typeface="+mn-ea"/>
                 <a:cs typeface="+mn-cs"/>
               </a:rPr>
-              <a:t>NewSql</a:t>
+              <a:t>Tinkerpop</a:t>
             </a:r>
             <a:r>
               <a:rPr lang="en-US" sz="1200" kern="1200" dirty="0">
@@ -2843,7 +2562,7 @@
                 <a:ea typeface="+mn-ea"/>
                 <a:cs typeface="+mn-cs"/>
               </a:rPr>
-              <a:t> from BASE-optimized </a:t>
+              <a:t>, to store and query relationship information from a known entity (vertex).  However, the graph data structures would not be efficient for holding time-series information, and those values would need a separate time-series store like Influx or </a:t>
             </a:r>
             <a:r>
               <a:rPr lang="en-US" sz="1200" kern="1200" dirty="0" err="1">
@@ -2855,7 +2574,7 @@
                 <a:ea typeface="+mn-ea"/>
                 <a:cs typeface="+mn-cs"/>
               </a:rPr>
-              <a:t>NoSql</a:t>
+              <a:t>OpenTSDB</a:t>
             </a:r>
             <a:r>
               <a:rPr lang="en-US" sz="1200" kern="1200" dirty="0">
@@ -2867,11 +2586,71 @@
                 <a:ea typeface="+mn-ea"/>
                 <a:cs typeface="+mn-cs"/>
               </a:rPr>
-              <a:t> are limited to ‘schema-on-read’ versus ‘schema-on-write.’  As the number of distinct technologies decreases, the operational and capital costs (OPX/CAPX) improve, allowing the organization to become more agile.</a:t>
-            </a:r>
-          </a:p>
-          <a:p>
-            <a:endParaRPr lang="en-US" dirty="0"/>
+              <a:t>.  Handling unknown starting vertices requires graph metadata to be placed in term stores like Apache </a:t>
+            </a:r>
+            <a:r>
+              <a:rPr lang="en-US" sz="1200" kern="1200" dirty="0" err="1">
+                <a:solidFill>
+                  <a:schemeClr val="tx1"/>
+                </a:solidFill>
+                <a:effectLst/>
+                <a:latin typeface="+mn-lt"/>
+                <a:ea typeface="+mn-ea"/>
+                <a:cs typeface="+mn-cs"/>
+              </a:rPr>
+              <a:t>Solr</a:t>
+            </a:r>
+            <a:r>
+              <a:rPr lang="en-US" sz="1200" kern="1200" dirty="0">
+                <a:solidFill>
+                  <a:schemeClr val="tx1"/>
+                </a:solidFill>
+                <a:effectLst/>
+                <a:latin typeface="+mn-lt"/>
+                <a:ea typeface="+mn-ea"/>
+                <a:cs typeface="+mn-cs"/>
+              </a:rPr>
+              <a:t> or Elastic Search.  Answer extraction to common business questions into OLAP stores provides a consistent interface for visualization tooling, but many OLAP technologies, such as Amazon Redshift, target high bandwidth/high latency use cases, driving the need for Redis cache clusters to hold temporal data, such as results for the website’s homepage.  </a:t>
+            </a:r>
+          </a:p>
+          <a:p>
+            <a:endParaRPr lang="en-US" sz="1200" kern="1200" dirty="0">
+              <a:solidFill>
+                <a:schemeClr val="tx1"/>
+              </a:solidFill>
+              <a:effectLst/>
+              <a:latin typeface="+mn-lt"/>
+              <a:ea typeface="+mn-ea"/>
+              <a:cs typeface="+mn-cs"/>
+            </a:endParaRPr>
+          </a:p>
+          <a:p>
+            <a:r>
+              <a:rPr lang="en-US" sz="1200" b="1" kern="1200" dirty="0">
+                <a:solidFill>
+                  <a:schemeClr val="tx1"/>
+                </a:solidFill>
+                <a:effectLst/>
+                <a:latin typeface="+mn-lt"/>
+                <a:ea typeface="+mn-ea"/>
+                <a:cs typeface="+mn-cs"/>
+              </a:rPr>
+              <a:t>Evolving into Quantum</a:t>
+            </a:r>
+          </a:p>
+          <a:p>
+            <a:r>
+              <a:rPr lang="en-US" sz="1200" kern="1200" dirty="0">
+                <a:solidFill>
+                  <a:schemeClr val="tx1"/>
+                </a:solidFill>
+                <a:effectLst/>
+                <a:latin typeface="+mn-lt"/>
+                <a:ea typeface="+mn-ea"/>
+                <a:cs typeface="+mn-cs"/>
+              </a:rPr>
+              <a:t>At this point, the organization takes a step back at the vast collection of built-for-purpose tooling they need to support and asks, what’s one more?  Now they are ready for quantum.  Jokes aside, the vision of quantum is that it reduces the need for these decoupled tooling scenarios.  Instead, there is one universal technology stack that has ample power to deliver the needs of these various systems.  For instance, Grover searches remove the need to maintain separate term stores, and less offline processing would occur as online processing is sufficiently performant.  As performance challenges decrease, the decision to use ACID over BASE can focus on schema semantics and not solely transactional locks.</a:t>
+            </a:r>
           </a:p>
         </p:txBody>
       </p:sp>
@@ -2986,23 +2765,6 @@
             </a:r>
           </a:p>
           <a:p>
-            <a:pPr marL="0" marR="0" lvl="0" indent="0" algn="l" defTabSz="914400" rtl="0" eaLnBrk="1" fontAlgn="auto" latinLnBrk="0" hangingPunct="1">
-              <a:lnSpc>
-                <a:spcPct val="100000"/>
-              </a:lnSpc>
-              <a:spcBef>
-                <a:spcPts val="0"/>
-              </a:spcBef>
-              <a:spcAft>
-                <a:spcPts val="0"/>
-              </a:spcAft>
-              <a:buClrTx/>
-              <a:buSzTx/>
-              <a:buFontTx/>
-              <a:buNone/>
-              <a:tabLst/>
-              <a:defRPr/>
-            </a:pPr>
             <a:r>
               <a:rPr lang="en-US" sz="1200" kern="1200" dirty="0">
                 <a:solidFill>
@@ -3013,7 +2775,7 @@
                 <a:ea typeface="+mn-ea"/>
                 <a:cs typeface="+mn-cs"/>
               </a:rPr>
-              <a:t>When academia first proposed neural networks, the business community did not understand the practical application of these systems.  Since then, neural networks have touched every aspect of our online lives.  Quantum databases will have a similar impact on society as they address optimization problems, machine learning, fuzzy logic, and become a standard server acceleration card.  As quantum technologies mature, they will grow as cloud-native extensions of the enterprise environment and unlock new insights through massively parallel processing that powers rich business intelligence platforms.  For instance, </a:t>
+              <a:t>When academia first proposed neural networks, the business community did not understand the practical application of these systems.  Since then, neural networks have touched every aspect of our online lives.  Quantum databases will have a similar impact on society as they address optimization problems, machine learning, and fuzzy logic.  As quantum technologies mature, they will grow as cloud-native extensions of the enterprise environment, and unlock new insights through massively parallel processing that powers rich business intelligence platforms.  For instance, </a:t>
             </a:r>
             <a:r>
               <a:rPr lang="en-US" sz="1200" kern="1200" dirty="0" err="1">
@@ -3037,29 +2799,8 @@
                 <a:ea typeface="+mn-ea"/>
                 <a:cs typeface="+mn-cs"/>
               </a:rPr>
-              <a:t> (2019) describes the challenges with modeling nitrogen processes as they contain over seventy states that High-Performance Computing (HPC) clusters can only approximate.  As that estimations improve those manufacturing processes, gain huge efficiencies reducing global energy waste.  Other success stories are waiting to be discovered across all industries </a:t>
-            </a:r>
-            <a:r>
-              <a:rPr lang="en-US" sz="1200" kern="1200">
-                <a:solidFill>
-                  <a:schemeClr val="tx1"/>
-                </a:solidFill>
-                <a:effectLst/>
-                <a:latin typeface="+mn-lt"/>
-                <a:ea typeface="+mn-ea"/>
-                <a:cs typeface="+mn-cs"/>
-              </a:rPr>
-              <a:t>and workloads.</a:t>
-            </a:r>
-            <a:endParaRPr lang="en-US" sz="1200" kern="1200" dirty="0">
-              <a:solidFill>
-                <a:schemeClr val="tx1"/>
-              </a:solidFill>
-              <a:effectLst/>
-              <a:latin typeface="+mn-lt"/>
-              <a:ea typeface="+mn-ea"/>
-              <a:cs typeface="+mn-cs"/>
-            </a:endParaRPr>
+              <a:t> (2019) describes the challenges with modeling nitrogen processes as they contain over seventy states that High-Performance Computing (HPC) clusters can only approximate.  As that estimations improve those manufacturing processes, gain huge efficiencies reducing global energy waste.  All of these benefits happen on systems faster and in a more interactive manner.  Extensions to the SQL query language will follow to take advantage of the entanglement constructs to naturally explore enormous data lakes of unstructured data through parallel processing.</a:t>
+            </a:r>
           </a:p>
           <a:p>
             <a:endParaRPr lang="en-US" dirty="0"/>
@@ -11348,6 +11089,1858 @@
     <p:extLst>
       <p:ext uri="{BB962C8B-B14F-4D97-AF65-F5344CB8AC3E}">
         <p14:creationId xmlns:p14="http://schemas.microsoft.com/office/powerpoint/2010/main" val="1213490250"/>
+      </p:ext>
+    </p:extLst>
+  </p:cSld>
+  <p:clrMapOvr>
+    <a:masterClrMapping/>
+  </p:clrMapOvr>
+</p:sld>
+</file>
+
+<file path=ppt/slides/slide15.xml><?xml version="1.0" encoding="utf-8"?>
+<p:sld xmlns:a="http://schemas.openxmlformats.org/drawingml/2006/main" xmlns:r="http://schemas.openxmlformats.org/officeDocument/2006/relationships" xmlns:p="http://schemas.openxmlformats.org/presentationml/2006/main">
+  <p:cSld>
+    <p:spTree>
+      <p:nvGrpSpPr>
+        <p:cNvPr id="1" name=""/>
+        <p:cNvGrpSpPr/>
+        <p:nvPr/>
+      </p:nvGrpSpPr>
+      <p:grpSpPr>
+        <a:xfrm>
+          <a:off x="0" y="0"/>
+          <a:ext cx="0" cy="0"/>
+          <a:chOff x="0" y="0"/>
+          <a:chExt cx="0" cy="0"/>
+        </a:xfrm>
+      </p:grpSpPr>
+      <p:sp>
+        <p:nvSpPr>
+          <p:cNvPr id="2" name="Title 1">
+            <a:extLst>
+              <a:ext uri="{FF2B5EF4-FFF2-40B4-BE49-F238E27FC236}">
+                <a16:creationId xmlns:a16="http://schemas.microsoft.com/office/drawing/2014/main" id="{BB6F56A7-381D-4EF9-99F0-3D46B083268A}"/>
+              </a:ext>
+            </a:extLst>
+          </p:cNvPr>
+          <p:cNvSpPr>
+            <a:spLocks noGrp="1"/>
+          </p:cNvSpPr>
+          <p:nvPr>
+            <p:ph type="title"/>
+          </p:nvPr>
+        </p:nvSpPr>
+        <p:spPr/>
+        <p:txBody>
+          <a:bodyPr/>
+          <a:lstStyle/>
+          <a:p>
+            <a:r>
+              <a:rPr lang="en-US" dirty="0"/>
+              <a:t>References</a:t>
+            </a:r>
+          </a:p>
+        </p:txBody>
+      </p:sp>
+      <p:sp>
+        <p:nvSpPr>
+          <p:cNvPr id="4" name="Rectangle 1">
+            <a:extLst>
+              <a:ext uri="{FF2B5EF4-FFF2-40B4-BE49-F238E27FC236}">
+                <a16:creationId xmlns:a16="http://schemas.microsoft.com/office/drawing/2014/main" id="{A4D4A764-2589-4203-ADAB-BDD50B868EC9}"/>
+              </a:ext>
+            </a:extLst>
+          </p:cNvPr>
+          <p:cNvSpPr>
+            <a:spLocks noGrp="1" noChangeArrowheads="1"/>
+          </p:cNvSpPr>
+          <p:nvPr>
+            <p:ph idx="1"/>
+          </p:nvPr>
+        </p:nvSpPr>
+        <p:spPr bwMode="auto">
+          <a:xfrm>
+            <a:off x="2589212" y="1473729"/>
+            <a:ext cx="8065028" cy="5078313"/>
+          </a:xfrm>
+          <a:prstGeom prst="rect">
+            <a:avLst/>
+          </a:prstGeom>
+          <a:noFill/>
+          <a:ln>
+            <a:noFill/>
+          </a:ln>
+          <a:effectLst/>
+          <a:extLst>
+            <a:ext uri="{909E8E84-426E-40DD-AFC4-6F175D3DCCD1}">
+              <a14:hiddenFill xmlns:a14="http://schemas.microsoft.com/office/drawing/2010/main">
+                <a:solidFill>
+                  <a:schemeClr val="accent1"/>
+                </a:solidFill>
+              </a14:hiddenFill>
+            </a:ext>
+            <a:ext uri="{91240B29-F687-4F45-9708-019B960494DF}">
+              <a14:hiddenLine xmlns:a14="http://schemas.microsoft.com/office/drawing/2010/main" w="9525">
+                <a:solidFill>
+                  <a:schemeClr val="tx1"/>
+                </a:solidFill>
+                <a:miter lim="800000"/>
+                <a:headEnd/>
+                <a:tailEnd/>
+              </a14:hiddenLine>
+            </a:ext>
+            <a:ext uri="{AF507438-7753-43E0-B8FC-AC1667EBCBE1}">
+              <a14:hiddenEffects xmlns:a14="http://schemas.microsoft.com/office/drawing/2010/main">
+                <a:effectLst>
+                  <a:outerShdw dist="35921" dir="2700000" algn="ctr" rotWithShape="0">
+                    <a:schemeClr val="bg2"/>
+                  </a:outerShdw>
+                </a:effectLst>
+              </a14:hiddenEffects>
+            </a:ext>
+          </a:extLst>
+        </p:spPr>
+        <p:txBody>
+          <a:bodyPr vert="horz" wrap="none" lIns="91440" tIns="45720" rIns="91440" bIns="45720" numCol="1" anchor="ctr" anchorCtr="0" compatLnSpc="1">
+            <a:prstTxWarp prst="textNoShape">
+              <a:avLst/>
+            </a:prstTxWarp>
+            <a:spAutoFit/>
+          </a:bodyPr>
+          <a:lstStyle>
+            <a:lvl1pPr eaLnBrk="0" fontAlgn="base" hangingPunct="0">
+              <a:spcBef>
+                <a:spcPct val="0"/>
+              </a:spcBef>
+              <a:spcAft>
+                <a:spcPct val="0"/>
+              </a:spcAft>
+              <a:defRPr>
+                <a:solidFill>
+                  <a:schemeClr val="tx1"/>
+                </a:solidFill>
+                <a:latin typeface="Arial" panose="020B0604020202020204" pitchFamily="34" charset="0"/>
+              </a:defRPr>
+            </a:lvl1pPr>
+            <a:lvl2pPr eaLnBrk="0" fontAlgn="base" hangingPunct="0">
+              <a:spcBef>
+                <a:spcPct val="0"/>
+              </a:spcBef>
+              <a:spcAft>
+                <a:spcPct val="0"/>
+              </a:spcAft>
+              <a:defRPr>
+                <a:solidFill>
+                  <a:schemeClr val="tx1"/>
+                </a:solidFill>
+                <a:latin typeface="Arial" panose="020B0604020202020204" pitchFamily="34" charset="0"/>
+              </a:defRPr>
+            </a:lvl2pPr>
+            <a:lvl3pPr eaLnBrk="0" fontAlgn="base" hangingPunct="0">
+              <a:spcBef>
+                <a:spcPct val="0"/>
+              </a:spcBef>
+              <a:spcAft>
+                <a:spcPct val="0"/>
+              </a:spcAft>
+              <a:defRPr>
+                <a:solidFill>
+                  <a:schemeClr val="tx1"/>
+                </a:solidFill>
+                <a:latin typeface="Arial" panose="020B0604020202020204" pitchFamily="34" charset="0"/>
+              </a:defRPr>
+            </a:lvl3pPr>
+            <a:lvl4pPr eaLnBrk="0" fontAlgn="base" hangingPunct="0">
+              <a:spcBef>
+                <a:spcPct val="0"/>
+              </a:spcBef>
+              <a:spcAft>
+                <a:spcPct val="0"/>
+              </a:spcAft>
+              <a:defRPr>
+                <a:solidFill>
+                  <a:schemeClr val="tx1"/>
+                </a:solidFill>
+                <a:latin typeface="Arial" panose="020B0604020202020204" pitchFamily="34" charset="0"/>
+              </a:defRPr>
+            </a:lvl4pPr>
+            <a:lvl5pPr eaLnBrk="0" fontAlgn="base" hangingPunct="0">
+              <a:spcBef>
+                <a:spcPct val="0"/>
+              </a:spcBef>
+              <a:spcAft>
+                <a:spcPct val="0"/>
+              </a:spcAft>
+              <a:defRPr>
+                <a:solidFill>
+                  <a:schemeClr val="tx1"/>
+                </a:solidFill>
+                <a:latin typeface="Arial" panose="020B0604020202020204" pitchFamily="34" charset="0"/>
+              </a:defRPr>
+            </a:lvl5pPr>
+            <a:lvl6pPr eaLnBrk="0" fontAlgn="base" hangingPunct="0">
+              <a:spcBef>
+                <a:spcPct val="0"/>
+              </a:spcBef>
+              <a:spcAft>
+                <a:spcPct val="0"/>
+              </a:spcAft>
+              <a:defRPr>
+                <a:solidFill>
+                  <a:schemeClr val="tx1"/>
+                </a:solidFill>
+                <a:latin typeface="Arial" panose="020B0604020202020204" pitchFamily="34" charset="0"/>
+              </a:defRPr>
+            </a:lvl6pPr>
+            <a:lvl7pPr eaLnBrk="0" fontAlgn="base" hangingPunct="0">
+              <a:spcBef>
+                <a:spcPct val="0"/>
+              </a:spcBef>
+              <a:spcAft>
+                <a:spcPct val="0"/>
+              </a:spcAft>
+              <a:defRPr>
+                <a:solidFill>
+                  <a:schemeClr val="tx1"/>
+                </a:solidFill>
+                <a:latin typeface="Arial" panose="020B0604020202020204" pitchFamily="34" charset="0"/>
+              </a:defRPr>
+            </a:lvl7pPr>
+            <a:lvl8pPr eaLnBrk="0" fontAlgn="base" hangingPunct="0">
+              <a:spcBef>
+                <a:spcPct val="0"/>
+              </a:spcBef>
+              <a:spcAft>
+                <a:spcPct val="0"/>
+              </a:spcAft>
+              <a:defRPr>
+                <a:solidFill>
+                  <a:schemeClr val="tx1"/>
+                </a:solidFill>
+                <a:latin typeface="Arial" panose="020B0604020202020204" pitchFamily="34" charset="0"/>
+              </a:defRPr>
+            </a:lvl8pPr>
+            <a:lvl9pPr eaLnBrk="0" fontAlgn="base" hangingPunct="0">
+              <a:spcBef>
+                <a:spcPct val="0"/>
+              </a:spcBef>
+              <a:spcAft>
+                <a:spcPct val="0"/>
+              </a:spcAft>
+              <a:defRPr>
+                <a:solidFill>
+                  <a:schemeClr val="tx1"/>
+                </a:solidFill>
+                <a:latin typeface="Arial" panose="020B0604020202020204" pitchFamily="34" charset="0"/>
+              </a:defRPr>
+            </a:lvl9pPr>
+          </a:lstStyle>
+          <a:p>
+            <a:pPr marL="0" marR="0" lvl="0" indent="0" algn="l" defTabSz="914400" rtl="0" eaLnBrk="0" fontAlgn="base" latinLnBrk="0" hangingPunct="0">
+              <a:lnSpc>
+                <a:spcPct val="100000"/>
+              </a:lnSpc>
+              <a:spcBef>
+                <a:spcPct val="0"/>
+              </a:spcBef>
+              <a:spcAft>
+                <a:spcPct val="0"/>
+              </a:spcAft>
+              <a:buClrTx/>
+              <a:buSzTx/>
+              <a:buFontTx/>
+              <a:buNone/>
+              <a:tabLst/>
+            </a:pPr>
+            <a:r>
+              <a:rPr kumimoji="0" lang="en-US" altLang="en-US" sz="1200" b="1" i="0" u="none" strike="noStrike" cap="none" normalizeH="0" baseline="0" dirty="0" err="1">
+                <a:ln>
+                  <a:noFill/>
+                </a:ln>
+                <a:solidFill>
+                  <a:schemeClr val="tx1"/>
+                </a:solidFill>
+                <a:effectLst/>
+                <a:latin typeface="Times New Roman" panose="02020603050405020304" pitchFamily="18" charset="0"/>
+                <a:ea typeface="Calibri" panose="020F0502020204030204" pitchFamily="34" charset="0"/>
+                <a:cs typeface="Times New Roman" panose="02020603050405020304" pitchFamily="18" charset="0"/>
+              </a:rPr>
+              <a:t>Brandao</a:t>
+            </a:r>
+            <a:r>
+              <a:rPr kumimoji="0" lang="en-US" altLang="en-US" sz="1200" b="1" i="0" u="none" strike="noStrike" cap="none" normalizeH="0" baseline="0" dirty="0">
+                <a:ln>
+                  <a:noFill/>
+                </a:ln>
+                <a:solidFill>
+                  <a:schemeClr val="tx1"/>
+                </a:solidFill>
+                <a:effectLst/>
+                <a:latin typeface="Times New Roman" panose="02020603050405020304" pitchFamily="18" charset="0"/>
+                <a:ea typeface="Calibri" panose="020F0502020204030204" pitchFamily="34" charset="0"/>
+                <a:cs typeface="Times New Roman" panose="02020603050405020304" pitchFamily="18" charset="0"/>
+              </a:rPr>
+              <a:t>, F., &amp; Kessler, E</a:t>
+            </a:r>
+            <a:r>
+              <a:rPr kumimoji="0" lang="en-US" altLang="en-US" sz="1200" i="0" u="none" strike="noStrike" cap="none" normalizeH="0" baseline="0" dirty="0">
+                <a:ln>
+                  <a:noFill/>
+                </a:ln>
+                <a:solidFill>
+                  <a:schemeClr val="tx1"/>
+                </a:solidFill>
+                <a:effectLst/>
+                <a:latin typeface="Times New Roman" panose="02020603050405020304" pitchFamily="18" charset="0"/>
+                <a:ea typeface="Calibri" panose="020F0502020204030204" pitchFamily="34" charset="0"/>
+                <a:cs typeface="Times New Roman" panose="02020603050405020304" pitchFamily="18" charset="0"/>
+              </a:rPr>
+              <a:t>. (2019, December).</a:t>
+            </a:r>
+            <a:r>
+              <a:rPr kumimoji="0" lang="en-US" altLang="en-US" sz="1200" b="0" i="1" u="none" strike="noStrike" cap="none" normalizeH="0" baseline="0" dirty="0">
+                <a:ln>
+                  <a:noFill/>
+                </a:ln>
+                <a:solidFill>
+                  <a:schemeClr val="tx1"/>
+                </a:solidFill>
+                <a:effectLst/>
+                <a:latin typeface="Times New Roman" panose="02020603050405020304" pitchFamily="18" charset="0"/>
+                <a:ea typeface="Calibri" panose="020F0502020204030204" pitchFamily="34" charset="0"/>
+                <a:cs typeface="Times New Roman" panose="02020603050405020304" pitchFamily="18" charset="0"/>
+              </a:rPr>
+              <a:t> </a:t>
+            </a:r>
+            <a:br>
+              <a:rPr kumimoji="0" lang="en-US" altLang="en-US" sz="1200" b="0" i="1" u="none" strike="noStrike" cap="none" normalizeH="0" baseline="0" dirty="0">
+                <a:ln>
+                  <a:noFill/>
+                </a:ln>
+                <a:solidFill>
+                  <a:schemeClr val="tx1"/>
+                </a:solidFill>
+                <a:effectLst/>
+                <a:latin typeface="Times New Roman" panose="02020603050405020304" pitchFamily="18" charset="0"/>
+                <a:ea typeface="Calibri" panose="020F0502020204030204" pitchFamily="34" charset="0"/>
+                <a:cs typeface="Times New Roman" panose="02020603050405020304" pitchFamily="18" charset="0"/>
+              </a:rPr>
+            </a:br>
+            <a:r>
+              <a:rPr kumimoji="0" lang="en-US" altLang="en-US" sz="1200" b="0" i="1" u="none" strike="noStrike" cap="none" normalizeH="0" baseline="0" dirty="0">
+                <a:ln>
+                  <a:noFill/>
+                </a:ln>
+                <a:solidFill>
+                  <a:schemeClr val="tx1"/>
+                </a:solidFill>
+                <a:effectLst/>
+                <a:latin typeface="Times New Roman" panose="02020603050405020304" pitchFamily="18" charset="0"/>
+                <a:ea typeface="Calibri" panose="020F0502020204030204" pitchFamily="34" charset="0"/>
+                <a:cs typeface="Times New Roman" panose="02020603050405020304" pitchFamily="18" charset="0"/>
+              </a:rPr>
+              <a:t>	</a:t>
+            </a:r>
+            <a:r>
+              <a:rPr kumimoji="0" lang="en-US" altLang="en-US" sz="1200" b="0" i="0" u="none" strike="noStrike" cap="none" normalizeH="0" baseline="0" dirty="0">
+                <a:ln>
+                  <a:noFill/>
+                </a:ln>
+                <a:solidFill>
+                  <a:schemeClr val="tx1"/>
+                </a:solidFill>
+                <a:effectLst/>
+                <a:latin typeface="Times New Roman" panose="02020603050405020304" pitchFamily="18" charset="0"/>
+                <a:ea typeface="Calibri" panose="020F0502020204030204" pitchFamily="34" charset="0"/>
+                <a:cs typeface="Times New Roman" panose="02020603050405020304" pitchFamily="18" charset="0"/>
+              </a:rPr>
+              <a:t>Introducing Quantum Computing with AWS. </a:t>
+            </a:r>
+          </a:p>
+          <a:p>
+            <a:pPr marL="0" marR="0" lvl="0" indent="0" algn="l" defTabSz="914400" rtl="0" eaLnBrk="0" fontAlgn="base" latinLnBrk="0" hangingPunct="0">
+              <a:lnSpc>
+                <a:spcPct val="100000"/>
+              </a:lnSpc>
+              <a:spcBef>
+                <a:spcPct val="0"/>
+              </a:spcBef>
+              <a:spcAft>
+                <a:spcPct val="0"/>
+              </a:spcAft>
+              <a:buClrTx/>
+              <a:buSzTx/>
+              <a:buFontTx/>
+              <a:buNone/>
+              <a:tabLst/>
+            </a:pPr>
+            <a:r>
+              <a:rPr lang="en-US" altLang="en-US" sz="1200" dirty="0">
+                <a:latin typeface="Times New Roman" panose="02020603050405020304" pitchFamily="18" charset="0"/>
+                <a:ea typeface="Calibri" panose="020F0502020204030204" pitchFamily="34" charset="0"/>
+                <a:cs typeface="Times New Roman" panose="02020603050405020304" pitchFamily="18" charset="0"/>
+              </a:rPr>
+              <a:t>	</a:t>
+            </a:r>
+            <a:r>
+              <a:rPr kumimoji="0" lang="en-US" altLang="en-US" sz="1200" b="0" i="0" u="none" strike="noStrike" cap="none" normalizeH="0" baseline="0" dirty="0">
+                <a:ln>
+                  <a:noFill/>
+                </a:ln>
+                <a:solidFill>
+                  <a:schemeClr val="tx1"/>
+                </a:solidFill>
+                <a:effectLst/>
+                <a:latin typeface="Times New Roman" panose="02020603050405020304" pitchFamily="18" charset="0"/>
+                <a:ea typeface="Calibri" panose="020F0502020204030204" pitchFamily="34" charset="0"/>
+                <a:cs typeface="Times New Roman" panose="02020603050405020304" pitchFamily="18" charset="0"/>
+              </a:rPr>
+              <a:t>Retrieved from YouTube: https://www.youtube.com/watch?v=BV9TZWuAwyk</a:t>
+            </a:r>
+            <a:endParaRPr kumimoji="0" lang="en-US" altLang="en-US" sz="800" b="0" i="0" u="none" strike="noStrike" cap="none" normalizeH="0" baseline="0" dirty="0">
+              <a:ln>
+                <a:noFill/>
+              </a:ln>
+              <a:solidFill>
+                <a:schemeClr val="tx1"/>
+              </a:solidFill>
+              <a:effectLst/>
+            </a:endParaRPr>
+          </a:p>
+          <a:p>
+            <a:pPr marL="0" marR="0" lvl="0" indent="0" algn="l" defTabSz="914400" rtl="0" eaLnBrk="0" fontAlgn="base" latinLnBrk="0" hangingPunct="0">
+              <a:lnSpc>
+                <a:spcPct val="100000"/>
+              </a:lnSpc>
+              <a:spcBef>
+                <a:spcPct val="0"/>
+              </a:spcBef>
+              <a:spcAft>
+                <a:spcPct val="0"/>
+              </a:spcAft>
+              <a:buClrTx/>
+              <a:buSzTx/>
+              <a:buFontTx/>
+              <a:buNone/>
+              <a:tabLst/>
+            </a:pPr>
+            <a:r>
+              <a:rPr kumimoji="0" lang="en-US" altLang="en-US" sz="1200" b="1" i="0" u="none" strike="noStrike" cap="none" normalizeH="0" baseline="0" dirty="0">
+                <a:ln>
+                  <a:noFill/>
+                </a:ln>
+                <a:solidFill>
+                  <a:schemeClr val="tx1"/>
+                </a:solidFill>
+                <a:effectLst/>
+                <a:latin typeface="Times New Roman" panose="02020603050405020304" pitchFamily="18" charset="0"/>
+                <a:ea typeface="Calibri" panose="020F0502020204030204" pitchFamily="34" charset="0"/>
+                <a:cs typeface="Times New Roman" panose="02020603050405020304" pitchFamily="18" charset="0"/>
+              </a:rPr>
+              <a:t>De la Guardia, C</a:t>
+            </a:r>
+            <a:r>
+              <a:rPr kumimoji="0" lang="en-US" altLang="en-US" sz="1200" b="0" i="0" u="none" strike="noStrike" cap="none" normalizeH="0" baseline="0" dirty="0">
+                <a:ln>
+                  <a:noFill/>
+                </a:ln>
+                <a:solidFill>
+                  <a:schemeClr val="tx1"/>
+                </a:solidFill>
+                <a:effectLst/>
+                <a:latin typeface="Times New Roman" panose="02020603050405020304" pitchFamily="18" charset="0"/>
+                <a:ea typeface="Calibri" panose="020F0502020204030204" pitchFamily="34" charset="0"/>
+                <a:cs typeface="Times New Roman" panose="02020603050405020304" pitchFamily="18" charset="0"/>
+              </a:rPr>
+              <a:t>. (2016, January 10). </a:t>
+            </a:r>
+          </a:p>
+          <a:p>
+            <a:pPr marL="0" marR="0" lvl="0" indent="0" algn="l" defTabSz="914400" rtl="0" eaLnBrk="0" fontAlgn="base" latinLnBrk="0" hangingPunct="0">
+              <a:lnSpc>
+                <a:spcPct val="100000"/>
+              </a:lnSpc>
+              <a:spcBef>
+                <a:spcPct val="0"/>
+              </a:spcBef>
+              <a:spcAft>
+                <a:spcPct val="0"/>
+              </a:spcAft>
+              <a:buClrTx/>
+              <a:buSzTx/>
+              <a:buFontTx/>
+              <a:buNone/>
+              <a:tabLst/>
+            </a:pPr>
+            <a:r>
+              <a:rPr lang="en-US" altLang="en-US" sz="1200" dirty="0">
+                <a:latin typeface="Times New Roman" panose="02020603050405020304" pitchFamily="18" charset="0"/>
+                <a:ea typeface="Calibri" panose="020F0502020204030204" pitchFamily="34" charset="0"/>
+                <a:cs typeface="Times New Roman" panose="02020603050405020304" pitchFamily="18" charset="0"/>
+              </a:rPr>
+              <a:t>	</a:t>
+            </a:r>
+            <a:r>
+              <a:rPr kumimoji="0" lang="en-US" altLang="en-US" sz="1200" b="0" i="0" u="none" strike="noStrike" cap="none" normalizeH="0" baseline="0" dirty="0">
+                <a:ln>
+                  <a:noFill/>
+                </a:ln>
+                <a:solidFill>
+                  <a:schemeClr val="tx1"/>
+                </a:solidFill>
+                <a:effectLst/>
+                <a:latin typeface="Times New Roman" panose="02020603050405020304" pitchFamily="18" charset="0"/>
+                <a:ea typeface="Calibri" panose="020F0502020204030204" pitchFamily="34" charset="0"/>
+                <a:cs typeface="Times New Roman" panose="02020603050405020304" pitchFamily="18" charset="0"/>
+              </a:rPr>
+              <a:t>Quantum Computation 6: Grover's Search Algorithm. </a:t>
+            </a:r>
+          </a:p>
+          <a:p>
+            <a:pPr marL="0" marR="0" lvl="0" indent="0" algn="l" defTabSz="914400" rtl="0" eaLnBrk="0" fontAlgn="base" latinLnBrk="0" hangingPunct="0">
+              <a:lnSpc>
+                <a:spcPct val="100000"/>
+              </a:lnSpc>
+              <a:spcBef>
+                <a:spcPct val="0"/>
+              </a:spcBef>
+              <a:spcAft>
+                <a:spcPct val="0"/>
+              </a:spcAft>
+              <a:buClrTx/>
+              <a:buSzTx/>
+              <a:buFontTx/>
+              <a:buNone/>
+              <a:tabLst/>
+            </a:pPr>
+            <a:r>
+              <a:rPr lang="en-US" altLang="en-US" sz="1200" dirty="0">
+                <a:latin typeface="Times New Roman" panose="02020603050405020304" pitchFamily="18" charset="0"/>
+                <a:ea typeface="Calibri" panose="020F0502020204030204" pitchFamily="34" charset="0"/>
+                <a:cs typeface="Times New Roman" panose="02020603050405020304" pitchFamily="18" charset="0"/>
+              </a:rPr>
+              <a:t>	</a:t>
+            </a:r>
+            <a:r>
+              <a:rPr kumimoji="0" lang="en-US" altLang="en-US" sz="1200" b="0" i="0" u="none" strike="noStrike" cap="none" normalizeH="0" baseline="0" dirty="0">
+                <a:ln>
+                  <a:noFill/>
+                </a:ln>
+                <a:solidFill>
+                  <a:schemeClr val="tx1"/>
+                </a:solidFill>
+                <a:effectLst/>
+                <a:latin typeface="Times New Roman" panose="02020603050405020304" pitchFamily="18" charset="0"/>
+                <a:ea typeface="Calibri" panose="020F0502020204030204" pitchFamily="34" charset="0"/>
+                <a:cs typeface="Times New Roman" panose="02020603050405020304" pitchFamily="18" charset="0"/>
+              </a:rPr>
+              <a:t>Retrieved from YouTube: https://youtu.be/JCM7M7XfSFg</a:t>
+            </a:r>
+            <a:endParaRPr kumimoji="0" lang="en-US" altLang="en-US" sz="800" b="0" i="0" u="none" strike="noStrike" cap="none" normalizeH="0" baseline="0" dirty="0">
+              <a:ln>
+                <a:noFill/>
+              </a:ln>
+              <a:solidFill>
+                <a:schemeClr val="tx1"/>
+              </a:solidFill>
+              <a:effectLst/>
+            </a:endParaRPr>
+          </a:p>
+          <a:p>
+            <a:pPr marL="0" marR="0" lvl="0" indent="0" algn="l" defTabSz="914400" rtl="0" eaLnBrk="0" fontAlgn="base" latinLnBrk="0" hangingPunct="0">
+              <a:lnSpc>
+                <a:spcPct val="100000"/>
+              </a:lnSpc>
+              <a:spcBef>
+                <a:spcPct val="0"/>
+              </a:spcBef>
+              <a:spcAft>
+                <a:spcPct val="0"/>
+              </a:spcAft>
+              <a:buClrTx/>
+              <a:buSzTx/>
+              <a:buFontTx/>
+              <a:buNone/>
+              <a:tabLst/>
+            </a:pPr>
+            <a:r>
+              <a:rPr kumimoji="0" lang="en-US" altLang="en-US" sz="1200" b="1" i="0" u="none" strike="noStrike" cap="none" normalizeH="0" baseline="0" dirty="0">
+                <a:ln>
+                  <a:noFill/>
+                </a:ln>
+                <a:solidFill>
+                  <a:schemeClr val="tx1"/>
+                </a:solidFill>
+                <a:effectLst/>
+                <a:latin typeface="Times New Roman" panose="02020603050405020304" pitchFamily="18" charset="0"/>
+                <a:ea typeface="Calibri" panose="020F0502020204030204" pitchFamily="34" charset="0"/>
+                <a:cs typeface="Times New Roman" panose="02020603050405020304" pitchFamily="18" charset="0"/>
+              </a:rPr>
+              <a:t>Grover, L</a:t>
+            </a:r>
+            <a:r>
+              <a:rPr kumimoji="0" lang="en-US" altLang="en-US" sz="1200" b="0" i="0" u="none" strike="noStrike" cap="none" normalizeH="0" baseline="0" dirty="0">
+                <a:ln>
+                  <a:noFill/>
+                </a:ln>
+                <a:solidFill>
+                  <a:schemeClr val="tx1"/>
+                </a:solidFill>
+                <a:effectLst/>
+                <a:latin typeface="Times New Roman" panose="02020603050405020304" pitchFamily="18" charset="0"/>
+                <a:ea typeface="Calibri" panose="020F0502020204030204" pitchFamily="34" charset="0"/>
+                <a:cs typeface="Times New Roman" panose="02020603050405020304" pitchFamily="18" charset="0"/>
+              </a:rPr>
+              <a:t>. (1996). </a:t>
+            </a:r>
+          </a:p>
+          <a:p>
+            <a:pPr marL="0" marR="0" lvl="0" indent="0" algn="l" defTabSz="914400" rtl="0" eaLnBrk="0" fontAlgn="base" latinLnBrk="0" hangingPunct="0">
+              <a:lnSpc>
+                <a:spcPct val="100000"/>
+              </a:lnSpc>
+              <a:spcBef>
+                <a:spcPct val="0"/>
+              </a:spcBef>
+              <a:spcAft>
+                <a:spcPct val="0"/>
+              </a:spcAft>
+              <a:buClrTx/>
+              <a:buSzTx/>
+              <a:buFontTx/>
+              <a:buNone/>
+              <a:tabLst/>
+            </a:pPr>
+            <a:r>
+              <a:rPr lang="en-US" altLang="en-US" sz="1200" dirty="0">
+                <a:latin typeface="Times New Roman" panose="02020603050405020304" pitchFamily="18" charset="0"/>
+                <a:ea typeface="Calibri" panose="020F0502020204030204" pitchFamily="34" charset="0"/>
+                <a:cs typeface="Times New Roman" panose="02020603050405020304" pitchFamily="18" charset="0"/>
+              </a:rPr>
+              <a:t>	</a:t>
+            </a:r>
+            <a:r>
+              <a:rPr kumimoji="0" lang="en-US" altLang="en-US" sz="1200" b="0" i="0" u="none" strike="noStrike" cap="none" normalizeH="0" baseline="0" dirty="0">
+                <a:ln>
+                  <a:noFill/>
+                </a:ln>
+                <a:solidFill>
+                  <a:schemeClr val="tx1"/>
+                </a:solidFill>
+                <a:effectLst/>
+                <a:latin typeface="Times New Roman" panose="02020603050405020304" pitchFamily="18" charset="0"/>
+                <a:ea typeface="Calibri" panose="020F0502020204030204" pitchFamily="34" charset="0"/>
+                <a:cs typeface="Times New Roman" panose="02020603050405020304" pitchFamily="18" charset="0"/>
+              </a:rPr>
+              <a:t>A fast quantum mechanical algorithm for database search. </a:t>
+            </a:r>
+          </a:p>
+          <a:p>
+            <a:pPr marL="0" marR="0" lvl="0" indent="0" algn="l" defTabSz="914400" rtl="0" eaLnBrk="0" fontAlgn="base" latinLnBrk="0" hangingPunct="0">
+              <a:lnSpc>
+                <a:spcPct val="100000"/>
+              </a:lnSpc>
+              <a:spcBef>
+                <a:spcPct val="0"/>
+              </a:spcBef>
+              <a:spcAft>
+                <a:spcPct val="0"/>
+              </a:spcAft>
+              <a:buClrTx/>
+              <a:buSzTx/>
+              <a:buFontTx/>
+              <a:buNone/>
+              <a:tabLst/>
+            </a:pPr>
+            <a:r>
+              <a:rPr lang="en-US" altLang="en-US" sz="1200" dirty="0">
+                <a:latin typeface="Times New Roman" panose="02020603050405020304" pitchFamily="18" charset="0"/>
+                <a:ea typeface="Calibri" panose="020F0502020204030204" pitchFamily="34" charset="0"/>
+                <a:cs typeface="Times New Roman" panose="02020603050405020304" pitchFamily="18" charset="0"/>
+              </a:rPr>
+              <a:t>	</a:t>
+            </a:r>
+            <a:r>
+              <a:rPr kumimoji="0" lang="en-US" altLang="en-US" sz="1200" b="0" i="1" u="none" strike="noStrike" cap="none" normalizeH="0" baseline="0" dirty="0">
+                <a:ln>
+                  <a:noFill/>
+                </a:ln>
+                <a:solidFill>
+                  <a:schemeClr val="tx1"/>
+                </a:solidFill>
+                <a:effectLst/>
+                <a:latin typeface="Times New Roman" panose="02020603050405020304" pitchFamily="18" charset="0"/>
+                <a:ea typeface="Calibri" panose="020F0502020204030204" pitchFamily="34" charset="0"/>
+                <a:cs typeface="Times New Roman" panose="02020603050405020304" pitchFamily="18" charset="0"/>
+              </a:rPr>
+              <a:t>Proceedings, 28th Annual ACM Symposium on the Theory of Computing (STOC)</a:t>
+            </a:r>
+            <a:r>
+              <a:rPr kumimoji="0" lang="en-US" altLang="en-US" sz="1200" b="0" i="0" u="none" strike="noStrike" cap="none" normalizeH="0" baseline="0" dirty="0">
+                <a:ln>
+                  <a:noFill/>
+                </a:ln>
+                <a:solidFill>
+                  <a:schemeClr val="tx1"/>
+                </a:solidFill>
+                <a:effectLst/>
+                <a:latin typeface="Times New Roman" panose="02020603050405020304" pitchFamily="18" charset="0"/>
+                <a:ea typeface="Calibri" panose="020F0502020204030204" pitchFamily="34" charset="0"/>
+                <a:cs typeface="Times New Roman" panose="02020603050405020304" pitchFamily="18" charset="0"/>
+              </a:rPr>
+              <a:t>, 212-221.</a:t>
+            </a:r>
+            <a:endParaRPr kumimoji="0" lang="en-US" altLang="en-US" sz="800" b="0" i="0" u="none" strike="noStrike" cap="none" normalizeH="0" baseline="0" dirty="0">
+              <a:ln>
+                <a:noFill/>
+              </a:ln>
+              <a:solidFill>
+                <a:schemeClr val="tx1"/>
+              </a:solidFill>
+              <a:effectLst/>
+            </a:endParaRPr>
+          </a:p>
+          <a:p>
+            <a:pPr marL="0" marR="0" lvl="0" indent="0" algn="l" defTabSz="914400" rtl="0" eaLnBrk="0" fontAlgn="base" latinLnBrk="0" hangingPunct="0">
+              <a:lnSpc>
+                <a:spcPct val="100000"/>
+              </a:lnSpc>
+              <a:spcBef>
+                <a:spcPct val="0"/>
+              </a:spcBef>
+              <a:spcAft>
+                <a:spcPct val="0"/>
+              </a:spcAft>
+              <a:buClrTx/>
+              <a:buSzTx/>
+              <a:buFontTx/>
+              <a:buNone/>
+              <a:tabLst/>
+            </a:pPr>
+            <a:r>
+              <a:rPr kumimoji="0" lang="en-US" altLang="en-US" sz="1200" b="1" i="0" u="none" strike="noStrike" cap="none" normalizeH="0" baseline="0" dirty="0" err="1">
+                <a:ln>
+                  <a:noFill/>
+                </a:ln>
+                <a:solidFill>
+                  <a:schemeClr val="tx1"/>
+                </a:solidFill>
+                <a:effectLst/>
+                <a:latin typeface="Times New Roman" panose="02020603050405020304" pitchFamily="18" charset="0"/>
+                <a:ea typeface="Calibri" panose="020F0502020204030204" pitchFamily="34" charset="0"/>
+                <a:cs typeface="Times New Roman" panose="02020603050405020304" pitchFamily="18" charset="0"/>
+              </a:rPr>
+              <a:t>Gueddana</a:t>
+            </a:r>
+            <a:r>
+              <a:rPr kumimoji="0" lang="en-US" altLang="en-US" sz="1200" b="1" i="0" u="none" strike="noStrike" cap="none" normalizeH="0" baseline="0" dirty="0">
+                <a:ln>
+                  <a:noFill/>
+                </a:ln>
+                <a:solidFill>
+                  <a:schemeClr val="tx1"/>
+                </a:solidFill>
+                <a:effectLst/>
+                <a:latin typeface="Times New Roman" panose="02020603050405020304" pitchFamily="18" charset="0"/>
+                <a:ea typeface="Calibri" panose="020F0502020204030204" pitchFamily="34" charset="0"/>
+                <a:cs typeface="Times New Roman" panose="02020603050405020304" pitchFamily="18" charset="0"/>
+              </a:rPr>
+              <a:t>, A., </a:t>
+            </a:r>
+            <a:r>
+              <a:rPr kumimoji="0" lang="en-US" altLang="en-US" sz="1200" b="1" i="0" u="none" strike="noStrike" cap="none" normalizeH="0" baseline="0" dirty="0" err="1">
+                <a:ln>
+                  <a:noFill/>
+                </a:ln>
+                <a:solidFill>
+                  <a:schemeClr val="tx1"/>
+                </a:solidFill>
+                <a:effectLst/>
+                <a:latin typeface="Times New Roman" panose="02020603050405020304" pitchFamily="18" charset="0"/>
+                <a:ea typeface="Calibri" panose="020F0502020204030204" pitchFamily="34" charset="0"/>
+                <a:cs typeface="Times New Roman" panose="02020603050405020304" pitchFamily="18" charset="0"/>
+              </a:rPr>
+              <a:t>Chatta</a:t>
+            </a:r>
+            <a:r>
+              <a:rPr kumimoji="0" lang="en-US" altLang="en-US" sz="1200" b="1" i="0" u="none" strike="noStrike" cap="none" normalizeH="0" baseline="0" dirty="0">
+                <a:ln>
+                  <a:noFill/>
+                </a:ln>
+                <a:solidFill>
+                  <a:schemeClr val="tx1"/>
+                </a:solidFill>
+                <a:effectLst/>
+                <a:latin typeface="Times New Roman" panose="02020603050405020304" pitchFamily="18" charset="0"/>
+                <a:ea typeface="Calibri" panose="020F0502020204030204" pitchFamily="34" charset="0"/>
+                <a:cs typeface="Times New Roman" panose="02020603050405020304" pitchFamily="18" charset="0"/>
+              </a:rPr>
+              <a:t>, R., &amp; </a:t>
+            </a:r>
+            <a:r>
+              <a:rPr kumimoji="0" lang="en-US" altLang="en-US" sz="1200" b="1" i="0" u="none" strike="noStrike" cap="none" normalizeH="0" baseline="0" dirty="0" err="1">
+                <a:ln>
+                  <a:noFill/>
+                </a:ln>
+                <a:solidFill>
+                  <a:schemeClr val="tx1"/>
+                </a:solidFill>
+                <a:effectLst/>
+                <a:latin typeface="Times New Roman" panose="02020603050405020304" pitchFamily="18" charset="0"/>
+                <a:ea typeface="Calibri" panose="020F0502020204030204" pitchFamily="34" charset="0"/>
+                <a:cs typeface="Times New Roman" panose="02020603050405020304" pitchFamily="18" charset="0"/>
+              </a:rPr>
+              <a:t>Boudriga</a:t>
+            </a:r>
+            <a:r>
+              <a:rPr kumimoji="0" lang="en-US" altLang="en-US" sz="1200" b="1" i="0" u="none" strike="noStrike" cap="none" normalizeH="0" baseline="0" dirty="0">
+                <a:ln>
+                  <a:noFill/>
+                </a:ln>
+                <a:solidFill>
+                  <a:schemeClr val="tx1"/>
+                </a:solidFill>
+                <a:effectLst/>
+                <a:latin typeface="Times New Roman" panose="02020603050405020304" pitchFamily="18" charset="0"/>
+                <a:ea typeface="Calibri" panose="020F0502020204030204" pitchFamily="34" charset="0"/>
+                <a:cs typeface="Times New Roman" panose="02020603050405020304" pitchFamily="18" charset="0"/>
+              </a:rPr>
+              <a:t>, N</a:t>
+            </a:r>
+            <a:r>
+              <a:rPr kumimoji="0" lang="en-US" altLang="en-US" sz="1200" b="0" i="0" u="none" strike="noStrike" cap="none" normalizeH="0" baseline="0" dirty="0">
+                <a:ln>
+                  <a:noFill/>
+                </a:ln>
+                <a:solidFill>
+                  <a:schemeClr val="tx1"/>
+                </a:solidFill>
+                <a:effectLst/>
+                <a:latin typeface="Times New Roman" panose="02020603050405020304" pitchFamily="18" charset="0"/>
+                <a:ea typeface="Calibri" panose="020F0502020204030204" pitchFamily="34" charset="0"/>
+                <a:cs typeface="Times New Roman" panose="02020603050405020304" pitchFamily="18" charset="0"/>
+              </a:rPr>
+              <a:t>. (2010). </a:t>
+            </a:r>
+          </a:p>
+          <a:p>
+            <a:pPr marL="0" marR="0" lvl="0" indent="0" algn="l" defTabSz="914400" rtl="0" eaLnBrk="0" fontAlgn="base" latinLnBrk="0" hangingPunct="0">
+              <a:lnSpc>
+                <a:spcPct val="100000"/>
+              </a:lnSpc>
+              <a:spcBef>
+                <a:spcPct val="0"/>
+              </a:spcBef>
+              <a:spcAft>
+                <a:spcPct val="0"/>
+              </a:spcAft>
+              <a:buClrTx/>
+              <a:buSzTx/>
+              <a:buFontTx/>
+              <a:buNone/>
+              <a:tabLst/>
+            </a:pPr>
+            <a:r>
+              <a:rPr lang="en-US" altLang="en-US" sz="1200" dirty="0">
+                <a:latin typeface="Times New Roman" panose="02020603050405020304" pitchFamily="18" charset="0"/>
+                <a:ea typeface="Calibri" panose="020F0502020204030204" pitchFamily="34" charset="0"/>
+                <a:cs typeface="Times New Roman" panose="02020603050405020304" pitchFamily="18" charset="0"/>
+              </a:rPr>
+              <a:t>	</a:t>
+            </a:r>
+            <a:r>
+              <a:rPr kumimoji="0" lang="en-US" altLang="en-US" sz="1200" b="0" i="0" u="none" strike="noStrike" cap="none" normalizeH="0" baseline="0" dirty="0">
+                <a:ln>
+                  <a:noFill/>
+                </a:ln>
+                <a:solidFill>
+                  <a:schemeClr val="tx1"/>
+                </a:solidFill>
+                <a:effectLst/>
+                <a:latin typeface="Times New Roman" panose="02020603050405020304" pitchFamily="18" charset="0"/>
+                <a:ea typeface="Calibri" panose="020F0502020204030204" pitchFamily="34" charset="0"/>
+                <a:cs typeface="Times New Roman" panose="02020603050405020304" pitchFamily="18" charset="0"/>
+              </a:rPr>
+              <a:t>Optimized Methods for Inserting and Deleting Records and Data Retrieving in Quantum Database. </a:t>
+            </a:r>
+          </a:p>
+          <a:p>
+            <a:pPr marL="0" marR="0" lvl="0" indent="0" algn="l" defTabSz="914400" rtl="0" eaLnBrk="0" fontAlgn="base" latinLnBrk="0" hangingPunct="0">
+              <a:lnSpc>
+                <a:spcPct val="100000"/>
+              </a:lnSpc>
+              <a:spcBef>
+                <a:spcPct val="0"/>
+              </a:spcBef>
+              <a:spcAft>
+                <a:spcPct val="0"/>
+              </a:spcAft>
+              <a:buClrTx/>
+              <a:buSzTx/>
+              <a:buFontTx/>
+              <a:buNone/>
+              <a:tabLst/>
+            </a:pPr>
+            <a:r>
+              <a:rPr lang="en-US" altLang="en-US" sz="1200" dirty="0">
+                <a:latin typeface="Times New Roman" panose="02020603050405020304" pitchFamily="18" charset="0"/>
+                <a:ea typeface="Calibri" panose="020F0502020204030204" pitchFamily="34" charset="0"/>
+                <a:cs typeface="Times New Roman" panose="02020603050405020304" pitchFamily="18" charset="0"/>
+              </a:rPr>
+              <a:t>	</a:t>
+            </a:r>
+            <a:r>
+              <a:rPr kumimoji="0" lang="en-US" altLang="en-US" sz="1200" b="0" i="1" u="none" strike="noStrike" cap="none" normalizeH="0" baseline="0" dirty="0">
+                <a:ln>
+                  <a:noFill/>
+                </a:ln>
+                <a:solidFill>
+                  <a:schemeClr val="tx1"/>
+                </a:solidFill>
+                <a:effectLst/>
+                <a:latin typeface="Times New Roman" panose="02020603050405020304" pitchFamily="18" charset="0"/>
+                <a:ea typeface="Calibri" panose="020F0502020204030204" pitchFamily="34" charset="0"/>
+                <a:cs typeface="Times New Roman" panose="02020603050405020304" pitchFamily="18" charset="0"/>
+              </a:rPr>
+              <a:t>2010 12th International Conference on Transparent Optical Networks Transparent Optical Networks (ICTON), </a:t>
+            </a:r>
+          </a:p>
+          <a:p>
+            <a:pPr marL="0" marR="0" lvl="0" indent="0" algn="l" defTabSz="914400" rtl="0" eaLnBrk="0" fontAlgn="base" latinLnBrk="0" hangingPunct="0">
+              <a:lnSpc>
+                <a:spcPct val="100000"/>
+              </a:lnSpc>
+              <a:spcBef>
+                <a:spcPct val="0"/>
+              </a:spcBef>
+              <a:spcAft>
+                <a:spcPct val="0"/>
+              </a:spcAft>
+              <a:buClrTx/>
+              <a:buSzTx/>
+              <a:buFontTx/>
+              <a:buNone/>
+              <a:tabLst/>
+            </a:pPr>
+            <a:r>
+              <a:rPr lang="en-US" altLang="en-US" sz="1200" i="1" dirty="0">
+                <a:latin typeface="Times New Roman" panose="02020603050405020304" pitchFamily="18" charset="0"/>
+                <a:ea typeface="Calibri" panose="020F0502020204030204" pitchFamily="34" charset="0"/>
+                <a:cs typeface="Times New Roman" panose="02020603050405020304" pitchFamily="18" charset="0"/>
+              </a:rPr>
+              <a:t>		</a:t>
+            </a:r>
+            <a:r>
+              <a:rPr kumimoji="0" lang="en-US" altLang="en-US" sz="1200" b="0" i="1" u="none" strike="noStrike" cap="none" normalizeH="0" baseline="0" dirty="0">
+                <a:ln>
+                  <a:noFill/>
+                </a:ln>
+                <a:solidFill>
+                  <a:schemeClr val="tx1"/>
+                </a:solidFill>
+                <a:effectLst/>
+                <a:latin typeface="Times New Roman" panose="02020603050405020304" pitchFamily="18" charset="0"/>
+                <a:ea typeface="Calibri" panose="020F0502020204030204" pitchFamily="34" charset="0"/>
+                <a:cs typeface="Times New Roman" panose="02020603050405020304" pitchFamily="18" charset="0"/>
+              </a:rPr>
+              <a:t>2010 12th International Conference on. :1-5 Jun 2010</a:t>
+            </a:r>
+            <a:r>
+              <a:rPr kumimoji="0" lang="en-US" altLang="en-US" sz="1200" b="0" i="0" u="none" strike="noStrike" cap="none" normalizeH="0" baseline="0" dirty="0">
+                <a:ln>
+                  <a:noFill/>
+                </a:ln>
+                <a:solidFill>
+                  <a:schemeClr val="tx1"/>
+                </a:solidFill>
+                <a:effectLst/>
+                <a:latin typeface="Times New Roman" panose="02020603050405020304" pitchFamily="18" charset="0"/>
+                <a:ea typeface="Calibri" panose="020F0502020204030204" pitchFamily="34" charset="0"/>
+                <a:cs typeface="Times New Roman" panose="02020603050405020304" pitchFamily="18" charset="0"/>
+              </a:rPr>
+              <a:t>.</a:t>
+            </a:r>
+            <a:endParaRPr kumimoji="0" lang="en-US" altLang="en-US" sz="800" b="0" i="0" u="none" strike="noStrike" cap="none" normalizeH="0" baseline="0" dirty="0">
+              <a:ln>
+                <a:noFill/>
+              </a:ln>
+              <a:solidFill>
+                <a:schemeClr val="tx1"/>
+              </a:solidFill>
+              <a:effectLst/>
+            </a:endParaRPr>
+          </a:p>
+          <a:p>
+            <a:pPr marL="0" marR="0" lvl="0" indent="0" algn="l" defTabSz="914400" rtl="0" eaLnBrk="0" fontAlgn="base" latinLnBrk="0" hangingPunct="0">
+              <a:lnSpc>
+                <a:spcPct val="100000"/>
+              </a:lnSpc>
+              <a:spcBef>
+                <a:spcPct val="0"/>
+              </a:spcBef>
+              <a:spcAft>
+                <a:spcPct val="0"/>
+              </a:spcAft>
+              <a:buClrTx/>
+              <a:buSzTx/>
+              <a:buFontTx/>
+              <a:buNone/>
+              <a:tabLst/>
+            </a:pPr>
+            <a:r>
+              <a:rPr kumimoji="0" lang="en-US" altLang="en-US" sz="1200" b="1" i="0" u="none" strike="noStrike" cap="none" normalizeH="0" baseline="0" dirty="0">
+                <a:ln>
+                  <a:noFill/>
+                </a:ln>
+                <a:solidFill>
+                  <a:schemeClr val="tx1"/>
+                </a:solidFill>
+                <a:effectLst/>
+                <a:latin typeface="Times New Roman" panose="02020603050405020304" pitchFamily="18" charset="0"/>
+                <a:ea typeface="Calibri" panose="020F0502020204030204" pitchFamily="34" charset="0"/>
+                <a:cs typeface="Times New Roman" panose="02020603050405020304" pitchFamily="18" charset="0"/>
+              </a:rPr>
+              <a:t>Harrison, G</a:t>
+            </a:r>
+            <a:r>
+              <a:rPr kumimoji="0" lang="en-US" altLang="en-US" sz="1200" b="0" i="0" u="none" strike="noStrike" cap="none" normalizeH="0" baseline="0" dirty="0">
+                <a:ln>
+                  <a:noFill/>
+                </a:ln>
+                <a:solidFill>
+                  <a:schemeClr val="tx1"/>
+                </a:solidFill>
+                <a:effectLst/>
+                <a:latin typeface="Times New Roman" panose="02020603050405020304" pitchFamily="18" charset="0"/>
+                <a:ea typeface="Calibri" panose="020F0502020204030204" pitchFamily="34" charset="0"/>
+                <a:cs typeface="Times New Roman" panose="02020603050405020304" pitchFamily="18" charset="0"/>
+              </a:rPr>
+              <a:t>. (2020). </a:t>
+            </a:r>
+          </a:p>
+          <a:p>
+            <a:pPr marL="0" marR="0" lvl="0" indent="0" algn="l" defTabSz="914400" rtl="0" eaLnBrk="0" fontAlgn="base" latinLnBrk="0" hangingPunct="0">
+              <a:lnSpc>
+                <a:spcPct val="100000"/>
+              </a:lnSpc>
+              <a:spcBef>
+                <a:spcPct val="0"/>
+              </a:spcBef>
+              <a:spcAft>
+                <a:spcPct val="0"/>
+              </a:spcAft>
+              <a:buClrTx/>
+              <a:buSzTx/>
+              <a:buFontTx/>
+              <a:buNone/>
+              <a:tabLst/>
+            </a:pPr>
+            <a:r>
+              <a:rPr lang="en-US" altLang="en-US" sz="1200" dirty="0">
+                <a:latin typeface="Times New Roman" panose="02020603050405020304" pitchFamily="18" charset="0"/>
+                <a:ea typeface="Calibri" panose="020F0502020204030204" pitchFamily="34" charset="0"/>
+                <a:cs typeface="Times New Roman" panose="02020603050405020304" pitchFamily="18" charset="0"/>
+              </a:rPr>
+              <a:t>	</a:t>
+            </a:r>
+            <a:r>
+              <a:rPr kumimoji="0" lang="en-US" altLang="en-US" sz="1200" b="0" i="0" u="none" strike="noStrike" cap="none" normalizeH="0" baseline="0" dirty="0">
+                <a:ln>
+                  <a:noFill/>
+                </a:ln>
+                <a:solidFill>
+                  <a:schemeClr val="tx1"/>
+                </a:solidFill>
+                <a:effectLst/>
+                <a:latin typeface="Times New Roman" panose="02020603050405020304" pitchFamily="18" charset="0"/>
+                <a:ea typeface="Calibri" panose="020F0502020204030204" pitchFamily="34" charset="0"/>
+                <a:cs typeface="Times New Roman" panose="02020603050405020304" pitchFamily="18" charset="0"/>
+              </a:rPr>
+              <a:t>What Does Quantum Supremacy Mean for Databases? </a:t>
+            </a:r>
+          </a:p>
+          <a:p>
+            <a:pPr marL="0" marR="0" lvl="0" indent="0" algn="l" defTabSz="914400" rtl="0" eaLnBrk="0" fontAlgn="base" latinLnBrk="0" hangingPunct="0">
+              <a:lnSpc>
+                <a:spcPct val="100000"/>
+              </a:lnSpc>
+              <a:spcBef>
+                <a:spcPct val="0"/>
+              </a:spcBef>
+              <a:spcAft>
+                <a:spcPct val="0"/>
+              </a:spcAft>
+              <a:buClrTx/>
+              <a:buSzTx/>
+              <a:buFontTx/>
+              <a:buNone/>
+              <a:tabLst/>
+            </a:pPr>
+            <a:r>
+              <a:rPr lang="en-US" altLang="en-US" sz="1200" dirty="0">
+                <a:latin typeface="Times New Roman" panose="02020603050405020304" pitchFamily="18" charset="0"/>
+                <a:ea typeface="Calibri" panose="020F0502020204030204" pitchFamily="34" charset="0"/>
+                <a:cs typeface="Times New Roman" panose="02020603050405020304" pitchFamily="18" charset="0"/>
+              </a:rPr>
+              <a:t>	</a:t>
+            </a:r>
+            <a:r>
+              <a:rPr kumimoji="0" lang="en-US" altLang="en-US" sz="1200" b="0" i="1" u="none" strike="noStrike" cap="none" normalizeH="0" baseline="0" dirty="0">
+                <a:ln>
+                  <a:noFill/>
+                </a:ln>
+                <a:solidFill>
+                  <a:schemeClr val="tx1"/>
+                </a:solidFill>
+                <a:effectLst/>
+                <a:latin typeface="Times New Roman" panose="02020603050405020304" pitchFamily="18" charset="0"/>
+                <a:ea typeface="Calibri" panose="020F0502020204030204" pitchFamily="34" charset="0"/>
+                <a:cs typeface="Times New Roman" panose="02020603050405020304" pitchFamily="18" charset="0"/>
+              </a:rPr>
+              <a:t>Database Trends and Applications Dec 19/Jan20</a:t>
+            </a:r>
+            <a:r>
+              <a:rPr kumimoji="0" lang="en-US" altLang="en-US" sz="1200" b="0" i="0" u="none" strike="noStrike" cap="none" normalizeH="0" baseline="0" dirty="0">
+                <a:ln>
+                  <a:noFill/>
+                </a:ln>
+                <a:solidFill>
+                  <a:schemeClr val="tx1"/>
+                </a:solidFill>
+                <a:effectLst/>
+                <a:latin typeface="Times New Roman" panose="02020603050405020304" pitchFamily="18" charset="0"/>
+                <a:ea typeface="Calibri" panose="020F0502020204030204" pitchFamily="34" charset="0"/>
+                <a:cs typeface="Times New Roman" panose="02020603050405020304" pitchFamily="18" charset="0"/>
+              </a:rPr>
+              <a:t>, 45.</a:t>
+            </a:r>
+            <a:endParaRPr kumimoji="0" lang="en-US" altLang="en-US" sz="800" b="0" i="0" u="none" strike="noStrike" cap="none" normalizeH="0" baseline="0" dirty="0">
+              <a:ln>
+                <a:noFill/>
+              </a:ln>
+              <a:solidFill>
+                <a:schemeClr val="tx1"/>
+              </a:solidFill>
+              <a:effectLst/>
+            </a:endParaRPr>
+          </a:p>
+          <a:p>
+            <a:pPr marL="0" marR="0" lvl="0" indent="0" algn="l" defTabSz="914400" rtl="0" eaLnBrk="0" fontAlgn="base" latinLnBrk="0" hangingPunct="0">
+              <a:lnSpc>
+                <a:spcPct val="100000"/>
+              </a:lnSpc>
+              <a:spcBef>
+                <a:spcPct val="0"/>
+              </a:spcBef>
+              <a:spcAft>
+                <a:spcPct val="0"/>
+              </a:spcAft>
+              <a:buClrTx/>
+              <a:buSzTx/>
+              <a:buFontTx/>
+              <a:buNone/>
+              <a:tabLst/>
+            </a:pPr>
+            <a:r>
+              <a:rPr kumimoji="0" lang="en-US" altLang="en-US" sz="1200" b="1" i="0" u="none" strike="noStrike" cap="none" normalizeH="0" baseline="0" dirty="0">
+                <a:ln>
+                  <a:noFill/>
+                </a:ln>
+                <a:solidFill>
+                  <a:schemeClr val="tx1"/>
+                </a:solidFill>
+                <a:effectLst/>
+                <a:latin typeface="Times New Roman" panose="02020603050405020304" pitchFamily="18" charset="0"/>
+                <a:ea typeface="Calibri" panose="020F0502020204030204" pitchFamily="34" charset="0"/>
+                <a:cs typeface="Times New Roman" panose="02020603050405020304" pitchFamily="18" charset="0"/>
+              </a:rPr>
+              <a:t>Liu, J., Arden, O., George, M., &amp; Myers, A. </a:t>
+            </a:r>
+            <a:r>
+              <a:rPr kumimoji="0" lang="en-US" altLang="en-US" sz="1200" b="0" i="0" u="none" strike="noStrike" cap="none" normalizeH="0" baseline="0" dirty="0">
+                <a:ln>
+                  <a:noFill/>
+                </a:ln>
+                <a:solidFill>
+                  <a:schemeClr val="tx1"/>
+                </a:solidFill>
+                <a:effectLst/>
+                <a:latin typeface="Times New Roman" panose="02020603050405020304" pitchFamily="18" charset="0"/>
+                <a:ea typeface="Calibri" panose="020F0502020204030204" pitchFamily="34" charset="0"/>
+                <a:cs typeface="Times New Roman" panose="02020603050405020304" pitchFamily="18" charset="0"/>
+              </a:rPr>
+              <a:t>(2017). </a:t>
+            </a:r>
+          </a:p>
+          <a:p>
+            <a:pPr marL="0" marR="0" lvl="0" indent="0" algn="l" defTabSz="914400" rtl="0" eaLnBrk="0" fontAlgn="base" latinLnBrk="0" hangingPunct="0">
+              <a:lnSpc>
+                <a:spcPct val="100000"/>
+              </a:lnSpc>
+              <a:spcBef>
+                <a:spcPct val="0"/>
+              </a:spcBef>
+              <a:spcAft>
+                <a:spcPct val="0"/>
+              </a:spcAft>
+              <a:buClrTx/>
+              <a:buSzTx/>
+              <a:buFontTx/>
+              <a:buNone/>
+              <a:tabLst/>
+            </a:pPr>
+            <a:r>
+              <a:rPr lang="en-US" altLang="en-US" sz="1200" dirty="0">
+                <a:latin typeface="Times New Roman" panose="02020603050405020304" pitchFamily="18" charset="0"/>
+                <a:ea typeface="Calibri" panose="020F0502020204030204" pitchFamily="34" charset="0"/>
+                <a:cs typeface="Times New Roman" panose="02020603050405020304" pitchFamily="18" charset="0"/>
+              </a:rPr>
+              <a:t>	</a:t>
+            </a:r>
+            <a:r>
+              <a:rPr kumimoji="0" lang="en-US" altLang="en-US" sz="1200" b="0" i="0" u="none" strike="noStrike" cap="none" normalizeH="0" baseline="0" dirty="0">
+                <a:ln>
+                  <a:noFill/>
+                </a:ln>
+                <a:solidFill>
+                  <a:schemeClr val="tx1"/>
+                </a:solidFill>
+                <a:effectLst/>
+                <a:latin typeface="Times New Roman" panose="02020603050405020304" pitchFamily="18" charset="0"/>
+                <a:ea typeface="Calibri" panose="020F0502020204030204" pitchFamily="34" charset="0"/>
+                <a:cs typeface="Times New Roman" panose="02020603050405020304" pitchFamily="18" charset="0"/>
+              </a:rPr>
+              <a:t>Fabric: Building open distributed systems securely by construction. </a:t>
+            </a:r>
+          </a:p>
+          <a:p>
+            <a:pPr marL="0" marR="0" lvl="0" indent="0" algn="l" defTabSz="914400" rtl="0" eaLnBrk="0" fontAlgn="base" latinLnBrk="0" hangingPunct="0">
+              <a:lnSpc>
+                <a:spcPct val="100000"/>
+              </a:lnSpc>
+              <a:spcBef>
+                <a:spcPct val="0"/>
+              </a:spcBef>
+              <a:spcAft>
+                <a:spcPct val="0"/>
+              </a:spcAft>
+              <a:buClrTx/>
+              <a:buSzTx/>
+              <a:buFontTx/>
+              <a:buNone/>
+              <a:tabLst/>
+            </a:pPr>
+            <a:r>
+              <a:rPr lang="en-US" altLang="en-US" sz="1200" dirty="0">
+                <a:latin typeface="Times New Roman" panose="02020603050405020304" pitchFamily="18" charset="0"/>
+                <a:ea typeface="Calibri" panose="020F0502020204030204" pitchFamily="34" charset="0"/>
+                <a:cs typeface="Times New Roman" panose="02020603050405020304" pitchFamily="18" charset="0"/>
+              </a:rPr>
+              <a:t>	</a:t>
+            </a:r>
+            <a:r>
+              <a:rPr kumimoji="0" lang="en-US" altLang="en-US" sz="1200" b="0" i="1" u="none" strike="noStrike" cap="none" normalizeH="0" baseline="0" dirty="0">
+                <a:ln>
+                  <a:noFill/>
+                </a:ln>
+                <a:solidFill>
+                  <a:schemeClr val="tx1"/>
+                </a:solidFill>
+                <a:effectLst/>
+                <a:latin typeface="Times New Roman" panose="02020603050405020304" pitchFamily="18" charset="0"/>
+                <a:ea typeface="Calibri" panose="020F0502020204030204" pitchFamily="34" charset="0"/>
+                <a:cs typeface="Times New Roman" panose="02020603050405020304" pitchFamily="18" charset="0"/>
+              </a:rPr>
+              <a:t>Journal of Computer Security 25</a:t>
+            </a:r>
+            <a:r>
+              <a:rPr kumimoji="0" lang="en-US" altLang="en-US" sz="1200" b="0" i="0" u="none" strike="noStrike" cap="none" normalizeH="0" baseline="0" dirty="0">
+                <a:ln>
+                  <a:noFill/>
+                </a:ln>
+                <a:solidFill>
+                  <a:schemeClr val="tx1"/>
+                </a:solidFill>
+                <a:effectLst/>
+                <a:latin typeface="Times New Roman" panose="02020603050405020304" pitchFamily="18" charset="0"/>
+                <a:ea typeface="Calibri" panose="020F0502020204030204" pitchFamily="34" charset="0"/>
+                <a:cs typeface="Times New Roman" panose="02020603050405020304" pitchFamily="18" charset="0"/>
+              </a:rPr>
+              <a:t>, 367-426.</a:t>
+            </a:r>
+            <a:endParaRPr kumimoji="0" lang="en-US" altLang="en-US" sz="800" b="0" i="0" u="none" strike="noStrike" cap="none" normalizeH="0" baseline="0" dirty="0">
+              <a:ln>
+                <a:noFill/>
+              </a:ln>
+              <a:solidFill>
+                <a:schemeClr val="tx1"/>
+              </a:solidFill>
+              <a:effectLst/>
+            </a:endParaRPr>
+          </a:p>
+          <a:p>
+            <a:pPr marL="0" marR="0" lvl="0" indent="0" algn="l" defTabSz="914400" rtl="0" eaLnBrk="0" fontAlgn="base" latinLnBrk="0" hangingPunct="0">
+              <a:lnSpc>
+                <a:spcPct val="100000"/>
+              </a:lnSpc>
+              <a:spcBef>
+                <a:spcPct val="0"/>
+              </a:spcBef>
+              <a:spcAft>
+                <a:spcPct val="0"/>
+              </a:spcAft>
+              <a:buClrTx/>
+              <a:buSzTx/>
+              <a:buFontTx/>
+              <a:buNone/>
+              <a:tabLst/>
+            </a:pPr>
+            <a:r>
+              <a:rPr kumimoji="0" lang="en-US" altLang="en-US" sz="1200" b="1" i="0" u="none" strike="noStrike" cap="none" normalizeH="0" baseline="0" dirty="0">
+                <a:ln>
+                  <a:noFill/>
+                </a:ln>
+                <a:solidFill>
+                  <a:schemeClr val="tx1"/>
+                </a:solidFill>
+                <a:effectLst/>
+                <a:latin typeface="Times New Roman" panose="02020603050405020304" pitchFamily="18" charset="0"/>
+                <a:ea typeface="Calibri" panose="020F0502020204030204" pitchFamily="34" charset="0"/>
+                <a:cs typeface="Times New Roman" panose="02020603050405020304" pitchFamily="18" charset="0"/>
+              </a:rPr>
+              <a:t>Mansouri, Y., </a:t>
+            </a:r>
+            <a:r>
+              <a:rPr kumimoji="0" lang="en-US" altLang="en-US" sz="1200" b="1" i="0" u="none" strike="noStrike" cap="none" normalizeH="0" baseline="0" dirty="0" err="1">
+                <a:ln>
+                  <a:noFill/>
+                </a:ln>
+                <a:solidFill>
+                  <a:schemeClr val="tx1"/>
+                </a:solidFill>
+                <a:effectLst/>
+                <a:latin typeface="Times New Roman" panose="02020603050405020304" pitchFamily="18" charset="0"/>
+                <a:ea typeface="Calibri" panose="020F0502020204030204" pitchFamily="34" charset="0"/>
+                <a:cs typeface="Times New Roman" panose="02020603050405020304" pitchFamily="18" charset="0"/>
+              </a:rPr>
+              <a:t>Nadjaran</a:t>
+            </a:r>
+            <a:r>
+              <a:rPr kumimoji="0" lang="en-US" altLang="en-US" sz="1200" b="1" i="0" u="none" strike="noStrike" cap="none" normalizeH="0" baseline="0" dirty="0">
+                <a:ln>
+                  <a:noFill/>
+                </a:ln>
+                <a:solidFill>
+                  <a:schemeClr val="tx1"/>
+                </a:solidFill>
+                <a:effectLst/>
+                <a:latin typeface="Times New Roman" panose="02020603050405020304" pitchFamily="18" charset="0"/>
+                <a:ea typeface="Calibri" panose="020F0502020204030204" pitchFamily="34" charset="0"/>
+                <a:cs typeface="Times New Roman" panose="02020603050405020304" pitchFamily="18" charset="0"/>
+              </a:rPr>
+              <a:t>, T., &amp; </a:t>
+            </a:r>
+            <a:r>
+              <a:rPr kumimoji="0" lang="en-US" altLang="en-US" sz="1200" b="1" i="0" u="none" strike="noStrike" cap="none" normalizeH="0" baseline="0" dirty="0" err="1">
+                <a:ln>
+                  <a:noFill/>
+                </a:ln>
+                <a:solidFill>
+                  <a:schemeClr val="tx1"/>
+                </a:solidFill>
+                <a:effectLst/>
+                <a:latin typeface="Times New Roman" panose="02020603050405020304" pitchFamily="18" charset="0"/>
+                <a:ea typeface="Calibri" panose="020F0502020204030204" pitchFamily="34" charset="0"/>
+                <a:cs typeface="Times New Roman" panose="02020603050405020304" pitchFamily="18" charset="0"/>
+              </a:rPr>
+              <a:t>Buyya</a:t>
+            </a:r>
+            <a:r>
+              <a:rPr kumimoji="0" lang="en-US" altLang="en-US" sz="1200" b="1" i="0" u="none" strike="noStrike" cap="none" normalizeH="0" baseline="0" dirty="0">
+                <a:ln>
+                  <a:noFill/>
+                </a:ln>
+                <a:solidFill>
+                  <a:schemeClr val="tx1"/>
+                </a:solidFill>
+                <a:effectLst/>
+                <a:latin typeface="Times New Roman" panose="02020603050405020304" pitchFamily="18" charset="0"/>
+                <a:ea typeface="Calibri" panose="020F0502020204030204" pitchFamily="34" charset="0"/>
+                <a:cs typeface="Times New Roman" panose="02020603050405020304" pitchFamily="18" charset="0"/>
+              </a:rPr>
+              <a:t>, R. </a:t>
+            </a:r>
+            <a:r>
+              <a:rPr kumimoji="0" lang="en-US" altLang="en-US" sz="1200" b="0" i="0" u="none" strike="noStrike" cap="none" normalizeH="0" baseline="0" dirty="0">
+                <a:ln>
+                  <a:noFill/>
+                </a:ln>
+                <a:solidFill>
+                  <a:schemeClr val="tx1"/>
+                </a:solidFill>
+                <a:effectLst/>
+                <a:latin typeface="Times New Roman" panose="02020603050405020304" pitchFamily="18" charset="0"/>
+                <a:ea typeface="Calibri" panose="020F0502020204030204" pitchFamily="34" charset="0"/>
+                <a:cs typeface="Times New Roman" panose="02020603050405020304" pitchFamily="18" charset="0"/>
+              </a:rPr>
+              <a:t>(2017). </a:t>
+            </a:r>
+          </a:p>
+          <a:p>
+            <a:pPr marL="0" marR="0" lvl="0" indent="0" algn="l" defTabSz="914400" rtl="0" eaLnBrk="0" fontAlgn="base" latinLnBrk="0" hangingPunct="0">
+              <a:lnSpc>
+                <a:spcPct val="100000"/>
+              </a:lnSpc>
+              <a:spcBef>
+                <a:spcPct val="0"/>
+              </a:spcBef>
+              <a:spcAft>
+                <a:spcPct val="0"/>
+              </a:spcAft>
+              <a:buClrTx/>
+              <a:buSzTx/>
+              <a:buFontTx/>
+              <a:buNone/>
+              <a:tabLst/>
+            </a:pPr>
+            <a:r>
+              <a:rPr lang="en-US" altLang="en-US" sz="1200" dirty="0">
+                <a:latin typeface="Times New Roman" panose="02020603050405020304" pitchFamily="18" charset="0"/>
+                <a:ea typeface="Calibri" panose="020F0502020204030204" pitchFamily="34" charset="0"/>
+                <a:cs typeface="Times New Roman" panose="02020603050405020304" pitchFamily="18" charset="0"/>
+              </a:rPr>
+              <a:t>	</a:t>
+            </a:r>
+            <a:r>
+              <a:rPr kumimoji="0" lang="en-US" altLang="en-US" sz="1200" b="0" i="0" u="none" strike="noStrike" cap="none" normalizeH="0" baseline="0" dirty="0">
+                <a:ln>
+                  <a:noFill/>
+                </a:ln>
+                <a:solidFill>
+                  <a:schemeClr val="tx1"/>
+                </a:solidFill>
+                <a:effectLst/>
+                <a:latin typeface="Times New Roman" panose="02020603050405020304" pitchFamily="18" charset="0"/>
+                <a:ea typeface="Calibri" panose="020F0502020204030204" pitchFamily="34" charset="0"/>
+                <a:cs typeface="Times New Roman" panose="02020603050405020304" pitchFamily="18" charset="0"/>
+              </a:rPr>
+              <a:t>Data Storage Management in Cloud Environments: Taxonomy, Survey, and Future Directions. </a:t>
+            </a:r>
+          </a:p>
+          <a:p>
+            <a:pPr marL="0" marR="0" lvl="0" indent="0" algn="l" defTabSz="914400" rtl="0" eaLnBrk="0" fontAlgn="base" latinLnBrk="0" hangingPunct="0">
+              <a:lnSpc>
+                <a:spcPct val="100000"/>
+              </a:lnSpc>
+              <a:spcBef>
+                <a:spcPct val="0"/>
+              </a:spcBef>
+              <a:spcAft>
+                <a:spcPct val="0"/>
+              </a:spcAft>
+              <a:buClrTx/>
+              <a:buSzTx/>
+              <a:buFontTx/>
+              <a:buNone/>
+              <a:tabLst/>
+            </a:pPr>
+            <a:r>
+              <a:rPr lang="en-US" altLang="en-US" sz="1200" dirty="0">
+                <a:latin typeface="Times New Roman" panose="02020603050405020304" pitchFamily="18" charset="0"/>
+                <a:ea typeface="Calibri" panose="020F0502020204030204" pitchFamily="34" charset="0"/>
+                <a:cs typeface="Times New Roman" panose="02020603050405020304" pitchFamily="18" charset="0"/>
+              </a:rPr>
+              <a:t>	</a:t>
+            </a:r>
+            <a:r>
+              <a:rPr kumimoji="0" lang="en-US" altLang="en-US" sz="1200" b="0" i="1" u="none" strike="noStrike" cap="none" normalizeH="0" baseline="0" dirty="0">
+                <a:ln>
+                  <a:noFill/>
+                </a:ln>
+                <a:solidFill>
+                  <a:schemeClr val="tx1"/>
+                </a:solidFill>
+                <a:effectLst/>
+                <a:latin typeface="Times New Roman" panose="02020603050405020304" pitchFamily="18" charset="0"/>
+                <a:ea typeface="Calibri" panose="020F0502020204030204" pitchFamily="34" charset="0"/>
+                <a:cs typeface="Times New Roman" panose="02020603050405020304" pitchFamily="18" charset="0"/>
+              </a:rPr>
+              <a:t>ACM Computing Surveys, Vol. 50, No. 6, Article 91</a:t>
+            </a:r>
+            <a:r>
+              <a:rPr kumimoji="0" lang="en-US" altLang="en-US" sz="1200" b="0" i="0" u="none" strike="noStrike" cap="none" normalizeH="0" baseline="0" dirty="0">
+                <a:ln>
+                  <a:noFill/>
+                </a:ln>
+                <a:solidFill>
+                  <a:schemeClr val="tx1"/>
+                </a:solidFill>
+                <a:effectLst/>
+                <a:latin typeface="Times New Roman" panose="02020603050405020304" pitchFamily="18" charset="0"/>
+                <a:ea typeface="Calibri" panose="020F0502020204030204" pitchFamily="34" charset="0"/>
+                <a:cs typeface="Times New Roman" panose="02020603050405020304" pitchFamily="18" charset="0"/>
+              </a:rPr>
+              <a:t>.</a:t>
+            </a:r>
+            <a:endParaRPr kumimoji="0" lang="en-US" altLang="en-US" sz="800" b="0" i="0" u="none" strike="noStrike" cap="none" normalizeH="0" baseline="0" dirty="0">
+              <a:ln>
+                <a:noFill/>
+              </a:ln>
+              <a:solidFill>
+                <a:schemeClr val="tx1"/>
+              </a:solidFill>
+              <a:effectLst/>
+            </a:endParaRPr>
+          </a:p>
+          <a:p>
+            <a:pPr marL="0" marR="0" lvl="0" indent="0" algn="l" defTabSz="914400" rtl="0" eaLnBrk="0" fontAlgn="base" latinLnBrk="0" hangingPunct="0">
+              <a:lnSpc>
+                <a:spcPct val="100000"/>
+              </a:lnSpc>
+              <a:spcBef>
+                <a:spcPct val="0"/>
+              </a:spcBef>
+              <a:spcAft>
+                <a:spcPct val="0"/>
+              </a:spcAft>
+              <a:buClrTx/>
+              <a:buSzTx/>
+              <a:buFontTx/>
+              <a:buNone/>
+              <a:tabLst/>
+            </a:pPr>
+            <a:r>
+              <a:rPr kumimoji="0" lang="en-US" altLang="en-US" sz="1200" b="1" i="0" u="none" strike="noStrike" cap="none" normalizeH="0" baseline="0" dirty="0">
+                <a:ln>
+                  <a:noFill/>
+                </a:ln>
+                <a:solidFill>
+                  <a:schemeClr val="tx1"/>
+                </a:solidFill>
+                <a:effectLst/>
+                <a:latin typeface="Times New Roman" panose="02020603050405020304" pitchFamily="18" charset="0"/>
+                <a:ea typeface="Calibri" panose="020F0502020204030204" pitchFamily="34" charset="0"/>
+                <a:cs typeface="Times New Roman" panose="02020603050405020304" pitchFamily="18" charset="0"/>
+              </a:rPr>
+              <a:t>Marcin, S., &amp; </a:t>
+            </a:r>
+            <a:r>
+              <a:rPr kumimoji="0" lang="en-US" altLang="en-US" sz="1200" b="1" i="0" u="none" strike="noStrike" cap="none" normalizeH="0" baseline="0" dirty="0" err="1">
+                <a:ln>
+                  <a:noFill/>
+                </a:ln>
+                <a:solidFill>
+                  <a:schemeClr val="tx1"/>
+                </a:solidFill>
+                <a:effectLst/>
+                <a:latin typeface="Times New Roman" panose="02020603050405020304" pitchFamily="18" charset="0"/>
+                <a:ea typeface="Calibri" panose="020F0502020204030204" pitchFamily="34" charset="0"/>
+                <a:cs typeface="Times New Roman" panose="02020603050405020304" pitchFamily="18" charset="0"/>
+              </a:rPr>
+              <a:t>Csillaghy</a:t>
+            </a:r>
+            <a:r>
+              <a:rPr kumimoji="0" lang="en-US" altLang="en-US" sz="1200" b="1" i="0" u="none" strike="noStrike" cap="none" normalizeH="0" baseline="0" dirty="0">
+                <a:ln>
+                  <a:noFill/>
+                </a:ln>
+                <a:solidFill>
+                  <a:schemeClr val="tx1"/>
+                </a:solidFill>
+                <a:effectLst/>
+                <a:latin typeface="Times New Roman" panose="02020603050405020304" pitchFamily="18" charset="0"/>
+                <a:ea typeface="Calibri" panose="020F0502020204030204" pitchFamily="34" charset="0"/>
+                <a:cs typeface="Times New Roman" panose="02020603050405020304" pitchFamily="18" charset="0"/>
+              </a:rPr>
+              <a:t>, A</a:t>
+            </a:r>
+            <a:r>
+              <a:rPr kumimoji="0" lang="en-US" altLang="en-US" sz="1200" b="0" i="0" u="none" strike="noStrike" cap="none" normalizeH="0" baseline="0" dirty="0">
+                <a:ln>
+                  <a:noFill/>
+                </a:ln>
+                <a:solidFill>
+                  <a:schemeClr val="tx1"/>
+                </a:solidFill>
+                <a:effectLst/>
+                <a:latin typeface="Times New Roman" panose="02020603050405020304" pitchFamily="18" charset="0"/>
+                <a:ea typeface="Calibri" panose="020F0502020204030204" pitchFamily="34" charset="0"/>
+                <a:cs typeface="Times New Roman" panose="02020603050405020304" pitchFamily="18" charset="0"/>
+              </a:rPr>
+              <a:t>. (2017). </a:t>
+            </a:r>
+          </a:p>
+          <a:p>
+            <a:pPr marL="0" marR="0" lvl="0" indent="0" algn="l" defTabSz="914400" rtl="0" eaLnBrk="0" fontAlgn="base" latinLnBrk="0" hangingPunct="0">
+              <a:lnSpc>
+                <a:spcPct val="100000"/>
+              </a:lnSpc>
+              <a:spcBef>
+                <a:spcPct val="0"/>
+              </a:spcBef>
+              <a:spcAft>
+                <a:spcPct val="0"/>
+              </a:spcAft>
+              <a:buClrTx/>
+              <a:buSzTx/>
+              <a:buFontTx/>
+              <a:buNone/>
+              <a:tabLst/>
+            </a:pPr>
+            <a:r>
+              <a:rPr lang="en-US" altLang="en-US" sz="1200" dirty="0">
+                <a:latin typeface="Times New Roman" panose="02020603050405020304" pitchFamily="18" charset="0"/>
+                <a:ea typeface="Calibri" panose="020F0502020204030204" pitchFamily="34" charset="0"/>
+                <a:cs typeface="Times New Roman" panose="02020603050405020304" pitchFamily="18" charset="0"/>
+              </a:rPr>
+              <a:t>	</a:t>
+            </a:r>
+            <a:r>
+              <a:rPr kumimoji="0" lang="en-US" altLang="en-US" sz="1200" b="0" i="0" u="none" strike="noStrike" cap="none" normalizeH="0" baseline="0" dirty="0">
+                <a:ln>
+                  <a:noFill/>
+                </a:ln>
+                <a:solidFill>
+                  <a:schemeClr val="tx1"/>
+                </a:solidFill>
+                <a:effectLst/>
+                <a:latin typeface="Times New Roman" panose="02020603050405020304" pitchFamily="18" charset="0"/>
+                <a:ea typeface="Calibri" panose="020F0502020204030204" pitchFamily="34" charset="0"/>
+                <a:cs typeface="Times New Roman" panose="02020603050405020304" pitchFamily="18" charset="0"/>
+              </a:rPr>
+              <a:t>Accelerating Scientiﬁc Algorithms in Array Databases with GPUs. </a:t>
+            </a:r>
+          </a:p>
+          <a:p>
+            <a:pPr marL="0" marR="0" lvl="0" indent="0" algn="l" defTabSz="914400" rtl="0" eaLnBrk="0" fontAlgn="base" latinLnBrk="0" hangingPunct="0">
+              <a:lnSpc>
+                <a:spcPct val="100000"/>
+              </a:lnSpc>
+              <a:spcBef>
+                <a:spcPct val="0"/>
+              </a:spcBef>
+              <a:spcAft>
+                <a:spcPct val="0"/>
+              </a:spcAft>
+              <a:buClrTx/>
+              <a:buSzTx/>
+              <a:buFontTx/>
+              <a:buNone/>
+              <a:tabLst/>
+            </a:pPr>
+            <a:r>
+              <a:rPr lang="en-US" altLang="en-US" sz="1200" dirty="0">
+                <a:latin typeface="Times New Roman" panose="02020603050405020304" pitchFamily="18" charset="0"/>
+                <a:ea typeface="Calibri" panose="020F0502020204030204" pitchFamily="34" charset="0"/>
+                <a:cs typeface="Times New Roman" panose="02020603050405020304" pitchFamily="18" charset="0"/>
+              </a:rPr>
+              <a:t>	</a:t>
+            </a:r>
+            <a:r>
+              <a:rPr kumimoji="0" lang="en-US" altLang="en-US" sz="1200" b="0" i="1" u="none" strike="noStrike" cap="none" normalizeH="0" baseline="0" dirty="0">
+                <a:ln>
+                  <a:noFill/>
+                </a:ln>
+                <a:solidFill>
+                  <a:schemeClr val="tx1"/>
+                </a:solidFill>
+                <a:effectLst/>
+                <a:latin typeface="Times New Roman" panose="02020603050405020304" pitchFamily="18" charset="0"/>
+                <a:ea typeface="Calibri" panose="020F0502020204030204" pitchFamily="34" charset="0"/>
+                <a:cs typeface="Times New Roman" panose="02020603050405020304" pitchFamily="18" charset="0"/>
+              </a:rPr>
+              <a:t>2017 IEEE International Conference on Big Data (BIGDATA)</a:t>
+            </a:r>
+            <a:r>
+              <a:rPr kumimoji="0" lang="en-US" altLang="en-US" sz="1200" b="0" i="0" u="none" strike="noStrike" cap="none" normalizeH="0" baseline="0" dirty="0">
+                <a:ln>
+                  <a:noFill/>
+                </a:ln>
+                <a:solidFill>
+                  <a:schemeClr val="tx1"/>
+                </a:solidFill>
+                <a:effectLst/>
+                <a:latin typeface="Times New Roman" panose="02020603050405020304" pitchFamily="18" charset="0"/>
+                <a:ea typeface="Calibri" panose="020F0502020204030204" pitchFamily="34" charset="0"/>
+                <a:cs typeface="Times New Roman" panose="02020603050405020304" pitchFamily="18" charset="0"/>
+              </a:rPr>
+              <a:t>.</a:t>
+            </a:r>
+            <a:endParaRPr kumimoji="0" lang="en-US" altLang="en-US" sz="800" b="0" i="0" u="none" strike="noStrike" cap="none" normalizeH="0" baseline="0" dirty="0">
+              <a:ln>
+                <a:noFill/>
+              </a:ln>
+              <a:solidFill>
+                <a:schemeClr val="tx1"/>
+              </a:solidFill>
+              <a:effectLst/>
+            </a:endParaRPr>
+          </a:p>
+          <a:p>
+            <a:pPr marL="0" marR="0" lvl="0" indent="0" algn="l" defTabSz="914400" rtl="0" eaLnBrk="0" fontAlgn="base" latinLnBrk="0" hangingPunct="0">
+              <a:lnSpc>
+                <a:spcPct val="100000"/>
+              </a:lnSpc>
+              <a:spcBef>
+                <a:spcPct val="0"/>
+              </a:spcBef>
+              <a:spcAft>
+                <a:spcPct val="0"/>
+              </a:spcAft>
+              <a:buClrTx/>
+              <a:buSzTx/>
+              <a:buFontTx/>
+              <a:buNone/>
+              <a:tabLst/>
+            </a:pPr>
+            <a:r>
+              <a:rPr kumimoji="0" lang="en-US" altLang="en-US" sz="1200" b="1" i="0" u="none" strike="noStrike" cap="none" normalizeH="0" baseline="0" dirty="0" err="1">
+                <a:ln>
+                  <a:noFill/>
+                </a:ln>
+                <a:solidFill>
+                  <a:schemeClr val="tx1"/>
+                </a:solidFill>
+                <a:effectLst/>
+                <a:latin typeface="Times New Roman" panose="02020603050405020304" pitchFamily="18" charset="0"/>
+                <a:ea typeface="Calibri" panose="020F0502020204030204" pitchFamily="34" charset="0"/>
+                <a:cs typeface="Times New Roman" panose="02020603050405020304" pitchFamily="18" charset="0"/>
+              </a:rPr>
+              <a:t>Roozmeh</a:t>
+            </a:r>
+            <a:r>
+              <a:rPr kumimoji="0" lang="en-US" altLang="en-US" sz="1200" b="1" i="0" u="none" strike="noStrike" cap="none" normalizeH="0" baseline="0" dirty="0">
+                <a:ln>
+                  <a:noFill/>
+                </a:ln>
+                <a:solidFill>
+                  <a:schemeClr val="tx1"/>
+                </a:solidFill>
+                <a:effectLst/>
+                <a:latin typeface="Times New Roman" panose="02020603050405020304" pitchFamily="18" charset="0"/>
+                <a:ea typeface="Calibri" panose="020F0502020204030204" pitchFamily="34" charset="0"/>
+                <a:cs typeface="Times New Roman" panose="02020603050405020304" pitchFamily="18" charset="0"/>
+              </a:rPr>
+              <a:t>, M., Torino, P., &amp; </a:t>
+            </a:r>
+            <a:r>
+              <a:rPr kumimoji="0" lang="en-US" altLang="en-US" sz="1200" b="1" i="0" u="none" strike="noStrike" cap="none" normalizeH="0" baseline="0" dirty="0" err="1">
+                <a:ln>
+                  <a:noFill/>
+                </a:ln>
+                <a:solidFill>
+                  <a:schemeClr val="tx1"/>
+                </a:solidFill>
+                <a:effectLst/>
+                <a:latin typeface="Times New Roman" panose="02020603050405020304" pitchFamily="18" charset="0"/>
+                <a:ea typeface="Calibri" panose="020F0502020204030204" pitchFamily="34" charset="0"/>
+                <a:cs typeface="Times New Roman" panose="02020603050405020304" pitchFamily="18" charset="0"/>
+              </a:rPr>
+              <a:t>Lavagno</a:t>
+            </a:r>
+            <a:r>
+              <a:rPr kumimoji="0" lang="en-US" altLang="en-US" sz="1200" b="1" i="0" u="none" strike="noStrike" cap="none" normalizeH="0" baseline="0" dirty="0">
+                <a:ln>
+                  <a:noFill/>
+                </a:ln>
+                <a:solidFill>
+                  <a:schemeClr val="tx1"/>
+                </a:solidFill>
+                <a:effectLst/>
+                <a:latin typeface="Times New Roman" panose="02020603050405020304" pitchFamily="18" charset="0"/>
+                <a:ea typeface="Calibri" panose="020F0502020204030204" pitchFamily="34" charset="0"/>
+                <a:cs typeface="Times New Roman" panose="02020603050405020304" pitchFamily="18" charset="0"/>
+              </a:rPr>
+              <a:t>, L. </a:t>
+            </a:r>
+            <a:r>
+              <a:rPr kumimoji="0" lang="en-US" altLang="en-US" sz="1200" b="0" i="0" u="none" strike="noStrike" cap="none" normalizeH="0" baseline="0" dirty="0">
+                <a:ln>
+                  <a:noFill/>
+                </a:ln>
+                <a:solidFill>
+                  <a:schemeClr val="tx1"/>
+                </a:solidFill>
+                <a:effectLst/>
+                <a:latin typeface="Times New Roman" panose="02020603050405020304" pitchFamily="18" charset="0"/>
+                <a:ea typeface="Calibri" panose="020F0502020204030204" pitchFamily="34" charset="0"/>
+                <a:cs typeface="Times New Roman" panose="02020603050405020304" pitchFamily="18" charset="0"/>
+              </a:rPr>
+              <a:t>(2017). </a:t>
+            </a:r>
+          </a:p>
+          <a:p>
+            <a:pPr marL="0" marR="0" lvl="0" indent="0" algn="l" defTabSz="914400" rtl="0" eaLnBrk="0" fontAlgn="base" latinLnBrk="0" hangingPunct="0">
+              <a:lnSpc>
+                <a:spcPct val="100000"/>
+              </a:lnSpc>
+              <a:spcBef>
+                <a:spcPct val="0"/>
+              </a:spcBef>
+              <a:spcAft>
+                <a:spcPct val="0"/>
+              </a:spcAft>
+              <a:buClrTx/>
+              <a:buSzTx/>
+              <a:buFontTx/>
+              <a:buNone/>
+              <a:tabLst/>
+            </a:pPr>
+            <a:r>
+              <a:rPr lang="en-US" altLang="en-US" sz="1200" dirty="0">
+                <a:latin typeface="Times New Roman" panose="02020603050405020304" pitchFamily="18" charset="0"/>
+                <a:ea typeface="Calibri" panose="020F0502020204030204" pitchFamily="34" charset="0"/>
+                <a:cs typeface="Times New Roman" panose="02020603050405020304" pitchFamily="18" charset="0"/>
+              </a:rPr>
+              <a:t>	</a:t>
+            </a:r>
+            <a:r>
+              <a:rPr kumimoji="0" lang="en-US" altLang="en-US" sz="1200" b="0" i="0" u="none" strike="noStrike" cap="none" normalizeH="0" baseline="0" dirty="0">
+                <a:ln>
+                  <a:noFill/>
+                </a:ln>
+                <a:solidFill>
+                  <a:schemeClr val="tx1"/>
+                </a:solidFill>
+                <a:effectLst/>
+                <a:latin typeface="Times New Roman" panose="02020603050405020304" pitchFamily="18" charset="0"/>
+                <a:ea typeface="Calibri" panose="020F0502020204030204" pitchFamily="34" charset="0"/>
+                <a:cs typeface="Times New Roman" panose="02020603050405020304" pitchFamily="18" charset="0"/>
+              </a:rPr>
+              <a:t>Implementation of a Performance Optimized Database Join Operation on FPGA-GPU Platforms Using </a:t>
+            </a:r>
+            <a:r>
+              <a:rPr kumimoji="0" lang="en-US" altLang="en-US" sz="1200" b="0" i="0" u="none" strike="noStrike" cap="none" normalizeH="0" baseline="0">
+                <a:ln>
+                  <a:noFill/>
+                </a:ln>
+                <a:solidFill>
+                  <a:schemeClr val="tx1"/>
+                </a:solidFill>
+                <a:effectLst/>
+                <a:latin typeface="Times New Roman" panose="02020603050405020304" pitchFamily="18" charset="0"/>
+                <a:ea typeface="Calibri" panose="020F0502020204030204" pitchFamily="34" charset="0"/>
+                <a:cs typeface="Times New Roman" panose="02020603050405020304" pitchFamily="18" charset="0"/>
+              </a:rPr>
+              <a:t>OpenCL.</a:t>
+            </a:r>
+            <a:endParaRPr kumimoji="0" lang="en-US" altLang="en-US" sz="800" b="0" i="0" u="none" strike="noStrike" cap="none" normalizeH="0" baseline="0" dirty="0">
+              <a:ln>
+                <a:noFill/>
+              </a:ln>
+              <a:solidFill>
+                <a:schemeClr val="tx1"/>
+              </a:solidFill>
+              <a:effectLst/>
+            </a:endParaRPr>
+          </a:p>
+        </p:txBody>
+      </p:sp>
+    </p:spTree>
+    <p:extLst>
+      <p:ext uri="{BB962C8B-B14F-4D97-AF65-F5344CB8AC3E}">
+        <p14:creationId xmlns:p14="http://schemas.microsoft.com/office/powerpoint/2010/main" val="227930716"/>
       </p:ext>
     </p:extLst>
   </p:cSld>

</xml_diff>